<commit_message>
changes on Domain Properties
</commit_message>
<xml_diff>
--- a/RASD/presentation/RASD_presentation.pptx
+++ b/RASD/presentation/RASD_presentation.pptx
@@ -9,19 +9,19 @@
     <p:sldId id="257" r:id="rId3"/>
     <p:sldId id="266" r:id="rId4"/>
     <p:sldId id="259" r:id="rId5"/>
-    <p:sldId id="260" r:id="rId6"/>
-    <p:sldId id="267" r:id="rId7"/>
-    <p:sldId id="258" r:id="rId8"/>
-    <p:sldId id="261" r:id="rId9"/>
-    <p:sldId id="262" r:id="rId10"/>
-    <p:sldId id="263" r:id="rId11"/>
-    <p:sldId id="268" r:id="rId12"/>
-    <p:sldId id="271" r:id="rId13"/>
-    <p:sldId id="269" r:id="rId14"/>
-    <p:sldId id="270" r:id="rId15"/>
-    <p:sldId id="272" r:id="rId16"/>
-    <p:sldId id="273" r:id="rId17"/>
-    <p:sldId id="274" r:id="rId18"/>
+    <p:sldId id="267" r:id="rId6"/>
+    <p:sldId id="258" r:id="rId7"/>
+    <p:sldId id="261" r:id="rId8"/>
+    <p:sldId id="262" r:id="rId9"/>
+    <p:sldId id="263" r:id="rId10"/>
+    <p:sldId id="268" r:id="rId11"/>
+    <p:sldId id="271" r:id="rId12"/>
+    <p:sldId id="269" r:id="rId13"/>
+    <p:sldId id="270" r:id="rId14"/>
+    <p:sldId id="272" r:id="rId15"/>
+    <p:sldId id="273" r:id="rId16"/>
+    <p:sldId id="274" r:id="rId17"/>
+    <p:sldId id="293" r:id="rId18"/>
     <p:sldId id="275" r:id="rId19"/>
     <p:sldId id="290" r:id="rId20"/>
     <p:sldId id="291" r:id="rId21"/>
@@ -138,6 +138,22 @@
       </a:defRPr>
     </a:lvl9pPr>
   </p:defaultTextStyle>
+  <p:extLst>
+    <p:ext uri="{EFAFB233-063F-42B5-8137-9DF3F51BA10A}">
+      <p15:sldGuideLst xmlns:p15="http://schemas.microsoft.com/office/powerpoint/2012/main">
+        <p15:guide id="1" orient="horz" pos="2160">
+          <p15:clr>
+            <a:srgbClr val="A4A3A4"/>
+          </p15:clr>
+        </p15:guide>
+        <p15:guide id="2" pos="2880">
+          <p15:clr>
+            <a:srgbClr val="A4A3A4"/>
+          </p15:clr>
+        </p15:guide>
+      </p15:sldGuideLst>
+    </p:ext>
+  </p:extLst>
 </p:presentation>
 </file>
 
@@ -322,7 +338,7 @@
           <a:p>
             <a:fld id="{04C022AF-FDA7-5F49-8ED6-EF7E40D2900D}" type="datetimeFigureOut">
               <a:rPr lang="en-US" smtClean="0"/>
-              <a:t>10/11/16</a:t>
+              <a:t>11/13/2016</a:t>
             </a:fld>
             <a:endParaRPr lang="en-US"/>
           </a:p>
@@ -364,7 +380,7 @@
           <a:p>
             <a:fld id="{731D8DCA-ED65-174D-8524-A15D60332472}" type="slidenum">
               <a:rPr lang="en-US" smtClean="0"/>
-              <a:t>‹#›</a:t>
+              <a:t>‹N›</a:t>
             </a:fld>
             <a:endParaRPr lang="en-US"/>
           </a:p>
@@ -492,7 +508,7 @@
           <a:p>
             <a:fld id="{04C022AF-FDA7-5F49-8ED6-EF7E40D2900D}" type="datetimeFigureOut">
               <a:rPr lang="en-US" smtClean="0"/>
-              <a:t>10/11/16</a:t>
+              <a:t>11/13/2016</a:t>
             </a:fld>
             <a:endParaRPr lang="en-US"/>
           </a:p>
@@ -534,7 +550,7 @@
           <a:p>
             <a:fld id="{731D8DCA-ED65-174D-8524-A15D60332472}" type="slidenum">
               <a:rPr lang="en-US" smtClean="0"/>
-              <a:t>‹#›</a:t>
+              <a:t>‹N›</a:t>
             </a:fld>
             <a:endParaRPr lang="en-US"/>
           </a:p>
@@ -672,7 +688,7 @@
           <a:p>
             <a:fld id="{04C022AF-FDA7-5F49-8ED6-EF7E40D2900D}" type="datetimeFigureOut">
               <a:rPr lang="en-US" smtClean="0"/>
-              <a:t>10/11/16</a:t>
+              <a:t>11/13/2016</a:t>
             </a:fld>
             <a:endParaRPr lang="en-US"/>
           </a:p>
@@ -714,7 +730,7 @@
           <a:p>
             <a:fld id="{731D8DCA-ED65-174D-8524-A15D60332472}" type="slidenum">
               <a:rPr lang="en-US" smtClean="0"/>
-              <a:t>‹#›</a:t>
+              <a:t>‹N›</a:t>
             </a:fld>
             <a:endParaRPr lang="en-US"/>
           </a:p>
@@ -842,7 +858,7 @@
           <a:p>
             <a:fld id="{04C022AF-FDA7-5F49-8ED6-EF7E40D2900D}" type="datetimeFigureOut">
               <a:rPr lang="en-US" smtClean="0"/>
-              <a:t>10/11/16</a:t>
+              <a:t>11/13/2016</a:t>
             </a:fld>
             <a:endParaRPr lang="en-US"/>
           </a:p>
@@ -884,7 +900,7 @@
           <a:p>
             <a:fld id="{731D8DCA-ED65-174D-8524-A15D60332472}" type="slidenum">
               <a:rPr lang="en-US" smtClean="0"/>
-              <a:t>‹#›</a:t>
+              <a:t>‹N›</a:t>
             </a:fld>
             <a:endParaRPr lang="en-US"/>
           </a:p>
@@ -1088,7 +1104,7 @@
           <a:p>
             <a:fld id="{04C022AF-FDA7-5F49-8ED6-EF7E40D2900D}" type="datetimeFigureOut">
               <a:rPr lang="en-US" smtClean="0"/>
-              <a:t>10/11/16</a:t>
+              <a:t>11/13/2016</a:t>
             </a:fld>
             <a:endParaRPr lang="en-US"/>
           </a:p>
@@ -1130,7 +1146,7 @@
           <a:p>
             <a:fld id="{731D8DCA-ED65-174D-8524-A15D60332472}" type="slidenum">
               <a:rPr lang="en-US" smtClean="0"/>
-              <a:t>‹#›</a:t>
+              <a:t>‹N›</a:t>
             </a:fld>
             <a:endParaRPr lang="en-US"/>
           </a:p>
@@ -1376,7 +1392,7 @@
           <a:p>
             <a:fld id="{04C022AF-FDA7-5F49-8ED6-EF7E40D2900D}" type="datetimeFigureOut">
               <a:rPr lang="en-US" smtClean="0"/>
-              <a:t>10/11/16</a:t>
+              <a:t>11/13/2016</a:t>
             </a:fld>
             <a:endParaRPr lang="en-US"/>
           </a:p>
@@ -1418,7 +1434,7 @@
           <a:p>
             <a:fld id="{731D8DCA-ED65-174D-8524-A15D60332472}" type="slidenum">
               <a:rPr lang="en-US" smtClean="0"/>
-              <a:t>‹#›</a:t>
+              <a:t>‹N›</a:t>
             </a:fld>
             <a:endParaRPr lang="en-US"/>
           </a:p>
@@ -1798,7 +1814,7 @@
           <a:p>
             <a:fld id="{04C022AF-FDA7-5F49-8ED6-EF7E40D2900D}" type="datetimeFigureOut">
               <a:rPr lang="en-US" smtClean="0"/>
-              <a:t>10/11/16</a:t>
+              <a:t>11/13/2016</a:t>
             </a:fld>
             <a:endParaRPr lang="en-US"/>
           </a:p>
@@ -1840,7 +1856,7 @@
           <a:p>
             <a:fld id="{731D8DCA-ED65-174D-8524-A15D60332472}" type="slidenum">
               <a:rPr lang="en-US" smtClean="0"/>
-              <a:t>‹#›</a:t>
+              <a:t>‹N›</a:t>
             </a:fld>
             <a:endParaRPr lang="en-US"/>
           </a:p>
@@ -1916,7 +1932,7 @@
           <a:p>
             <a:fld id="{04C022AF-FDA7-5F49-8ED6-EF7E40D2900D}" type="datetimeFigureOut">
               <a:rPr lang="en-US" smtClean="0"/>
-              <a:t>10/11/16</a:t>
+              <a:t>11/13/2016</a:t>
             </a:fld>
             <a:endParaRPr lang="en-US"/>
           </a:p>
@@ -1958,7 +1974,7 @@
           <a:p>
             <a:fld id="{731D8DCA-ED65-174D-8524-A15D60332472}" type="slidenum">
               <a:rPr lang="en-US" smtClean="0"/>
-              <a:t>‹#›</a:t>
+              <a:t>‹N›</a:t>
             </a:fld>
             <a:endParaRPr lang="en-US"/>
           </a:p>
@@ -2011,7 +2027,7 @@
           <a:p>
             <a:fld id="{04C022AF-FDA7-5F49-8ED6-EF7E40D2900D}" type="datetimeFigureOut">
               <a:rPr lang="en-US" smtClean="0"/>
-              <a:t>10/11/16</a:t>
+              <a:t>11/13/2016</a:t>
             </a:fld>
             <a:endParaRPr lang="en-US"/>
           </a:p>
@@ -2053,7 +2069,7 @@
           <a:p>
             <a:fld id="{731D8DCA-ED65-174D-8524-A15D60332472}" type="slidenum">
               <a:rPr lang="en-US" smtClean="0"/>
-              <a:t>‹#›</a:t>
+              <a:t>‹N›</a:t>
             </a:fld>
             <a:endParaRPr lang="en-US"/>
           </a:p>
@@ -2288,7 +2304,7 @@
           <a:p>
             <a:fld id="{04C022AF-FDA7-5F49-8ED6-EF7E40D2900D}" type="datetimeFigureOut">
               <a:rPr lang="en-US" smtClean="0"/>
-              <a:t>10/11/16</a:t>
+              <a:t>11/13/2016</a:t>
             </a:fld>
             <a:endParaRPr lang="en-US"/>
           </a:p>
@@ -2330,7 +2346,7 @@
           <a:p>
             <a:fld id="{731D8DCA-ED65-174D-8524-A15D60332472}" type="slidenum">
               <a:rPr lang="en-US" smtClean="0"/>
-              <a:t>‹#›</a:t>
+              <a:t>‹N›</a:t>
             </a:fld>
             <a:endParaRPr lang="en-US"/>
           </a:p>
@@ -2541,7 +2557,7 @@
           <a:p>
             <a:fld id="{04C022AF-FDA7-5F49-8ED6-EF7E40D2900D}" type="datetimeFigureOut">
               <a:rPr lang="en-US" smtClean="0"/>
-              <a:t>10/11/16</a:t>
+              <a:t>11/13/2016</a:t>
             </a:fld>
             <a:endParaRPr lang="en-US"/>
           </a:p>
@@ -2583,7 +2599,7 @@
           <a:p>
             <a:fld id="{731D8DCA-ED65-174D-8524-A15D60332472}" type="slidenum">
               <a:rPr lang="en-US" smtClean="0"/>
-              <a:t>‹#›</a:t>
+              <a:t>‹N›</a:t>
             </a:fld>
             <a:endParaRPr lang="en-US"/>
           </a:p>
@@ -2754,7 +2770,7 @@
           <a:p>
             <a:fld id="{04C022AF-FDA7-5F49-8ED6-EF7E40D2900D}" type="datetimeFigureOut">
               <a:rPr lang="en-US" smtClean="0"/>
-              <a:t>10/11/16</a:t>
+              <a:t>11/13/2016</a:t>
             </a:fld>
             <a:endParaRPr lang="en-US"/>
           </a:p>
@@ -2832,7 +2848,7 @@
           <a:p>
             <a:fld id="{731D8DCA-ED65-174D-8524-A15D60332472}" type="slidenum">
               <a:rPr lang="en-US" smtClean="0"/>
-              <a:t>‹#›</a:t>
+              <a:t>‹N›</a:t>
             </a:fld>
             <a:endParaRPr lang="en-US"/>
           </a:p>
@@ -3213,7 +3229,7 @@
   <p:timing>
     <p:tnLst>
       <p:par>
-        <p:cTn xmlns:p14="http://schemas.microsoft.com/office/powerpoint/2010/main" id="1" dur="indefinite" restart="never" nodeType="tmRoot"/>
+        <p:cTn id="1" dur="indefinite" restart="never" nodeType="tmRoot"/>
       </p:par>
     </p:tnLst>
   </p:timing>
@@ -3254,7 +3270,7 @@
           <a:p>
             <a:r>
               <a:rPr lang="en-US" dirty="0" smtClean="0"/>
-              <a:t>Requirements (1)</a:t>
+              <a:t>Requirements (2)</a:t>
             </a:r>
             <a:endParaRPr lang="en-US" dirty="0"/>
           </a:p>
@@ -3272,13 +3288,13 @@
         </p:nvSpPr>
         <p:spPr>
           <a:xfrm>
-            <a:off x="129881" y="1417638"/>
-            <a:ext cx="8904080" cy="5257800"/>
+            <a:off x="187606" y="1417638"/>
+            <a:ext cx="8730906" cy="4960555"/>
           </a:xfrm>
         </p:spPr>
         <p:txBody>
           <a:bodyPr>
-            <a:normAutofit fontScale="55000" lnSpcReduction="20000"/>
+            <a:normAutofit/>
           </a:bodyPr>
           <a:lstStyle/>
           <a:p>
@@ -3286,107 +3302,74 @@
               <a:buNone/>
             </a:pPr>
             <a:r>
-              <a:rPr lang="en-GB" sz="4000" i="1" u="sng" dirty="0" smtClean="0"/>
-              <a:t>GOAL 1: </a:t>
-            </a:r>
-          </a:p>
-          <a:p>
-            <a:pPr marL="0" indent="0">
-              <a:buNone/>
-            </a:pPr>
-            <a:r>
-              <a:rPr lang="en-GB" sz="4000" i="1" u="sng" dirty="0" smtClean="0"/>
+              <a:rPr lang="en-GB" i="1" u="sng" dirty="0" smtClean="0"/>
+              <a:t>GOAL 2: </a:t>
+            </a:r>
+          </a:p>
+          <a:p>
+            <a:pPr marL="0" lvl="0" indent="0">
+              <a:buNone/>
+            </a:pPr>
+            <a:r>
+              <a:rPr lang="en-GB" i="1" u="sng" dirty="0" smtClean="0"/>
               <a:t>Users </a:t>
             </a:r>
             <a:r>
-              <a:rPr lang="en-GB" sz="4000" i="1" u="sng" dirty="0"/>
-              <a:t>could see and select an available car close to him, or close to a specified address, and reserve it for up to one hour before they pick it </a:t>
-            </a:r>
-            <a:r>
-              <a:rPr lang="en-GB" sz="4000" i="1" u="sng" dirty="0" smtClean="0"/>
-              <a:t>up</a:t>
-            </a:r>
-            <a:r>
-              <a:rPr lang="en-US" sz="4000" dirty="0"/>
+              <a:rPr lang="en-GB" i="1" u="sng" dirty="0"/>
+              <a:t>could get in a car only if they are </a:t>
+            </a:r>
+            <a:r>
+              <a:rPr lang="en-GB" i="1" u="sng" dirty="0" smtClean="0"/>
+              <a:t>near it </a:t>
+            </a:r>
+            <a:r>
+              <a:rPr lang="en-GB" i="1" u="sng" dirty="0"/>
+              <a:t>and they reserved </a:t>
+            </a:r>
+            <a:r>
+              <a:rPr lang="en-GB" i="1" u="sng" dirty="0" smtClean="0"/>
+              <a:t>it</a:t>
+            </a:r>
+            <a:r>
+              <a:rPr lang="en-GB" i="1" dirty="0" smtClean="0"/>
               <a:t>.</a:t>
             </a:r>
-            <a:endParaRPr lang="en-US" sz="4000" dirty="0" smtClean="0"/>
-          </a:p>
-          <a:p>
-            <a:pPr marL="0" indent="0">
-              <a:buNone/>
-            </a:pPr>
-            <a:r>
-              <a:rPr lang="en-US" sz="4000" dirty="0" smtClean="0"/>
+          </a:p>
+          <a:p>
+            <a:pPr marL="0" lvl="0" indent="0">
+              <a:buNone/>
+            </a:pPr>
+            <a:r>
+              <a:rPr lang="en-GB" i="1" dirty="0" smtClean="0"/>
               <a:t>REQUIREMENTS:</a:t>
             </a:r>
+            <a:endParaRPr lang="en-US" dirty="0"/>
           </a:p>
           <a:p>
             <a:pPr lvl="0"/>
             <a:r>
-              <a:rPr lang="en-GB" sz="4000" dirty="0"/>
-              <a:t>The system has to detect if a car is parked in a Safe Area and its battery level;</a:t>
-            </a:r>
-            <a:endParaRPr lang="en-US" sz="4000" dirty="0"/>
+              <a:rPr lang="en-GB" dirty="0"/>
+              <a:t>The system has to be able to identify the location of the user and of the car;</a:t>
+            </a:r>
+            <a:endParaRPr lang="en-US" dirty="0"/>
           </a:p>
           <a:p>
             <a:pPr lvl="0"/>
             <a:r>
-              <a:rPr lang="en-GB" sz="4000" dirty="0"/>
-              <a:t>The system has to detect car position and display it on a map;</a:t>
-            </a:r>
-            <a:endParaRPr lang="en-US" sz="4000" dirty="0"/>
-          </a:p>
-          <a:p>
-            <a:pPr lvl="0"/>
-            <a:r>
-              <a:rPr lang="en-GB" sz="4000" dirty="0"/>
-              <a:t>The system has to be able to identify the location of a user through his/her GPS, if he/she gives the consent;</a:t>
-            </a:r>
-            <a:endParaRPr lang="en-US" sz="4000" dirty="0"/>
-          </a:p>
-          <a:p>
-            <a:pPr lvl="0"/>
-            <a:r>
-              <a:rPr lang="en-GB" sz="4000" dirty="0"/>
-              <a:t>The system has to provide a list of available cars close to a given address;</a:t>
-            </a:r>
-            <a:endParaRPr lang="en-US" sz="4000" dirty="0"/>
-          </a:p>
-          <a:p>
-            <a:pPr lvl="0"/>
-            <a:r>
-              <a:rPr lang="en-GB" sz="4000" dirty="0"/>
-              <a:t>The system has to give the possibility to reserve a car at most by one user at a time;</a:t>
-            </a:r>
-            <a:endParaRPr lang="en-US" sz="4000" dirty="0"/>
-          </a:p>
-          <a:p>
-            <a:pPr lvl="0"/>
-            <a:r>
-              <a:rPr lang="en-GB" sz="4000" dirty="0"/>
-              <a:t>The system has to mark the reservation as expired for a car after one hour if the user has not picked it up;</a:t>
-            </a:r>
-            <a:endParaRPr lang="en-US" sz="4000" dirty="0"/>
-          </a:p>
-          <a:p>
-            <a:pPr lvl="0"/>
-            <a:r>
-              <a:rPr lang="en-GB" sz="4000" dirty="0"/>
-              <a:t>The system has to apply a fee of 1€ if the reservation has expired</a:t>
-            </a:r>
-            <a:r>
-              <a:rPr lang="en-GB" sz="4000" dirty="0" smtClean="0"/>
-              <a:t>;</a:t>
-            </a:r>
-            <a:endParaRPr lang="en-US" sz="4000" dirty="0"/>
+              <a:rPr lang="en-GB" dirty="0"/>
+              <a:t>The system has to unlock the car if the position of the user is really close to the one of the car;</a:t>
+            </a:r>
+            <a:endParaRPr lang="en-US" dirty="0"/>
+          </a:p>
+          <a:p>
+            <a:endParaRPr lang="en-US" dirty="0"/>
           </a:p>
         </p:txBody>
       </p:sp>
     </p:spTree>
     <p:extLst>
       <p:ext uri="{BB962C8B-B14F-4D97-AF65-F5344CB8AC3E}">
-        <p14:creationId xmlns:p14="http://schemas.microsoft.com/office/powerpoint/2010/main" val="3197795391"/>
+        <p14:creationId xmlns:p14="http://schemas.microsoft.com/office/powerpoint/2010/main" val="2344468054"/>
       </p:ext>
     </p:extLst>
   </p:cSld>
@@ -3396,7 +3379,7 @@
   <p:timing>
     <p:tnLst>
       <p:par>
-        <p:cTn xmlns:p14="http://schemas.microsoft.com/office/powerpoint/2010/main" id="1" dur="indefinite" restart="never" nodeType="tmRoot"/>
+        <p:cTn id="1" dur="indefinite" restart="never" nodeType="tmRoot"/>
       </p:par>
     </p:tnLst>
   </p:timing>
@@ -3437,7 +3420,11 @@
           <a:p>
             <a:r>
               <a:rPr lang="en-US" dirty="0" smtClean="0"/>
-              <a:t>Requirements (2)</a:t>
+              <a:t>Requirements (3, </a:t>
+            </a:r>
+            <a:r>
+              <a:rPr lang="is-IS" dirty="0" smtClean="0"/>
+              <a:t>…)</a:t>
             </a:r>
             <a:endParaRPr lang="en-US" dirty="0"/>
           </a:p>
@@ -3455,80 +3442,32 @@
         </p:nvSpPr>
         <p:spPr>
           <a:xfrm>
-            <a:off x="187606" y="1417638"/>
-            <a:ext cx="8730906" cy="4960555"/>
+            <a:off x="2621888" y="3015933"/>
+            <a:ext cx="3843311" cy="1111133"/>
           </a:xfrm>
         </p:spPr>
         <p:txBody>
           <a:bodyPr>
-            <a:normAutofit/>
+            <a:normAutofit lnSpcReduction="10000"/>
           </a:bodyPr>
           <a:lstStyle/>
           <a:p>
-            <a:pPr marL="0" indent="0">
-              <a:buNone/>
-            </a:pPr>
-            <a:r>
-              <a:rPr lang="en-GB" i="1" u="sng" dirty="0" smtClean="0"/>
-              <a:t>GOAL 2: </a:t>
-            </a:r>
-          </a:p>
-          <a:p>
-            <a:pPr marL="0" lvl="0" indent="0">
-              <a:buNone/>
-            </a:pPr>
-            <a:r>
-              <a:rPr lang="en-GB" i="1" u="sng" dirty="0" smtClean="0"/>
-              <a:t>Users </a:t>
-            </a:r>
-            <a:r>
-              <a:rPr lang="en-GB" i="1" u="sng" dirty="0"/>
-              <a:t>could get in a car only if they are </a:t>
-            </a:r>
-            <a:r>
-              <a:rPr lang="en-GB" i="1" u="sng" dirty="0" smtClean="0"/>
-              <a:t>near it </a:t>
-            </a:r>
-            <a:r>
-              <a:rPr lang="en-GB" i="1" u="sng" dirty="0"/>
-              <a:t>and they reserved </a:t>
-            </a:r>
-            <a:r>
-              <a:rPr lang="en-GB" i="1" u="sng" dirty="0" smtClean="0"/>
-              <a:t>it</a:t>
-            </a:r>
-            <a:r>
-              <a:rPr lang="en-GB" i="1" dirty="0" smtClean="0"/>
-              <a:t>.</a:t>
-            </a:r>
-          </a:p>
-          <a:p>
-            <a:pPr marL="0" lvl="0" indent="0">
-              <a:buNone/>
-            </a:pPr>
-            <a:r>
-              <a:rPr lang="en-GB" i="1" dirty="0" smtClean="0"/>
-              <a:t>REQUIREMENTS:</a:t>
-            </a:r>
-            <a:endParaRPr lang="en-US" dirty="0"/>
-          </a:p>
-          <a:p>
-            <a:pPr lvl="0"/>
-            <a:r>
-              <a:rPr lang="en-GB" dirty="0"/>
-              <a:t>The system has to be able to identify the location of the user and of the car;</a:t>
-            </a:r>
-            <a:endParaRPr lang="en-US" dirty="0"/>
-          </a:p>
-          <a:p>
-            <a:pPr lvl="0"/>
-            <a:r>
-              <a:rPr lang="en-GB" dirty="0"/>
-              <a:t>The system has to unlock the car if the position of the user is really close to the one of the car;</a:t>
-            </a:r>
-            <a:endParaRPr lang="en-US" dirty="0"/>
-          </a:p>
-          <a:p>
+            <a:pPr marL="0" indent="0" algn="ctr">
+              <a:buNone/>
+            </a:pPr>
+            <a:r>
+              <a:rPr lang="en-US" dirty="0" smtClean="0"/>
+              <a:t>They are too many!</a:t>
+            </a:r>
+          </a:p>
+          <a:p>
+            <a:pPr marL="0" indent="0" algn="ctr">
+              <a:buNone/>
+            </a:pPr>
+            <a:r>
+              <a:rPr lang="en-US" dirty="0" smtClean="0"/>
+              <a:t>The show must go on!</a:t>
+            </a:r>
             <a:endParaRPr lang="en-US" dirty="0"/>
           </a:p>
         </p:txBody>
@@ -3536,7 +3475,7 @@
     </p:spTree>
     <p:extLst>
       <p:ext uri="{BB962C8B-B14F-4D97-AF65-F5344CB8AC3E}">
-        <p14:creationId xmlns:p14="http://schemas.microsoft.com/office/powerpoint/2010/main" val="2344468054"/>
+        <p14:creationId xmlns:p14="http://schemas.microsoft.com/office/powerpoint/2010/main" val="1898661060"/>
       </p:ext>
     </p:extLst>
   </p:cSld>
@@ -3546,7 +3485,7 @@
   <p:timing>
     <p:tnLst>
       <p:par>
-        <p:cTn xmlns:p14="http://schemas.microsoft.com/office/powerpoint/2010/main" id="1" dur="indefinite" restart="never" nodeType="tmRoot"/>
+        <p:cTn id="1" dur="indefinite" restart="never" nodeType="tmRoot"/>
       </p:par>
     </p:tnLst>
   </p:timing>
@@ -3587,112 +3526,6 @@
           <a:p>
             <a:r>
               <a:rPr lang="en-US" dirty="0" smtClean="0"/>
-              <a:t>Requirements (3, </a:t>
-            </a:r>
-            <a:r>
-              <a:rPr lang="is-IS" dirty="0" smtClean="0"/>
-              <a:t>…)</a:t>
-            </a:r>
-            <a:endParaRPr lang="en-US" dirty="0"/>
-          </a:p>
-        </p:txBody>
-      </p:sp>
-      <p:sp>
-        <p:nvSpPr>
-          <p:cNvPr id="3" name="Content Placeholder 2"/>
-          <p:cNvSpPr>
-            <a:spLocks noGrp="1"/>
-          </p:cNvSpPr>
-          <p:nvPr>
-            <p:ph idx="1"/>
-          </p:nvPr>
-        </p:nvSpPr>
-        <p:spPr>
-          <a:xfrm>
-            <a:off x="2621888" y="3015933"/>
-            <a:ext cx="3843311" cy="1111133"/>
-          </a:xfrm>
-        </p:spPr>
-        <p:txBody>
-          <a:bodyPr>
-            <a:normAutofit lnSpcReduction="10000"/>
-          </a:bodyPr>
-          <a:lstStyle/>
-          <a:p>
-            <a:pPr marL="0" indent="0" algn="ctr">
-              <a:buNone/>
-            </a:pPr>
-            <a:r>
-              <a:rPr lang="en-US" dirty="0" smtClean="0"/>
-              <a:t>They are too many!</a:t>
-            </a:r>
-          </a:p>
-          <a:p>
-            <a:pPr marL="0" indent="0" algn="ctr">
-              <a:buNone/>
-            </a:pPr>
-            <a:r>
-              <a:rPr lang="en-US" dirty="0" smtClean="0"/>
-              <a:t>The show must go on!</a:t>
-            </a:r>
-            <a:endParaRPr lang="en-US" dirty="0"/>
-          </a:p>
-        </p:txBody>
-      </p:sp>
-    </p:spTree>
-    <p:extLst>
-      <p:ext uri="{BB962C8B-B14F-4D97-AF65-F5344CB8AC3E}">
-        <p14:creationId xmlns:p14="http://schemas.microsoft.com/office/powerpoint/2010/main" val="1898661060"/>
-      </p:ext>
-    </p:extLst>
-  </p:cSld>
-  <p:clrMapOvr>
-    <a:masterClrMapping/>
-  </p:clrMapOvr>
-  <p:timing>
-    <p:tnLst>
-      <p:par>
-        <p:cTn xmlns:p14="http://schemas.microsoft.com/office/powerpoint/2010/main" id="1" dur="indefinite" restart="never" nodeType="tmRoot"/>
-      </p:par>
-    </p:tnLst>
-  </p:timing>
-</p:sld>
-</file>
-
-<file path=ppt/slides/slide13.xml><?xml version="1.0" encoding="utf-8"?>
-<p:sld xmlns:a="http://schemas.openxmlformats.org/drawingml/2006/main" xmlns:r="http://schemas.openxmlformats.org/officeDocument/2006/relationships" xmlns:p="http://schemas.openxmlformats.org/presentationml/2006/main">
-  <p:cSld>
-    <p:spTree>
-      <p:nvGrpSpPr>
-        <p:cNvPr id="1" name=""/>
-        <p:cNvGrpSpPr/>
-        <p:nvPr/>
-      </p:nvGrpSpPr>
-      <p:grpSpPr>
-        <a:xfrm>
-          <a:off x="0" y="0"/>
-          <a:ext cx="0" cy="0"/>
-          <a:chOff x="0" y="0"/>
-          <a:chExt cx="0" cy="0"/>
-        </a:xfrm>
-      </p:grpSpPr>
-      <p:sp>
-        <p:nvSpPr>
-          <p:cNvPr id="2" name="Title 1"/>
-          <p:cNvSpPr>
-            <a:spLocks noGrp="1"/>
-          </p:cNvSpPr>
-          <p:nvPr>
-            <p:ph type="title"/>
-          </p:nvPr>
-        </p:nvSpPr>
-        <p:spPr/>
-        <p:txBody>
-          <a:bodyPr/>
-          <a:lstStyle/>
-          <a:p>
-            <a:r>
-              <a:rPr lang="en-US" dirty="0" smtClean="0"/>
               <a:t>Roadmap</a:t>
             </a:r>
             <a:endParaRPr lang="en-US" dirty="0"/>
@@ -3784,14 +3617,14 @@
   <p:timing>
     <p:tnLst>
       <p:par>
-        <p:cTn xmlns:p14="http://schemas.microsoft.com/office/powerpoint/2010/main" id="1" dur="indefinite" restart="never" nodeType="tmRoot"/>
+        <p:cTn id="1" dur="indefinite" restart="never" nodeType="tmRoot"/>
       </p:par>
     </p:tnLst>
   </p:timing>
 </p:sld>
 </file>
 
-<file path=ppt/slides/slide14.xml><?xml version="1.0" encoding="utf-8"?>
+<file path=ppt/slides/slide13.xml><?xml version="1.0" encoding="utf-8"?>
 <p:sld xmlns:a="http://schemas.openxmlformats.org/drawingml/2006/main" xmlns:r="http://schemas.openxmlformats.org/officeDocument/2006/relationships" xmlns:p="http://schemas.openxmlformats.org/presentationml/2006/main">
   <p:cSld>
     <p:spTree>
@@ -3874,7 +3707,144 @@
   <p:timing>
     <p:tnLst>
       <p:par>
-        <p:cTn xmlns:p14="http://schemas.microsoft.com/office/powerpoint/2010/main" id="1" dur="indefinite" restart="never" nodeType="tmRoot"/>
+        <p:cTn id="1" dur="indefinite" restart="never" nodeType="tmRoot"/>
+      </p:par>
+    </p:tnLst>
+  </p:timing>
+</p:sld>
+</file>
+
+<file path=ppt/slides/slide14.xml><?xml version="1.0" encoding="utf-8"?>
+<p:sld xmlns:a="http://schemas.openxmlformats.org/drawingml/2006/main" xmlns:r="http://schemas.openxmlformats.org/officeDocument/2006/relationships" xmlns:p="http://schemas.openxmlformats.org/presentationml/2006/main">
+  <p:cSld>
+    <p:spTree>
+      <p:nvGrpSpPr>
+        <p:cNvPr id="1" name=""/>
+        <p:cNvGrpSpPr/>
+        <p:nvPr/>
+      </p:nvGrpSpPr>
+      <p:grpSpPr>
+        <a:xfrm>
+          <a:off x="0" y="0"/>
+          <a:ext cx="0" cy="0"/>
+          <a:chOff x="0" y="0"/>
+          <a:chExt cx="0" cy="0"/>
+        </a:xfrm>
+      </p:grpSpPr>
+      <p:sp>
+        <p:nvSpPr>
+          <p:cNvPr id="2" name="Title 1"/>
+          <p:cNvSpPr>
+            <a:spLocks noGrp="1"/>
+          </p:cNvSpPr>
+          <p:nvPr>
+            <p:ph type="title"/>
+          </p:nvPr>
+        </p:nvSpPr>
+        <p:spPr/>
+        <p:txBody>
+          <a:bodyPr/>
+          <a:lstStyle/>
+          <a:p>
+            <a:r>
+              <a:rPr lang="en-US" dirty="0" smtClean="0"/>
+              <a:t>Roadmap</a:t>
+            </a:r>
+            <a:endParaRPr lang="en-US" dirty="0"/>
+          </a:p>
+        </p:txBody>
+      </p:sp>
+      <p:sp>
+        <p:nvSpPr>
+          <p:cNvPr id="3" name="Content Placeholder 2"/>
+          <p:cNvSpPr>
+            <a:spLocks noGrp="1"/>
+          </p:cNvSpPr>
+          <p:nvPr>
+            <p:ph idx="1"/>
+          </p:nvPr>
+        </p:nvSpPr>
+        <p:spPr/>
+        <p:txBody>
+          <a:bodyPr/>
+          <a:lstStyle/>
+          <a:p>
+            <a:r>
+              <a:rPr lang="en-US" dirty="0" smtClean="0">
+                <a:solidFill>
+                  <a:srgbClr val="A6A6A6"/>
+                </a:solidFill>
+              </a:rPr>
+              <a:t>Text assumptions</a:t>
+            </a:r>
+          </a:p>
+          <a:p>
+            <a:r>
+              <a:rPr lang="en-US" dirty="0" smtClean="0">
+                <a:solidFill>
+                  <a:srgbClr val="A6A6A6"/>
+                </a:solidFill>
+              </a:rPr>
+              <a:t>Goals, Domain properties, Requirements</a:t>
+            </a:r>
+          </a:p>
+          <a:p>
+            <a:r>
+              <a:rPr lang="en-US" dirty="0" smtClean="0">
+                <a:solidFill>
+                  <a:srgbClr val="A6A6A6"/>
+                </a:solidFill>
+              </a:rPr>
+              <a:t>Proposed system</a:t>
+            </a:r>
+          </a:p>
+          <a:p>
+            <a:r>
+              <a:rPr lang="en-US" dirty="0" smtClean="0"/>
+              <a:t>Actors and </a:t>
+            </a:r>
+            <a:r>
+              <a:rPr lang="en-US" dirty="0" smtClean="0"/>
+              <a:t>sequence diagram</a:t>
+            </a:r>
+            <a:endParaRPr lang="en-US" dirty="0" smtClean="0"/>
+          </a:p>
+          <a:p>
+            <a:r>
+              <a:rPr lang="en-US" dirty="0" smtClean="0">
+                <a:solidFill>
+                  <a:srgbClr val="A6A6A6"/>
+                </a:solidFill>
+              </a:rPr>
+              <a:t>Alloy</a:t>
+            </a:r>
+          </a:p>
+          <a:p>
+            <a:r>
+              <a:rPr lang="en-US" dirty="0" smtClean="0">
+                <a:solidFill>
+                  <a:srgbClr val="A6A6A6"/>
+                </a:solidFill>
+              </a:rPr>
+              <a:t>Future Development</a:t>
+            </a:r>
+          </a:p>
+        </p:txBody>
+      </p:sp>
+    </p:spTree>
+    <p:extLst>
+      <p:ext uri="{BB962C8B-B14F-4D97-AF65-F5344CB8AC3E}">
+        <p14:creationId xmlns:p14="http://schemas.microsoft.com/office/powerpoint/2010/main" val="4292947347"/>
+      </p:ext>
+    </p:extLst>
+  </p:cSld>
+  <p:clrMapOvr>
+    <a:masterClrMapping/>
+  </p:clrMapOvr>
+  <p:timing>
+    <p:tnLst>
+      <p:par>
+        <p:cTn id="1" dur="indefinite" restart="never" nodeType="tmRoot"/>
       </p:par>
     </p:tnLst>
   </p:timing>
@@ -3910,12 +3880,21 @@
         </p:nvSpPr>
         <p:spPr/>
         <p:txBody>
-          <a:bodyPr/>
+          <a:bodyPr>
+            <a:normAutofit fontScale="90000"/>
+          </a:bodyPr>
           <a:lstStyle/>
           <a:p>
             <a:r>
               <a:rPr lang="en-US" dirty="0" smtClean="0"/>
-              <a:t>Roadmap</a:t>
+              <a:t>Actors and use case diagram:</a:t>
+            </a:r>
+            <a:br>
+              <a:rPr lang="en-US" dirty="0" smtClean="0"/>
+            </a:br>
+            <a:r>
+              <a:rPr lang="en-US" dirty="0" smtClean="0"/>
+              <a:t>actors</a:t>
             </a:r>
             <a:endParaRPr lang="en-US" dirty="0"/>
           </a:p>
@@ -3933,70 +3912,77 @@
         </p:nvSpPr>
         <p:spPr/>
         <p:txBody>
-          <a:bodyPr/>
-          <a:lstStyle/>
-          <a:p>
+          <a:bodyPr>
+            <a:normAutofit fontScale="92500" lnSpcReduction="20000"/>
+          </a:bodyPr>
+          <a:lstStyle/>
+          <a:p>
+            <a:pPr lvl="0"/>
+            <a:r>
+              <a:rPr lang="en-GB" i="1" u="sng" dirty="0"/>
+              <a:t>User</a:t>
+            </a:r>
+            <a:r>
+              <a:rPr lang="en-GB" dirty="0"/>
+              <a:t>: a person that has already registered and so has provided his personal information and payment method.</a:t>
+            </a:r>
+            <a:endParaRPr lang="en-US" dirty="0"/>
+          </a:p>
+          <a:p>
+            <a:pPr lvl="0"/>
+            <a:r>
+              <a:rPr lang="en-GB" i="1" u="sng" dirty="0"/>
+              <a:t>Guest</a:t>
+            </a:r>
+            <a:r>
+              <a:rPr lang="en-GB" dirty="0"/>
+              <a:t>: a person that has not registered and can only perform basic functionalities such as looking for where safe areas </a:t>
+            </a:r>
+            <a:r>
+              <a:rPr lang="en-GB" dirty="0" smtClean="0"/>
+              <a:t>are.</a:t>
+            </a:r>
+            <a:endParaRPr lang="en-US" dirty="0" smtClean="0"/>
+          </a:p>
+          <a:p>
+            <a:pPr lvl="0"/>
+            <a:r>
+              <a:rPr lang="en-GB" i="1" u="sng" dirty="0" smtClean="0"/>
+              <a:t>Payment </a:t>
+            </a:r>
+            <a:r>
+              <a:rPr lang="en-GB" i="1" u="sng" dirty="0"/>
+              <a:t>handler</a:t>
+            </a:r>
+            <a:r>
+              <a:rPr lang="en-GB" dirty="0"/>
+              <a:t>: an external service that helps our system with all tasks related to the payments;</a:t>
+            </a:r>
+            <a:endParaRPr lang="en-US" dirty="0"/>
+          </a:p>
+          <a:p>
+            <a:r>
+              <a:rPr lang="en-GB" i="1" u="sng" dirty="0"/>
+              <a:t>Search-on-map handler</a:t>
+            </a:r>
+            <a:r>
+              <a:rPr lang="en-GB" dirty="0"/>
+              <a:t>: an external service that helps our system with all tasks related to the use of maps;</a:t>
+            </a:r>
             <a:r>
               <a:rPr lang="en-US" dirty="0" smtClean="0">
-                <a:solidFill>
-                  <a:srgbClr val="A6A6A6"/>
-                </a:solidFill>
+                <a:effectLst/>
               </a:rPr>
-              <a:t>Text assumptions</a:t>
-            </a:r>
-          </a:p>
-          <a:p>
-            <a:r>
-              <a:rPr lang="en-US" dirty="0" smtClean="0">
-                <a:solidFill>
-                  <a:srgbClr val="A6A6A6"/>
-                </a:solidFill>
-              </a:rPr>
-              <a:t>Goals, Domain properties, Requirements</a:t>
-            </a:r>
-          </a:p>
-          <a:p>
-            <a:r>
-              <a:rPr lang="en-US" dirty="0" smtClean="0">
-                <a:solidFill>
-                  <a:srgbClr val="A6A6A6"/>
-                </a:solidFill>
-              </a:rPr>
-              <a:t>Proposed system</a:t>
-            </a:r>
-          </a:p>
-          <a:p>
-            <a:r>
-              <a:rPr lang="en-US" dirty="0" smtClean="0"/>
-              <a:t>Actors and use case diagram</a:t>
-            </a:r>
-          </a:p>
-          <a:p>
-            <a:r>
-              <a:rPr lang="en-US" dirty="0" smtClean="0">
-                <a:solidFill>
-                  <a:srgbClr val="A6A6A6"/>
-                </a:solidFill>
-              </a:rPr>
-              <a:t>Alloy</a:t>
-            </a:r>
-          </a:p>
-          <a:p>
-            <a:r>
-              <a:rPr lang="en-US" dirty="0" smtClean="0">
-                <a:solidFill>
-                  <a:srgbClr val="A6A6A6"/>
-                </a:solidFill>
-              </a:rPr>
-              <a:t>Future Development</a:t>
-            </a:r>
+              <a:t> </a:t>
+            </a:r>
+            <a:endParaRPr lang="en-US" dirty="0"/>
           </a:p>
         </p:txBody>
       </p:sp>
     </p:spTree>
     <p:extLst>
       <p:ext uri="{BB962C8B-B14F-4D97-AF65-F5344CB8AC3E}">
-        <p14:creationId xmlns:p14="http://schemas.microsoft.com/office/powerpoint/2010/main" val="4292947347"/>
+        <p14:creationId xmlns:p14="http://schemas.microsoft.com/office/powerpoint/2010/main" val="1229237515"/>
       </p:ext>
     </p:extLst>
   </p:cSld>
@@ -4006,7 +3992,7 @@
   <p:timing>
     <p:tnLst>
       <p:par>
-        <p:cTn xmlns:p14="http://schemas.microsoft.com/office/powerpoint/2010/main" id="1" dur="indefinite" restart="never" nodeType="tmRoot"/>
+        <p:cTn id="1" dur="indefinite" restart="never" nodeType="tmRoot"/>
       </p:par>
     </p:tnLst>
   </p:timing>
@@ -4049,102 +4035,55 @@
           <a:p>
             <a:r>
               <a:rPr lang="en-US" dirty="0" smtClean="0"/>
-              <a:t>Actors and use case diagram:</a:t>
+              <a:t>Actors and Sequence Diagram:</a:t>
+            </a:r>
+            <a:r>
+              <a:rPr lang="en-US" dirty="0" smtClean="0"/>
+              <a:t/>
             </a:r>
             <a:br>
               <a:rPr lang="en-US" dirty="0" smtClean="0"/>
             </a:br>
             <a:r>
               <a:rPr lang="en-US" dirty="0" smtClean="0"/>
-              <a:t>actors</a:t>
-            </a:r>
-            <a:endParaRPr lang="en-US" dirty="0"/>
-          </a:p>
-        </p:txBody>
-      </p:sp>
-      <p:sp>
-        <p:nvSpPr>
-          <p:cNvPr id="3" name="Content Placeholder 2"/>
-          <p:cNvSpPr>
-            <a:spLocks noGrp="1"/>
-          </p:cNvSpPr>
+              <a:t>Show Special Safe Areas(1)</a:t>
+            </a:r>
+            <a:endParaRPr lang="en-US" dirty="0"/>
+          </a:p>
+        </p:txBody>
+      </p:sp>
+      <p:pic>
+        <p:nvPicPr>
+          <p:cNvPr id="4" name="Segnaposto contenuto 3"/>
+          <p:cNvPicPr>
+            <a:picLocks noGrp="1" noChangeAspect="1"/>
+          </p:cNvPicPr>
           <p:nvPr>
             <p:ph idx="1"/>
           </p:nvPr>
-        </p:nvSpPr>
-        <p:spPr/>
-        <p:txBody>
-          <a:bodyPr>
-            <a:normAutofit fontScale="85000" lnSpcReduction="10000"/>
-          </a:bodyPr>
-          <a:lstStyle/>
-          <a:p>
-            <a:pPr lvl="0"/>
-            <a:r>
-              <a:rPr lang="en-GB" i="1" u="sng" dirty="0"/>
-              <a:t>User</a:t>
-            </a:r>
-            <a:r>
-              <a:rPr lang="en-GB" dirty="0"/>
-              <a:t>: a person that has already registered and so has provided his personal information and payment method.</a:t>
-            </a:r>
-            <a:endParaRPr lang="en-US" dirty="0"/>
-          </a:p>
-          <a:p>
-            <a:pPr lvl="0"/>
-            <a:r>
-              <a:rPr lang="en-GB" i="1" u="sng" dirty="0"/>
-              <a:t>Guest</a:t>
-            </a:r>
-            <a:r>
-              <a:rPr lang="en-GB" dirty="0"/>
-              <a:t>: a person that has not registered and can only perform basic functionalities such as looking for where safe areas </a:t>
-            </a:r>
-            <a:r>
-              <a:rPr lang="en-GB" dirty="0" smtClean="0"/>
-              <a:t>are.</a:t>
-            </a:r>
-            <a:endParaRPr lang="en-US" dirty="0" smtClean="0"/>
-          </a:p>
-          <a:p>
-            <a:pPr lvl="0"/>
-            <a:r>
-              <a:rPr lang="en-GB" i="1" u="sng" dirty="0" smtClean="0"/>
-              <a:t>Payment </a:t>
-            </a:r>
-            <a:r>
-              <a:rPr lang="en-GB" i="1" u="sng" dirty="0"/>
-              <a:t>handler</a:t>
-            </a:r>
-            <a:r>
-              <a:rPr lang="en-GB" dirty="0"/>
-              <a:t>: an external service that helps our system with all tasks related to the payments;</a:t>
-            </a:r>
-            <a:endParaRPr lang="en-US" dirty="0"/>
-          </a:p>
-          <a:p>
-            <a:r>
-              <a:rPr lang="en-GB" i="1" u="sng" dirty="0"/>
-              <a:t>Search-on-map handler</a:t>
-            </a:r>
-            <a:r>
-              <a:rPr lang="en-GB" dirty="0"/>
-              <a:t>: an external service that helps our system with all tasks related to the use of maps;</a:t>
-            </a:r>
-            <a:r>
-              <a:rPr lang="en-US" dirty="0" smtClean="0">
-                <a:effectLst/>
-              </a:rPr>
-              <a:t> </a:t>
-            </a:r>
-            <a:endParaRPr lang="en-US" dirty="0"/>
-          </a:p>
-        </p:txBody>
-      </p:sp>
+        </p:nvPicPr>
+        <p:blipFill rotWithShape="1">
+          <a:blip r:embed="rId2">
+            <a:extLst>
+              <a:ext uri="{28A0092B-C50C-407E-A947-70E740481C1C}">
+                <a14:useLocalDpi xmlns:a14="http://schemas.microsoft.com/office/drawing/2010/main" val="0"/>
+              </a:ext>
+            </a:extLst>
+          </a:blip>
+          <a:srcRect l="-2305" t="1305" r="-1468" b="56964"/>
+          <a:stretch/>
+        </p:blipFill>
+        <p:spPr>
+          <a:xfrm>
+            <a:off x="122437" y="1838392"/>
+            <a:ext cx="8492646" cy="4824617"/>
+          </a:xfrm>
+        </p:spPr>
+      </p:pic>
     </p:spTree>
     <p:extLst>
       <p:ext uri="{BB962C8B-B14F-4D97-AF65-F5344CB8AC3E}">
-        <p14:creationId xmlns:p14="http://schemas.microsoft.com/office/powerpoint/2010/main" val="1229237515"/>
+        <p14:creationId xmlns:p14="http://schemas.microsoft.com/office/powerpoint/2010/main" val="3528780487"/>
       </p:ext>
     </p:extLst>
   </p:cSld>
@@ -4154,7 +4093,7 @@
   <p:timing>
     <p:tnLst>
       <p:par>
-        <p:cTn xmlns:p14="http://schemas.microsoft.com/office/powerpoint/2010/main" id="1" dur="indefinite" restart="never" nodeType="tmRoot"/>
+        <p:cTn id="1" dur="indefinite" restart="never" nodeType="tmRoot"/>
       </p:par>
     </p:tnLst>
   </p:timing>
@@ -4197,46 +4136,55 @@
           <a:p>
             <a:r>
               <a:rPr lang="en-US" dirty="0" smtClean="0"/>
-              <a:t>Actors and use case diagram:</a:t>
+              <a:t>Actors and Sequence Diagram:</a:t>
+            </a:r>
+            <a:r>
+              <a:rPr lang="en-US" dirty="0" smtClean="0"/>
+              <a:t/>
             </a:r>
             <a:br>
               <a:rPr lang="en-US" dirty="0" smtClean="0"/>
             </a:br>
             <a:r>
               <a:rPr lang="en-US" dirty="0" smtClean="0"/>
-              <a:t>use case diagram</a:t>
-            </a:r>
-            <a:endParaRPr lang="en-US" dirty="0"/>
-          </a:p>
-        </p:txBody>
-      </p:sp>
-      <p:sp>
-        <p:nvSpPr>
-          <p:cNvPr id="3" name="Content Placeholder 2"/>
-          <p:cNvSpPr>
-            <a:spLocks noGrp="1"/>
-          </p:cNvSpPr>
+              <a:t>Show Special Safe Areas(2)</a:t>
+            </a:r>
+            <a:endParaRPr lang="en-US" dirty="0"/>
+          </a:p>
+        </p:txBody>
+      </p:sp>
+      <p:pic>
+        <p:nvPicPr>
+          <p:cNvPr id="5" name="Segnaposto contenuto 4"/>
+          <p:cNvPicPr>
+            <a:picLocks noGrp="1" noChangeAspect="1"/>
+          </p:cNvPicPr>
           <p:nvPr>
             <p:ph idx="1"/>
           </p:nvPr>
-        </p:nvSpPr>
-        <p:spPr/>
-        <p:txBody>
-          <a:bodyPr/>
-          <a:lstStyle/>
-          <a:p>
-            <a:r>
-              <a:rPr lang="en-US" dirty="0" smtClean="0"/>
-              <a:t>Use case diagram? LOL</a:t>
-            </a:r>
-            <a:endParaRPr lang="en-US" dirty="0"/>
-          </a:p>
-        </p:txBody>
-      </p:sp>
+        </p:nvPicPr>
+        <p:blipFill rotWithShape="1">
+          <a:blip r:embed="rId2">
+            <a:extLst>
+              <a:ext uri="{28A0092B-C50C-407E-A947-70E740481C1C}">
+                <a14:useLocalDpi xmlns:a14="http://schemas.microsoft.com/office/drawing/2010/main" val="0"/>
+              </a:ext>
+            </a:extLst>
+          </a:blip>
+          <a:srcRect l="-88" t="42289" r="3270" b="26020"/>
+          <a:stretch/>
+        </p:blipFill>
+        <p:spPr>
+          <a:xfrm>
+            <a:off x="242047" y="2366681"/>
+            <a:ext cx="8975799" cy="4150659"/>
+          </a:xfrm>
+        </p:spPr>
+      </p:pic>
     </p:spTree>
     <p:extLst>
       <p:ext uri="{BB962C8B-B14F-4D97-AF65-F5344CB8AC3E}">
-        <p14:creationId xmlns:p14="http://schemas.microsoft.com/office/powerpoint/2010/main" val="3528780487"/>
+        <p14:creationId xmlns:p14="http://schemas.microsoft.com/office/powerpoint/2010/main" val="1157880905"/>
       </p:ext>
     </p:extLst>
   </p:cSld>
@@ -4246,7 +4194,7 @@
   <p:timing>
     <p:tnLst>
       <p:par>
-        <p:cTn xmlns:p14="http://schemas.microsoft.com/office/powerpoint/2010/main" id="1" dur="indefinite" restart="never" nodeType="tmRoot"/>
+        <p:cTn id="1" dur="indefinite" restart="never" nodeType="tmRoot"/>
       </p:par>
     </p:tnLst>
   </p:timing>
@@ -4378,7 +4326,7 @@
   <p:timing>
     <p:tnLst>
       <p:par>
-        <p:cTn xmlns:p14="http://schemas.microsoft.com/office/powerpoint/2010/main" id="1" dur="indefinite" restart="never" nodeType="tmRoot"/>
+        <p:cTn id="1" dur="indefinite" restart="never" nodeType="tmRoot"/>
       </p:par>
     </p:tnLst>
   </p:timing>
@@ -4445,7 +4393,7 @@
   <p:timing>
     <p:tnLst>
       <p:par>
-        <p:cTn xmlns:p14="http://schemas.microsoft.com/office/powerpoint/2010/main" id="1" dur="indefinite" restart="never" nodeType="tmRoot"/>
+        <p:cTn id="1" dur="indefinite" restart="never" nodeType="tmRoot"/>
       </p:par>
     </p:tnLst>
   </p:timing>
@@ -4557,7 +4505,7 @@
   <p:timing>
     <p:tnLst>
       <p:par>
-        <p:cTn xmlns:p14="http://schemas.microsoft.com/office/powerpoint/2010/main" id="1" dur="indefinite" restart="never" nodeType="tmRoot"/>
+        <p:cTn id="1" dur="indefinite" restart="never" nodeType="tmRoot"/>
       </p:par>
     </p:tnLst>
   </p:timing>
@@ -4624,7 +4572,7 @@
   <p:timing>
     <p:tnLst>
       <p:par>
-        <p:cTn xmlns:p14="http://schemas.microsoft.com/office/powerpoint/2010/main" id="1" dur="indefinite" restart="never" nodeType="tmRoot"/>
+        <p:cTn id="1" dur="indefinite" restart="never" nodeType="tmRoot"/>
       </p:par>
     </p:tnLst>
   </p:timing>
@@ -4842,7 +4790,7 @@
   <p:timing>
     <p:tnLst>
       <p:par>
-        <p:cTn xmlns:p14="http://schemas.microsoft.com/office/powerpoint/2010/main" id="1" dur="indefinite" restart="never" nodeType="tmRoot"/>
+        <p:cTn id="1" dur="indefinite" restart="never" nodeType="tmRoot"/>
       </p:par>
     </p:tnLst>
   </p:timing>
@@ -5108,7 +5056,7 @@
   <p:timing>
     <p:tnLst>
       <p:par>
-        <p:cTn xmlns:p14="http://schemas.microsoft.com/office/powerpoint/2010/main" id="1" dur="indefinite" restart="never" nodeType="tmRoot"/>
+        <p:cTn id="1" dur="indefinite" restart="never" nodeType="tmRoot"/>
       </p:par>
     </p:tnLst>
   </p:timing>
@@ -5448,7 +5396,7 @@
   <p:timing>
     <p:tnLst>
       <p:par>
-        <p:cTn xmlns:p14="http://schemas.microsoft.com/office/powerpoint/2010/main" id="1" dur="indefinite" restart="never" nodeType="tmRoot"/>
+        <p:cTn id="1" dur="indefinite" restart="never" nodeType="tmRoot"/>
       </p:par>
     </p:tnLst>
   </p:timing>
@@ -5876,7 +5824,7 @@
   <p:timing>
     <p:tnLst>
       <p:par>
-        <p:cTn xmlns:p14="http://schemas.microsoft.com/office/powerpoint/2010/main" id="1" dur="indefinite" restart="never" nodeType="tmRoot"/>
+        <p:cTn id="1" dur="indefinite" restart="never" nodeType="tmRoot"/>
       </p:par>
     </p:tnLst>
   </p:timing>
@@ -6096,7 +6044,7 @@
   <p:timing>
     <p:tnLst>
       <p:par>
-        <p:cTn xmlns:p14="http://schemas.microsoft.com/office/powerpoint/2010/main" id="1" dur="indefinite" restart="never" nodeType="tmRoot"/>
+        <p:cTn id="1" dur="indefinite" restart="never" nodeType="tmRoot"/>
       </p:par>
     </p:tnLst>
   </p:timing>
@@ -6377,7 +6325,7 @@
   <p:timing>
     <p:tnLst>
       <p:par>
-        <p:cTn xmlns:p14="http://schemas.microsoft.com/office/powerpoint/2010/main" id="1" dur="indefinite" restart="never" nodeType="tmRoot"/>
+        <p:cTn id="1" dur="indefinite" restart="never" nodeType="tmRoot"/>
       </p:par>
     </p:tnLst>
   </p:timing>
@@ -6897,7 +6845,7 @@
   <p:timing>
     <p:tnLst>
       <p:par>
-        <p:cTn xmlns:p14="http://schemas.microsoft.com/office/powerpoint/2010/main" id="1" dur="indefinite" restart="never" nodeType="tmRoot"/>
+        <p:cTn id="1" dur="indefinite" restart="never" nodeType="tmRoot"/>
       </p:par>
     </p:tnLst>
   </p:timing>
@@ -7325,7 +7273,7 @@
   <p:timing>
     <p:tnLst>
       <p:par>
-        <p:cTn xmlns:p14="http://schemas.microsoft.com/office/powerpoint/2010/main" id="1" dur="indefinite" restart="never" nodeType="tmRoot"/>
+        <p:cTn id="1" dur="indefinite" restart="never" nodeType="tmRoot"/>
       </p:par>
     </p:tnLst>
   </p:timing>
@@ -7721,7 +7669,7 @@
   <p:timing>
     <p:tnLst>
       <p:par>
-        <p:cTn xmlns:p14="http://schemas.microsoft.com/office/powerpoint/2010/main" id="1" dur="indefinite" restart="never" nodeType="tmRoot"/>
+        <p:cTn id="1" dur="indefinite" restart="never" nodeType="tmRoot"/>
       </p:par>
     </p:tnLst>
   </p:timing>
@@ -7861,7 +7809,7 @@
   <p:timing>
     <p:tnLst>
       <p:par>
-        <p:cTn xmlns:p14="http://schemas.microsoft.com/office/powerpoint/2010/main" id="1" dur="indefinite" restart="never" nodeType="tmRoot"/>
+        <p:cTn id="1" dur="indefinite" restart="never" nodeType="tmRoot"/>
       </p:par>
     </p:tnLst>
   </p:timing>
@@ -8219,7 +8167,7 @@
   <p:timing>
     <p:tnLst>
       <p:par>
-        <p:cTn xmlns:p14="http://schemas.microsoft.com/office/powerpoint/2010/main" id="1" dur="indefinite" restart="never" nodeType="tmRoot"/>
+        <p:cTn id="1" dur="indefinite" restart="never" nodeType="tmRoot"/>
       </p:par>
     </p:tnLst>
   </p:timing>
@@ -8320,7 +8268,7 @@
   <p:timing>
     <p:tnLst>
       <p:par>
-        <p:cTn xmlns:p14="http://schemas.microsoft.com/office/powerpoint/2010/main" id="1" dur="indefinite" restart="never" nodeType="tmRoot"/>
+        <p:cTn id="1" dur="indefinite" restart="never" nodeType="tmRoot"/>
       </p:par>
     </p:tnLst>
   </p:timing>
@@ -8471,7 +8419,7 @@
   <p:timing>
     <p:tnLst>
       <p:par>
-        <p:cTn xmlns:p14="http://schemas.microsoft.com/office/powerpoint/2010/main" id="1" dur="indefinite" restart="never" nodeType="tmRoot"/>
+        <p:cTn id="1" dur="indefinite" restart="never" nodeType="tmRoot"/>
       </p:par>
     </p:tnLst>
   </p:timing>
@@ -8603,7 +8551,7 @@
   <p:timing>
     <p:tnLst>
       <p:par>
-        <p:cTn xmlns:p14="http://schemas.microsoft.com/office/powerpoint/2010/main" id="1" dur="indefinite" restart="never" nodeType="tmRoot"/>
+        <p:cTn id="1" dur="indefinite" restart="never" nodeType="tmRoot"/>
       </p:par>
     </p:tnLst>
   </p:timing>
@@ -8663,9 +8611,44 @@
         <p:spPr/>
         <p:txBody>
           <a:bodyPr>
-            <a:normAutofit lnSpcReduction="10000"/>
+            <a:normAutofit fontScale="85000" lnSpcReduction="10000"/>
           </a:bodyPr>
           <a:lstStyle/>
+          <a:p>
+            <a:pPr lvl="0"/>
+            <a:r>
+              <a:rPr lang="en-GB" dirty="0" smtClean="0"/>
+              <a:t>Remove the </a:t>
+            </a:r>
+            <a:r>
+              <a:rPr lang="en-GB" dirty="0"/>
+              <a:t>assumption </a:t>
+            </a:r>
+            <a:r>
+              <a:rPr lang="en-GB" dirty="0" smtClean="0"/>
+              <a:t>“In </a:t>
+            </a:r>
+            <a:r>
+              <a:rPr lang="en-GB" dirty="0"/>
+              <a:t>a special parking area with power grid stations there is always space for a car to be plugged </a:t>
+            </a:r>
+            <a:r>
+              <a:rPr lang="en-GB" dirty="0" smtClean="0"/>
+              <a:t>in”;</a:t>
+            </a:r>
+            <a:endParaRPr lang="en-US" dirty="0"/>
+          </a:p>
+          <a:p>
+            <a:r>
+              <a:rPr lang="en-GB" dirty="0"/>
+              <a:t>Add a web site (create desktop front-end with the help of the mobile front-end</a:t>
+            </a:r>
+            <a:r>
+              <a:rPr lang="en-GB" dirty="0" smtClean="0"/>
+              <a:t>);</a:t>
+            </a:r>
+            <a:endParaRPr lang="en-GB" dirty="0" smtClean="0"/>
+          </a:p>
           <a:p>
             <a:pPr lvl="0"/>
             <a:r>
@@ -8689,16 +8672,12 @@
           <a:p>
             <a:pPr lvl="0"/>
             <a:r>
+              <a:rPr lang="en-GB" dirty="0" smtClean="0"/>
+              <a:t>Different </a:t>
+            </a:r>
+            <a:r>
               <a:rPr lang="en-GB" dirty="0"/>
-              <a:t>Add a web site (create desktop front-end with the help of the mobile front-end);</a:t>
-            </a:r>
-            <a:endParaRPr lang="en-US" dirty="0"/>
-          </a:p>
-          <a:p>
-            <a:pPr lvl="0"/>
-            <a:r>
-              <a:rPr lang="en-GB" dirty="0"/>
-              <a:t>Different type of cars and different fees for them;</a:t>
+              <a:t>type of cars and different fees for them;</a:t>
             </a:r>
             <a:endParaRPr lang="en-US" dirty="0"/>
           </a:p>
@@ -8736,7 +8715,7 @@
   <p:timing>
     <p:tnLst>
       <p:par>
-        <p:cTn xmlns:p14="http://schemas.microsoft.com/office/powerpoint/2010/main" id="1" dur="indefinite" restart="never" nodeType="tmRoot"/>
+        <p:cTn id="1" dur="indefinite" restart="never" nodeType="tmRoot"/>
       </p:par>
     </p:tnLst>
   </p:timing>
@@ -8818,7 +8797,7 @@
   <p:timing>
     <p:tnLst>
       <p:par>
-        <p:cTn xmlns:p14="http://schemas.microsoft.com/office/powerpoint/2010/main" id="1" dur="indefinite" restart="never" nodeType="tmRoot"/>
+        <p:cTn id="1" dur="indefinite" restart="never" nodeType="tmRoot"/>
       </p:par>
     </p:tnLst>
   </p:timing>
@@ -8859,7 +8838,11 @@
           <a:p>
             <a:r>
               <a:rPr lang="en-US" dirty="0" smtClean="0"/>
-              <a:t>Text assumptions (1)</a:t>
+              <a:t>Text </a:t>
+            </a:r>
+            <a:r>
+              <a:rPr lang="en-US" dirty="0" smtClean="0"/>
+              <a:t>assumptions</a:t>
             </a:r>
             <a:endParaRPr lang="en-US" dirty="0"/>
           </a:p>
@@ -8878,7 +8861,7 @@
         <p:spPr/>
         <p:txBody>
           <a:bodyPr>
-            <a:normAutofit fontScale="85000" lnSpcReduction="10000"/>
+            <a:normAutofit fontScale="70000" lnSpcReduction="20000"/>
           </a:bodyPr>
           <a:lstStyle/>
           <a:p>
@@ -8888,36 +8871,74 @@
             </a:r>
             <a:r>
               <a:rPr lang="en-GB" dirty="0" smtClean="0"/>
-              <a:t>the reservation expires after one hour if the user doesn’t pickup the car in time;</a:t>
-            </a:r>
+              <a:t>the reservation expires after one hour if the user doesn’t pickup the car in time</a:t>
+            </a:r>
+            <a:r>
+              <a:rPr lang="en-GB" dirty="0" smtClean="0"/>
+              <a:t>;</a:t>
+            </a:r>
+          </a:p>
+          <a:p>
+            <a:r>
+              <a:rPr lang="en-US" dirty="0"/>
+              <a:t>It is said that “The system stops charging the user as soon as the car is parked in a safe area and the user exits the car”. Since “the user exits the car” is ambiguous, we assumed that this is true when the user is not near the car anymore, namely when the distance between user and car is bigger than a certain </a:t>
+            </a:r>
+            <a:r>
+              <a:rPr lang="en-US" dirty="0" smtClean="0"/>
+              <a:t>amount:</a:t>
+            </a:r>
+          </a:p>
+          <a:p>
+            <a:pPr lvl="1">
+              <a:buFont typeface="Wingdings" panose="05000000000000000000" pitchFamily="2" charset="2"/>
+              <a:buChar char="§"/>
+            </a:pPr>
+            <a:r>
+              <a:rPr lang="en-GB" dirty="0"/>
+              <a:t>The payment for a ride is carried out when the user </a:t>
+            </a:r>
+            <a:r>
+              <a:rPr lang="en-GB" dirty="0" smtClean="0"/>
+              <a:t>exits </a:t>
+            </a:r>
+            <a:r>
+              <a:rPr lang="en-GB" dirty="0"/>
+              <a:t>the </a:t>
+            </a:r>
+            <a:r>
+              <a:rPr lang="en-GB" dirty="0" smtClean="0"/>
+              <a:t>car;</a:t>
+            </a:r>
+            <a:endParaRPr lang="en-US" dirty="0"/>
+          </a:p>
+          <a:p>
+            <a:pPr lvl="1">
+              <a:buFont typeface="Wingdings" panose="05000000000000000000" pitchFamily="2" charset="2"/>
+              <a:buChar char="§"/>
+            </a:pPr>
+            <a:r>
+              <a:rPr lang="en-GB" dirty="0"/>
+              <a:t>If the user gets close to the car he rented and the car unlocks itself, then the car should be also able to lock itself if the user distances </a:t>
+            </a:r>
+            <a:r>
+              <a:rPr lang="en-GB" dirty="0" smtClean="0"/>
+              <a:t>himself</a:t>
+            </a:r>
+            <a:r>
+              <a:rPr lang="en-GB" dirty="0"/>
+              <a:t>;</a:t>
+            </a:r>
+            <a:endParaRPr lang="en-GB" dirty="0" smtClean="0"/>
           </a:p>
           <a:p>
             <a:pPr lvl="0"/>
             <a:r>
+              <a:rPr lang="en-GB" dirty="0" smtClean="0"/>
+              <a:t>The </a:t>
+            </a:r>
+            <a:r>
               <a:rPr lang="en-GB" dirty="0"/>
-              <a:t>The payment for the reservation fee is carried out as soon as the reservation hour expires</a:t>
-            </a:r>
-            <a:r>
-              <a:rPr lang="en-GB" dirty="0" smtClean="0"/>
-              <a:t>.</a:t>
-            </a:r>
-          </a:p>
-          <a:p>
-            <a:r>
-              <a:rPr lang="en-GB" dirty="0"/>
-              <a:t>The payment for a ride is carried out when the user quits the car</a:t>
-            </a:r>
-            <a:r>
-              <a:rPr lang="en-GB" dirty="0" smtClean="0"/>
-              <a:t>.</a:t>
-            </a:r>
-            <a:endParaRPr lang="en-US" dirty="0"/>
-          </a:p>
-          <a:p>
-            <a:pPr lvl="0"/>
-            <a:r>
-              <a:rPr lang="en-GB" dirty="0"/>
-              <a:t>The discount for having at least two other passengers onto the car is applied only if those passengers are in the car before the engine ignites.</a:t>
+              <a:t>discount for having at least two other passengers onto the car is applied only if those passengers are in the car before the engine ignites.</a:t>
             </a:r>
             <a:endParaRPr lang="en-US" dirty="0"/>
           </a:p>
@@ -8939,7 +8960,7 @@
   <p:timing>
     <p:tnLst>
       <p:par>
-        <p:cTn xmlns:p14="http://schemas.microsoft.com/office/powerpoint/2010/main" id="1" dur="indefinite" restart="never" nodeType="tmRoot"/>
+        <p:cTn id="1" dur="indefinite" restart="never" nodeType="tmRoot"/>
       </p:par>
     </p:tnLst>
   </p:timing>
@@ -8980,7 +9001,7 @@
           <a:p>
             <a:r>
               <a:rPr lang="en-US" dirty="0" smtClean="0"/>
-              <a:t>Text assumptions (2)</a:t>
+              <a:t>Roadmap</a:t>
             </a:r>
             <a:endParaRPr lang="en-US" dirty="0"/>
           </a:p>
@@ -8998,41 +9019,70 @@
         </p:nvSpPr>
         <p:spPr/>
         <p:txBody>
-          <a:bodyPr>
-            <a:normAutofit fontScale="92500" lnSpcReduction="10000"/>
-          </a:bodyPr>
-          <a:lstStyle/>
-          <a:p>
-            <a:pPr lvl="0"/>
-            <a:r>
-              <a:rPr lang="en-US" dirty="0"/>
-              <a:t>It is said that “The system stops charging the user as soon as the car is parked in a safe area and the user exits the car”. Since “the user exits the car” is ambiguous, we assumed that this is true when the user is not near the car anymore, namely when the distance between user and car is bigger than a certain </a:t>
-            </a:r>
+          <a:bodyPr/>
+          <a:lstStyle/>
+          <a:p>
+            <a:r>
+              <a:rPr lang="en-US" dirty="0" smtClean="0">
+                <a:solidFill>
+                  <a:srgbClr val="A6A6A6"/>
+                </a:solidFill>
+              </a:rPr>
+              <a:t>Text assumptions</a:t>
+            </a:r>
+          </a:p>
+          <a:p>
             <a:r>
               <a:rPr lang="en-US" dirty="0" smtClean="0"/>
-              <a:t>amount;</a:t>
-            </a:r>
-          </a:p>
-          <a:p>
-            <a:r>
-              <a:rPr lang="en-GB" dirty="0"/>
-              <a:t>If the user gets close to the car he rented and the car unlocks itself, then the car should be also able to lock itself if the user distances himself.</a:t>
-            </a:r>
-            <a:endParaRPr lang="en-US" dirty="0"/>
-          </a:p>
-          <a:p>
-            <a:pPr lvl="0"/>
-            <a:endParaRPr lang="en-US" dirty="0"/>
-          </a:p>
-          <a:p>
-            <a:endParaRPr lang="en-US" dirty="0"/>
+              <a:t>Goals, Domain properties, Requirements</a:t>
+            </a:r>
+          </a:p>
+          <a:p>
+            <a:r>
+              <a:rPr lang="en-US" dirty="0" smtClean="0">
+                <a:solidFill>
+                  <a:srgbClr val="A6A6A6"/>
+                </a:solidFill>
+              </a:rPr>
+              <a:t>Proposed system</a:t>
+            </a:r>
+          </a:p>
+          <a:p>
+            <a:r>
+              <a:rPr lang="en-US" dirty="0" smtClean="0">
+                <a:solidFill>
+                  <a:srgbClr val="A6A6A6"/>
+                </a:solidFill>
+              </a:rPr>
+              <a:t>Actors and use case diagram</a:t>
+            </a:r>
+          </a:p>
+          <a:p>
+            <a:r>
+              <a:rPr lang="en-US" dirty="0" smtClean="0">
+                <a:solidFill>
+                  <a:srgbClr val="A6A6A6"/>
+                </a:solidFill>
+              </a:rPr>
+              <a:t>Alloy</a:t>
+            </a:r>
+          </a:p>
+          <a:p>
+            <a:r>
+              <a:rPr lang="en-US" dirty="0" smtClean="0">
+                <a:solidFill>
+                  <a:srgbClr val="A6A6A6"/>
+                </a:solidFill>
+              </a:rPr>
+              <a:t>Future Development</a:t>
+            </a:r>
           </a:p>
         </p:txBody>
       </p:sp>
     </p:spTree>
     <p:extLst>
       <p:ext uri="{BB962C8B-B14F-4D97-AF65-F5344CB8AC3E}">
-        <p14:creationId xmlns:p14="http://schemas.microsoft.com/office/powerpoint/2010/main" val="2868395331"/>
+        <p14:creationId xmlns:p14="http://schemas.microsoft.com/office/powerpoint/2010/main" val="2522260323"/>
       </p:ext>
     </p:extLst>
   </p:cSld>
@@ -9042,7 +9092,7 @@
   <p:timing>
     <p:tnLst>
       <p:par>
-        <p:cTn xmlns:p14="http://schemas.microsoft.com/office/powerpoint/2010/main" id="1" dur="indefinite" restart="never" nodeType="tmRoot"/>
+        <p:cTn id="1" dur="indefinite" restart="never" nodeType="tmRoot"/>
       </p:par>
     </p:tnLst>
   </p:timing>
@@ -9083,7 +9133,7 @@
           <a:p>
             <a:r>
               <a:rPr lang="en-US" dirty="0" smtClean="0"/>
-              <a:t>Roadmap</a:t>
+              <a:t>Goals</a:t>
             </a:r>
             <a:endParaRPr lang="en-US" dirty="0"/>
           </a:p>
@@ -9101,70 +9151,67 @@
         </p:nvSpPr>
         <p:spPr/>
         <p:txBody>
-          <a:bodyPr/>
-          <a:lstStyle/>
-          <a:p>
-            <a:r>
-              <a:rPr lang="en-US" dirty="0" smtClean="0">
-                <a:solidFill>
-                  <a:srgbClr val="A6A6A6"/>
-                </a:solidFill>
-              </a:rPr>
-              <a:t>Text assumptions</a:t>
-            </a:r>
-          </a:p>
-          <a:p>
-            <a:r>
-              <a:rPr lang="en-US" dirty="0" smtClean="0"/>
-              <a:t>Goals, Domain properties, Requirements</a:t>
-            </a:r>
-          </a:p>
-          <a:p>
-            <a:r>
-              <a:rPr lang="en-US" dirty="0" smtClean="0">
-                <a:solidFill>
-                  <a:srgbClr val="A6A6A6"/>
-                </a:solidFill>
-              </a:rPr>
-              <a:t>Proposed system</a:t>
-            </a:r>
-          </a:p>
-          <a:p>
-            <a:r>
-              <a:rPr lang="en-US" dirty="0" smtClean="0">
-                <a:solidFill>
-                  <a:srgbClr val="A6A6A6"/>
-                </a:solidFill>
-              </a:rPr>
-              <a:t>Actors and use case diagram</a:t>
-            </a:r>
-          </a:p>
-          <a:p>
-            <a:r>
-              <a:rPr lang="en-US" dirty="0" smtClean="0">
-                <a:solidFill>
-                  <a:srgbClr val="A6A6A6"/>
-                </a:solidFill>
-              </a:rPr>
-              <a:t>Alloy</a:t>
-            </a:r>
-          </a:p>
-          <a:p>
-            <a:r>
-              <a:rPr lang="en-US" dirty="0" smtClean="0">
-                <a:solidFill>
-                  <a:srgbClr val="A6A6A6"/>
-                </a:solidFill>
-              </a:rPr>
-              <a:t>Future Development</a:t>
-            </a:r>
+          <a:bodyPr>
+            <a:normAutofit fontScale="85000" lnSpcReduction="10000"/>
+          </a:bodyPr>
+          <a:lstStyle/>
+          <a:p>
+            <a:pPr lvl="0"/>
+            <a:r>
+              <a:rPr lang="en-GB" dirty="0"/>
+              <a:t>Users can see and select an available car close to them, or close to a specified address, and reserve it </a:t>
+            </a:r>
+            <a:r>
+              <a:rPr lang="it-IT" dirty="0"/>
+              <a:t>for up to </a:t>
+            </a:r>
+            <a:r>
+              <a:rPr lang="en-GB" dirty="0"/>
+              <a:t>one hour before they pick it up;</a:t>
+            </a:r>
+            <a:endParaRPr lang="en-US" dirty="0"/>
+          </a:p>
+          <a:p>
+            <a:pPr lvl="0"/>
+            <a:r>
+              <a:rPr lang="en-GB" dirty="0"/>
+              <a:t>Users can get in a car only if they are near it and they have reserved it;</a:t>
+            </a:r>
+            <a:endParaRPr lang="en-US" dirty="0"/>
+          </a:p>
+          <a:p>
+            <a:pPr lvl="0"/>
+            <a:r>
+              <a:rPr lang="en-GB" dirty="0"/>
+              <a:t>Users should pay proportionally to minutes they have used the car, and they should see in real time the amount of the bill;</a:t>
+            </a:r>
+            <a:endParaRPr lang="en-US" dirty="0"/>
+          </a:p>
+          <a:p>
+            <a:pPr lvl="0"/>
+            <a:r>
+              <a:rPr lang="en-GB" dirty="0"/>
+              <a:t>Users could register to the system and have their personal area;</a:t>
+            </a:r>
+            <a:endParaRPr lang="en-US" dirty="0"/>
+          </a:p>
+          <a:p>
+            <a:pPr lvl="0"/>
+            <a:r>
+              <a:rPr lang="en-GB" dirty="0"/>
+              <a:t>Virtuous behaviours by users should be incentivized.</a:t>
+            </a:r>
+            <a:endParaRPr lang="en-US" dirty="0"/>
+          </a:p>
+          <a:p>
+            <a:endParaRPr lang="en-US" dirty="0"/>
           </a:p>
         </p:txBody>
       </p:sp>
     </p:spTree>
     <p:extLst>
       <p:ext uri="{BB962C8B-B14F-4D97-AF65-F5344CB8AC3E}">
-        <p14:creationId xmlns:p14="http://schemas.microsoft.com/office/powerpoint/2010/main" val="2522260323"/>
+        <p14:creationId xmlns:p14="http://schemas.microsoft.com/office/powerpoint/2010/main" val="505280423"/>
       </p:ext>
     </p:extLst>
   </p:cSld>
@@ -9174,7 +9221,7 @@
   <p:timing>
     <p:tnLst>
       <p:par>
-        <p:cTn xmlns:p14="http://schemas.microsoft.com/office/powerpoint/2010/main" id="1" dur="indefinite" restart="never" nodeType="tmRoot"/>
+        <p:cTn id="1" dur="indefinite" restart="never" nodeType="tmRoot"/>
       </p:par>
     </p:tnLst>
   </p:timing>
@@ -9215,7 +9262,7 @@
           <a:p>
             <a:r>
               <a:rPr lang="en-US" dirty="0" smtClean="0"/>
-              <a:t>Goals</a:t>
+              <a:t>Domain properties (1)</a:t>
             </a:r>
             <a:endParaRPr lang="en-US" dirty="0"/>
           </a:p>
@@ -9234,22 +9281,22 @@
         <p:spPr/>
         <p:txBody>
           <a:bodyPr>
-            <a:normAutofit fontScale="85000" lnSpcReduction="10000"/>
+            <a:normAutofit fontScale="92500"/>
           </a:bodyPr>
           <a:lstStyle/>
           <a:p>
             <a:pPr lvl="0"/>
             <a:r>
               <a:rPr lang="en-GB" dirty="0"/>
-              <a:t>Users can see and select an available car close to them, or close to a specified address, and reserve it </a:t>
-            </a:r>
-            <a:r>
-              <a:rPr lang="it-IT" dirty="0"/>
-              <a:t>for up to </a:t>
-            </a:r>
+              <a:t>All the users have a device connected to the Internet, possibly with a GPS built in;</a:t>
+            </a:r>
+            <a:endParaRPr lang="en-US" dirty="0"/>
+          </a:p>
+          <a:p>
+            <a:pPr lvl="0"/>
             <a:r>
               <a:rPr lang="en-GB" dirty="0"/>
-              <a:t>one hour before they pick it up;</a:t>
+              <a:t>All the electric cars have an on-board computer that allows execution of Java software;</a:t>
             </a:r>
             <a:endParaRPr lang="en-US" dirty="0"/>
           </a:p>
@@ -9257,32 +9304,56 @@
             <a:pPr lvl="0"/>
             <a:r>
               <a:rPr lang="en-GB" dirty="0"/>
-              <a:t>Users can get in a car only if they are near it and they have reserved it;</a:t>
-            </a:r>
-            <a:endParaRPr lang="en-US" dirty="0"/>
-          </a:p>
-          <a:p>
-            <a:pPr lvl="0"/>
+              <a:t>All the electric cars have a </a:t>
+            </a:r>
+            <a:r>
+              <a:rPr lang="en-GB" dirty="0" smtClean="0"/>
+              <a:t>GPS, a </a:t>
+            </a:r>
             <a:r>
               <a:rPr lang="en-GB" dirty="0"/>
-              <a:t>Users should pay proportionally to minutes they have used the car, and they should see in real time the amount of the bill;</a:t>
-            </a:r>
-            <a:endParaRPr lang="en-US" dirty="0"/>
-          </a:p>
-          <a:p>
-            <a:pPr lvl="0"/>
+              <a:t>sensor for every seat which detect the presence of a </a:t>
+            </a:r>
             <a:r>
               <a:rPr lang="en-GB" dirty="0"/>
-              <a:t>Users could register to the system and have their personal area;</a:t>
-            </a:r>
-            <a:endParaRPr lang="en-US" dirty="0"/>
-          </a:p>
-          <a:p>
-            <a:pPr lvl="0"/>
+              <a:t>passenger, </a:t>
+            </a:r>
+            <a:r>
+              <a:rPr lang="en-GB" dirty="0" smtClean="0"/>
+              <a:t>all </a:t>
+            </a:r>
             <a:r>
               <a:rPr lang="en-GB" dirty="0"/>
-              <a:t>Virtuous behaviours by users should be incentivized.</a:t>
-            </a:r>
+              <a:t>the electric cars have Internet </a:t>
+            </a:r>
+            <a:r>
+              <a:rPr lang="en-GB" dirty="0" smtClean="0"/>
+              <a:t>connection:</a:t>
+            </a:r>
+          </a:p>
+          <a:p>
+            <a:pPr lvl="1">
+              <a:buFont typeface="Wingdings" panose="05000000000000000000" pitchFamily="2" charset="2"/>
+              <a:buChar char="§"/>
+            </a:pPr>
+            <a:r>
+              <a:rPr lang="en-US" dirty="0" smtClean="0"/>
+              <a:t>We </a:t>
+            </a:r>
+            <a:r>
+              <a:rPr lang="en-US" dirty="0"/>
+              <a:t>assume that these devices </a:t>
+            </a:r>
+            <a:r>
+              <a:rPr lang="en-US" dirty="0" smtClean="0"/>
+              <a:t>always work;</a:t>
+            </a:r>
+            <a:endParaRPr lang="en-GB" dirty="0" smtClean="0"/>
+          </a:p>
+          <a:p>
+            <a:pPr marL="0" lvl="0" indent="0">
+              <a:buNone/>
+            </a:pPr>
             <a:endParaRPr lang="en-US" dirty="0"/>
           </a:p>
           <a:p>
@@ -9293,7 +9364,7 @@
     </p:spTree>
     <p:extLst>
       <p:ext uri="{BB962C8B-B14F-4D97-AF65-F5344CB8AC3E}">
-        <p14:creationId xmlns:p14="http://schemas.microsoft.com/office/powerpoint/2010/main" val="505280423"/>
+        <p14:creationId xmlns:p14="http://schemas.microsoft.com/office/powerpoint/2010/main" val="3514650946"/>
       </p:ext>
     </p:extLst>
   </p:cSld>
@@ -9303,7 +9374,7 @@
   <p:timing>
     <p:tnLst>
       <p:par>
-        <p:cTn xmlns:p14="http://schemas.microsoft.com/office/powerpoint/2010/main" id="1" dur="indefinite" restart="never" nodeType="tmRoot"/>
+        <p:cTn id="1" dur="indefinite" restart="never" nodeType="tmRoot"/>
       </p:par>
     </p:tnLst>
   </p:timing>
@@ -9344,7 +9415,7 @@
           <a:p>
             <a:r>
               <a:rPr lang="en-US" dirty="0" smtClean="0"/>
-              <a:t>Domain properties (1)</a:t>
+              <a:t>Domain properties (2)</a:t>
             </a:r>
             <a:endParaRPr lang="en-US" dirty="0"/>
           </a:p>
@@ -9363,14 +9434,18 @@
         <p:spPr/>
         <p:txBody>
           <a:bodyPr>
-            <a:normAutofit fontScale="92500" lnSpcReduction="10000"/>
+            <a:normAutofit lnSpcReduction="10000"/>
           </a:bodyPr>
           <a:lstStyle/>
           <a:p>
             <a:pPr lvl="0"/>
             <a:r>
+              <a:rPr lang="en-GB" dirty="0" smtClean="0"/>
+              <a:t>All </a:t>
+            </a:r>
+            <a:r>
               <a:rPr lang="en-GB" dirty="0"/>
-              <a:t>All the users have a device connected to the Internet, possibly with a GPS built in;</a:t>
+              <a:t>the cars can carry a maximum of 4 passengers;</a:t>
             </a:r>
             <a:endParaRPr lang="en-US" dirty="0"/>
           </a:p>
@@ -9378,7 +9453,7 @@
             <a:pPr lvl="0"/>
             <a:r>
               <a:rPr lang="en-GB" dirty="0"/>
-              <a:t>All the electric cars have an on-board computer that allows execution of Java software;</a:t>
+              <a:t>In a special parking area with power grid stations there is always space for a car to be plugged in;</a:t>
             </a:r>
             <a:endParaRPr lang="en-US" dirty="0"/>
           </a:p>
@@ -9386,7 +9461,7 @@
             <a:pPr lvl="0"/>
             <a:r>
               <a:rPr lang="en-GB" dirty="0"/>
-              <a:t>All the electric cars have a GPS to indicate their actual position, that cannot be turned off, and a sensor for every seat which detect the presence of a passenger</a:t>
+              <a:t>Users behave politely and have no intention of cheating</a:t>
             </a:r>
             <a:r>
               <a:rPr lang="en-GB" dirty="0" smtClean="0"/>
@@ -9395,10 +9470,10 @@
           </a:p>
           <a:p>
             <a:r>
-              <a:rPr lang="en-GB" dirty="0" smtClean="0"/>
-              <a:t>All the electric cars have Internet connection, that is always working and can’t be turned off;</a:t>
-            </a:r>
-            <a:endParaRPr lang="en-US" dirty="0" smtClean="0"/>
+              <a:rPr lang="en-GB" dirty="0"/>
+              <a:t>The company never reach the limit of requests per day for the external services.</a:t>
+            </a:r>
+            <a:endParaRPr lang="en-US" dirty="0"/>
           </a:p>
           <a:p>
             <a:pPr lvl="0"/>
@@ -9412,7 +9487,7 @@
     </p:spTree>
     <p:extLst>
       <p:ext uri="{BB962C8B-B14F-4D97-AF65-F5344CB8AC3E}">
-        <p14:creationId xmlns:p14="http://schemas.microsoft.com/office/powerpoint/2010/main" val="3514650946"/>
+        <p14:creationId xmlns:p14="http://schemas.microsoft.com/office/powerpoint/2010/main" val="121292741"/>
       </p:ext>
     </p:extLst>
   </p:cSld>
@@ -9422,7 +9497,7 @@
   <p:timing>
     <p:tnLst>
       <p:par>
-        <p:cTn xmlns:p14="http://schemas.microsoft.com/office/powerpoint/2010/main" id="1" dur="indefinite" restart="never" nodeType="tmRoot"/>
+        <p:cTn id="1" dur="indefinite" restart="never" nodeType="tmRoot"/>
       </p:par>
     </p:tnLst>
   </p:timing>
@@ -9463,7 +9538,7 @@
           <a:p>
             <a:r>
               <a:rPr lang="en-US" dirty="0" smtClean="0"/>
-              <a:t>Domain properties (2)</a:t>
+              <a:t>Requirements (1)</a:t>
             </a:r>
             <a:endParaRPr lang="en-US" dirty="0"/>
           </a:p>
@@ -9479,63 +9554,123 @@
             <p:ph idx="1"/>
           </p:nvPr>
         </p:nvSpPr>
-        <p:spPr/>
+        <p:spPr>
+          <a:xfrm>
+            <a:off x="129881" y="1417638"/>
+            <a:ext cx="8904080" cy="5257800"/>
+          </a:xfrm>
+        </p:spPr>
         <p:txBody>
           <a:bodyPr>
-            <a:normAutofit lnSpcReduction="10000"/>
+            <a:normAutofit fontScale="55000" lnSpcReduction="20000"/>
           </a:bodyPr>
           <a:lstStyle/>
           <a:p>
+            <a:pPr marL="0" indent="0">
+              <a:buNone/>
+            </a:pPr>
+            <a:r>
+              <a:rPr lang="en-GB" sz="4000" i="1" u="sng" dirty="0" smtClean="0"/>
+              <a:t>GOAL 1: </a:t>
+            </a:r>
+          </a:p>
+          <a:p>
+            <a:pPr marL="0" indent="0">
+              <a:buNone/>
+            </a:pPr>
+            <a:r>
+              <a:rPr lang="en-GB" sz="4000" i="1" u="sng" dirty="0" smtClean="0"/>
+              <a:t>Users </a:t>
+            </a:r>
+            <a:r>
+              <a:rPr lang="en-GB" sz="4000" i="1" u="sng" dirty="0"/>
+              <a:t>could see and select an available car close to him, or close to a specified address, and reserve it for up to one hour before they pick it </a:t>
+            </a:r>
+            <a:r>
+              <a:rPr lang="en-GB" sz="4000" i="1" u="sng" dirty="0" smtClean="0"/>
+              <a:t>up</a:t>
+            </a:r>
+            <a:r>
+              <a:rPr lang="en-US" sz="4000" dirty="0"/>
+              <a:t>.</a:t>
+            </a:r>
+            <a:endParaRPr lang="en-US" sz="4000" dirty="0" smtClean="0"/>
+          </a:p>
+          <a:p>
+            <a:pPr marL="0" indent="0">
+              <a:buNone/>
+            </a:pPr>
+            <a:r>
+              <a:rPr lang="en-US" sz="4000" dirty="0" smtClean="0"/>
+              <a:t>REQUIREMENTS:</a:t>
+            </a:r>
+          </a:p>
+          <a:p>
             <a:pPr lvl="0"/>
             <a:r>
-              <a:rPr lang="en-GB" dirty="0" smtClean="0"/>
-              <a:t>All </a:t>
-            </a:r>
-            <a:r>
-              <a:rPr lang="en-GB" dirty="0"/>
-              <a:t>the cars can carry a maximum of 4 passengers;</a:t>
-            </a:r>
-            <a:endParaRPr lang="en-US" dirty="0"/>
+              <a:rPr lang="en-GB" sz="4000" dirty="0"/>
+              <a:t>The system has to detect if a car is parked in a Safe Area and its battery level;</a:t>
+            </a:r>
+            <a:endParaRPr lang="en-US" sz="4000" dirty="0"/>
           </a:p>
           <a:p>
             <a:pPr lvl="0"/>
             <a:r>
-              <a:rPr lang="en-GB" dirty="0"/>
-              <a:t>In a special parking area with power grid stations there is always space for a car to be plugged in;</a:t>
-            </a:r>
-            <a:endParaRPr lang="en-US" dirty="0"/>
+              <a:rPr lang="en-GB" sz="4000" dirty="0"/>
+              <a:t>The system has to detect car position and display it on a map;</a:t>
+            </a:r>
+            <a:endParaRPr lang="en-US" sz="4000" dirty="0"/>
           </a:p>
           <a:p>
             <a:pPr lvl="0"/>
             <a:r>
-              <a:rPr lang="en-GB" dirty="0"/>
-              <a:t>Users behave politely and have no intention of cheating</a:t>
-            </a:r>
-            <a:r>
-              <a:rPr lang="en-GB" dirty="0" smtClean="0"/>
+              <a:rPr lang="en-GB" sz="4000" dirty="0"/>
+              <a:t>The system has to be able to identify the location of a user through his/her GPS, if he/she gives the consent;</a:t>
+            </a:r>
+            <a:endParaRPr lang="en-US" sz="4000" dirty="0"/>
+          </a:p>
+          <a:p>
+            <a:pPr lvl="0"/>
+            <a:r>
+              <a:rPr lang="en-GB" sz="4000" dirty="0"/>
+              <a:t>The system has to provide a list of available cars close to a given address;</a:t>
+            </a:r>
+            <a:endParaRPr lang="en-US" sz="4000" dirty="0"/>
+          </a:p>
+          <a:p>
+            <a:pPr lvl="0"/>
+            <a:r>
+              <a:rPr lang="en-GB" sz="4000" dirty="0"/>
+              <a:t>The system has to give the possibility to reserve a car at most by one user at a time;</a:t>
+            </a:r>
+            <a:endParaRPr lang="en-US" sz="4000" dirty="0"/>
+          </a:p>
+          <a:p>
+            <a:pPr lvl="0"/>
+            <a:r>
+              <a:rPr lang="en-GB" sz="4000" dirty="0"/>
+              <a:t>The system has to mark the reservation as expired for a car after one hour if the user has not picked it up;</a:t>
+            </a:r>
+            <a:endParaRPr lang="en-US" sz="4000" dirty="0"/>
+          </a:p>
+          <a:p>
+            <a:pPr lvl="0"/>
+            <a:r>
+              <a:rPr lang="en-GB" sz="4000" dirty="0"/>
+              <a:t>The system has to apply a fee of 1€ if the reservation has expired</a:t>
+            </a:r>
+            <a:r>
+              <a:rPr lang="en-GB" sz="4000" dirty="0" smtClean="0"/>
               <a:t>;</a:t>
             </a:r>
-          </a:p>
-          <a:p>
-            <a:r>
-              <a:rPr lang="en-GB" dirty="0"/>
-              <a:t>The company never reach the limit of requests per day for the external services.</a:t>
-            </a:r>
-            <a:endParaRPr lang="en-US" dirty="0"/>
-          </a:p>
-          <a:p>
-            <a:pPr lvl="0"/>
-            <a:endParaRPr lang="en-US" dirty="0"/>
-          </a:p>
-          <a:p>
-            <a:endParaRPr lang="en-US" dirty="0"/>
+            <a:endParaRPr lang="en-US" sz="4000" dirty="0"/>
           </a:p>
         </p:txBody>
       </p:sp>
     </p:spTree>
     <p:extLst>
       <p:ext uri="{BB962C8B-B14F-4D97-AF65-F5344CB8AC3E}">
-        <p14:creationId xmlns:p14="http://schemas.microsoft.com/office/powerpoint/2010/main" val="121292741"/>
+        <p14:creationId xmlns:p14="http://schemas.microsoft.com/office/powerpoint/2010/main" val="3197795391"/>
       </p:ext>
     </p:extLst>
   </p:cSld>
@@ -9545,7 +9680,7 @@
   <p:timing>
     <p:tnLst>
       <p:par>
-        <p:cTn xmlns:p14="http://schemas.microsoft.com/office/powerpoint/2010/main" id="1" dur="indefinite" restart="never" nodeType="tmRoot"/>
+        <p:cTn id="1" dur="indefinite" restart="never" nodeType="tmRoot"/>
       </p:par>
     </p:tnLst>
   </p:timing>

</xml_diff>

<commit_message>
Add updated RASD pdf
</commit_message>
<xml_diff>
--- a/RASD/presentation/RASD_presentation.pptx
+++ b/RASD/presentation/RASD_presentation.pptx
@@ -141,7 +141,7 @@
   </p:defaultTextStyle>
   <p:extLst>
     <p:ext uri="{EFAFB233-063F-42B5-8137-9DF3F51BA10A}">
-      <p15:sldGuideLst xmlns:p15="http://schemas.microsoft.com/office/powerpoint/2012/main" xmlns="">
+      <p15:sldGuideLst xmlns:p15="http://schemas.microsoft.com/office/powerpoint/2012/main">
         <p15:guide id="1" orient="horz" pos="2160">
           <p15:clr>
             <a:srgbClr val="A4A3A4"/>
@@ -240,7 +240,7 @@
           <a:p>
             <a:fld id="{66886BA6-36FE-CA4B-80D9-68E45FED626A}" type="datetimeFigureOut">
               <a:rPr lang="en-US" smtClean="0"/>
-              <a:t>13/11/16</a:t>
+              <a:t>11/13/2016</a:t>
             </a:fld>
             <a:endParaRPr lang="en-US"/>
           </a:p>
@@ -304,35 +304,35 @@
           <a:p>
             <a:pPr lvl="0"/>
             <a:r>
-              <a:rPr lang="it-IT" smtClean="0"/>
+              <a:rPr lang="it-IT"/>
               <a:t>Click to edit Master text styles</a:t>
             </a:r>
           </a:p>
           <a:p>
             <a:pPr lvl="1"/>
             <a:r>
-              <a:rPr lang="it-IT" smtClean="0"/>
+              <a:rPr lang="it-IT"/>
               <a:t>Second level</a:t>
             </a:r>
           </a:p>
           <a:p>
             <a:pPr lvl="2"/>
             <a:r>
-              <a:rPr lang="it-IT" smtClean="0"/>
+              <a:rPr lang="it-IT"/>
               <a:t>Third level</a:t>
             </a:r>
           </a:p>
           <a:p>
             <a:pPr lvl="3"/>
             <a:r>
-              <a:rPr lang="it-IT" smtClean="0"/>
+              <a:rPr lang="it-IT"/>
               <a:t>Fourth level</a:t>
             </a:r>
           </a:p>
           <a:p>
             <a:pPr lvl="4"/>
             <a:r>
-              <a:rPr lang="it-IT" smtClean="0"/>
+              <a:rPr lang="it-IT"/>
               <a:t>Fifth level</a:t>
             </a:r>
             <a:endParaRPr lang="en-US"/>
@@ -399,7 +399,7 @@
           <a:p>
             <a:fld id="{A054EB85-D703-354E-85A0-B0DA9D143C24}" type="slidenum">
               <a:rPr lang="en-US" smtClean="0"/>
-              <a:t>‹#›</a:t>
+              <a:t>‹N›</a:t>
             </a:fld>
             <a:endParaRPr lang="en-US"/>
           </a:p>
@@ -553,20 +553,20 @@
           <a:lstStyle/>
           <a:p>
             <a:r>
-              <a:rPr lang="en-US" dirty="0" smtClean="0"/>
+              <a:rPr lang="en-US" dirty="0"/>
               <a:t>This is</a:t>
             </a:r>
             <a:r>
-              <a:rPr lang="en-US" baseline="0" dirty="0" smtClean="0"/>
+              <a:rPr lang="en-US" baseline="0" dirty="0"/>
               <a:t> our roadmap.</a:t>
             </a:r>
           </a:p>
           <a:p>
-            <a:endParaRPr lang="en-US" baseline="0" dirty="0" smtClean="0"/>
-          </a:p>
-          <a:p>
-            <a:r>
-              <a:rPr lang="en-US" baseline="0" dirty="0" smtClean="0"/>
+            <a:endParaRPr lang="en-US" baseline="0" dirty="0"/>
+          </a:p>
+          <a:p>
+            <a:r>
+              <a:rPr lang="en-US" baseline="0" dirty="0"/>
               <a:t>We will give an overview of our Alloy model and show some possible future improvements of our system.</a:t>
             </a:r>
             <a:endParaRPr lang="en-US" dirty="0"/>
@@ -671,7 +671,7 @@
               <a:defRPr/>
             </a:pPr>
             <a:r>
-              <a:rPr lang="en-US" baseline="0" dirty="0" smtClean="0"/>
+              <a:rPr lang="en-US" baseline="0" dirty="0"/>
               <a:t>Now we will give a not formal overview of a system that we think it can satisfy all the requirements that we found in the previous step. A formal view of such system will be in the Software Design Document.</a:t>
             </a:r>
           </a:p>
@@ -778,7 +778,7 @@
               <a:defRPr/>
             </a:pPr>
             <a:r>
-              <a:rPr lang="en-GB" sz="1200" kern="1200" dirty="0" smtClean="0">
+              <a:rPr lang="en-GB" sz="1200" kern="1200" dirty="0">
                 <a:solidFill>
                   <a:schemeClr val="tx1"/>
                 </a:solidFill>
@@ -790,7 +790,7 @@
               <a:t>We propose to make a web app that will give users a comfortable way to use our service. Since the user have to pick up the reserved car in only one hour since the moment of the reservation, we considered the </a:t>
             </a:r>
             <a:r>
-              <a:rPr lang="en-GB" sz="1200" kern="1200" dirty="0" err="1" smtClean="0">
+              <a:rPr lang="en-GB" sz="1200" kern="1200" dirty="0" err="1">
                 <a:solidFill>
                   <a:schemeClr val="tx1"/>
                 </a:solidFill>
@@ -802,7 +802,7 @@
               <a:t>PowerEnjoy</a:t>
             </a:r>
             <a:r>
-              <a:rPr lang="en-GB" sz="1200" kern="1200" dirty="0" smtClean="0">
+              <a:rPr lang="en-GB" sz="1200" kern="1200" dirty="0">
                 <a:solidFill>
                   <a:schemeClr val="tx1"/>
                 </a:solidFill>
@@ -813,7 +813,7 @@
               </a:rPr>
               <a:t> service as an “on the fly” service and therefore we preferred the web app instead of the web site. However, we will take the necessary precautions to make it easy to build the web site in the future.</a:t>
             </a:r>
-            <a:endParaRPr lang="it-IT" sz="1200" kern="1200" dirty="0" smtClean="0">
+            <a:endParaRPr lang="it-IT" sz="1200" kern="1200" dirty="0">
               <a:solidFill>
                 <a:schemeClr val="tx1"/>
               </a:solidFill>
@@ -824,7 +824,7 @@
             </a:endParaRPr>
           </a:p>
           <a:p>
-            <a:endParaRPr lang="en-US" dirty="0" smtClean="0"/>
+            <a:endParaRPr lang="en-US" dirty="0"/>
           </a:p>
           <a:p>
             <a:pPr marL="0" marR="0" indent="0" algn="l" defTabSz="457200" rtl="0" eaLnBrk="1" fontAlgn="auto" latinLnBrk="0" hangingPunct="1">
@@ -845,7 +845,7 @@
               <a:defRPr/>
             </a:pPr>
             <a:r>
-              <a:rPr lang="en-GB" sz="1200" kern="1200" dirty="0" smtClean="0">
+              <a:rPr lang="en-GB" sz="1200" kern="1200" dirty="0">
                 <a:solidFill>
                   <a:schemeClr val="tx1"/>
                 </a:solidFill>
@@ -857,7 +857,7 @@
               <a:t>The web app will be available to all the major mobile operating systems and will be developed in a way to communicate with the </a:t>
             </a:r>
             <a:r>
-              <a:rPr lang="en-GB" sz="1200" kern="1200" dirty="0" err="1" smtClean="0">
+              <a:rPr lang="en-GB" sz="1200" kern="1200" dirty="0" err="1">
                 <a:solidFill>
                   <a:schemeClr val="tx1"/>
                 </a:solidFill>
@@ -869,7 +869,7 @@
               <a:t>PowerEnjoy</a:t>
             </a:r>
             <a:r>
-              <a:rPr lang="en-GB" sz="1200" kern="1200" dirty="0" smtClean="0">
+              <a:rPr lang="en-GB" sz="1200" kern="1200" dirty="0">
                 <a:solidFill>
                   <a:schemeClr val="tx1"/>
                 </a:solidFill>
@@ -881,7 +881,7 @@
               <a:t> servers through API and Http requests, consequently the front-end will lie on the server. This decision brings to a trade-off between the app performance and the overall flexibility of the system in terms of UI and functional requirements. At the beginning</a:t>
             </a:r>
             <a:r>
-              <a:rPr lang="en-GB" sz="1200" kern="1200" baseline="0" dirty="0" smtClean="0">
+              <a:rPr lang="en-GB" sz="1200" kern="1200" baseline="0" dirty="0">
                 <a:solidFill>
                   <a:schemeClr val="tx1"/>
                 </a:solidFill>
@@ -911,7 +911,7 @@
               <a:tabLst/>
               <a:defRPr/>
             </a:pPr>
-            <a:endParaRPr lang="en-GB" sz="1200" kern="1200" baseline="0" dirty="0" smtClean="0">
+            <a:endParaRPr lang="en-GB" sz="1200" kern="1200" baseline="0" dirty="0">
               <a:solidFill>
                 <a:schemeClr val="tx1"/>
               </a:solidFill>
@@ -940,7 +940,7 @@
               <a:defRPr/>
             </a:pPr>
             <a:r>
-              <a:rPr lang="en-GB" sz="1200" kern="1200" dirty="0" smtClean="0">
+              <a:rPr lang="en-GB" sz="1200" kern="1200" dirty="0">
                 <a:solidFill>
                   <a:schemeClr val="tx1"/>
                 </a:solidFill>
@@ -951,7 +951,7 @@
               </a:rPr>
               <a:t>The database will stay on the same machine of the web server at the moment, but nothing will compromise the possibility to move it on another machine in the future.</a:t>
             </a:r>
-            <a:endParaRPr lang="it-IT" sz="1200" kern="1200" dirty="0" smtClean="0">
+            <a:endParaRPr lang="it-IT" sz="1200" kern="1200" dirty="0">
               <a:solidFill>
                 <a:schemeClr val="tx1"/>
               </a:solidFill>
@@ -979,7 +979,7 @@
               <a:tabLst/>
               <a:defRPr/>
             </a:pPr>
-            <a:endParaRPr lang="en-US" dirty="0" smtClean="0"/>
+            <a:endParaRPr lang="en-US" dirty="0"/>
           </a:p>
           <a:p>
             <a:pPr marL="0" marR="0" indent="0" algn="l" defTabSz="457200" rtl="0" eaLnBrk="1" fontAlgn="auto" latinLnBrk="0" hangingPunct="1">
@@ -1000,7 +1000,7 @@
               <a:defRPr/>
             </a:pPr>
             <a:r>
-              <a:rPr lang="en-GB" sz="1200" kern="1200" dirty="0" smtClean="0">
+              <a:rPr lang="en-GB" sz="1200" kern="1200" dirty="0">
                 <a:solidFill>
                   <a:schemeClr val="tx1"/>
                 </a:solidFill>
@@ -1011,7 +1011,7 @@
               </a:rPr>
               <a:t>Of course, the electric cars must be able to communicate with the server, so they must be provided with an Internet connection and an on-board computer that must be able to run Java software. However, the car is only an agent in our system and therefore all the business logic will lie on the server.</a:t>
             </a:r>
-            <a:endParaRPr lang="it-IT" sz="1200" kern="1200" dirty="0" smtClean="0">
+            <a:endParaRPr lang="it-IT" sz="1200" kern="1200" dirty="0">
               <a:solidFill>
                 <a:schemeClr val="tx1"/>
               </a:solidFill>
@@ -1124,10 +1124,9 @@
           <a:lstStyle/>
           <a:p>
             <a:r>
-              <a:rPr lang="en-US" dirty="0" smtClean="0"/>
+              <a:rPr lang="en-US" dirty="0"/>
               <a:t>READ</a:t>
             </a:r>
-            <a:endParaRPr lang="en-US" dirty="0"/>
           </a:p>
         </p:txBody>
       </p:sp>
@@ -1212,10 +1211,9 @@
           <a:lstStyle/>
           <a:p>
             <a:r>
-              <a:rPr lang="en-US" dirty="0" smtClean="0"/>
+              <a:rPr lang="en-US" dirty="0"/>
               <a:t>READ</a:t>
             </a:r>
-            <a:endParaRPr lang="en-US" dirty="0"/>
           </a:p>
         </p:txBody>
       </p:sp>
@@ -1317,7 +1315,7 @@
               <a:defRPr/>
             </a:pPr>
             <a:r>
-              <a:rPr lang="en-US" baseline="0" dirty="0" smtClean="0"/>
+              <a:rPr lang="en-US" baseline="0" dirty="0"/>
               <a:t>Let’s start with text assumptions. This is necessary because the specification document that the customers gave us can be ambiguous or incomplete and, since our document must be unambiguous and complete, some assumptions are necessary. In the reality, we would have called our customers in order to set a meeting to decide which assumption is ok or not, so there would have been an iterative process of redefinition of this document where the developers (or the people in charge) work together with the customers.</a:t>
             </a:r>
           </a:p>
@@ -1407,38 +1405,38 @@
           <a:lstStyle/>
           <a:p>
             <a:r>
-              <a:rPr lang="en-US" dirty="0" smtClean="0"/>
+              <a:rPr lang="en-US" dirty="0"/>
               <a:t>We found more assumptions then these but now we have the time to</a:t>
             </a:r>
             <a:r>
-              <a:rPr lang="en-US" baseline="0" dirty="0" smtClean="0"/>
+              <a:rPr lang="en-US" baseline="0" dirty="0"/>
               <a:t> discuss just few of them.</a:t>
             </a:r>
           </a:p>
           <a:p>
-            <a:endParaRPr lang="en-US" baseline="0" dirty="0" smtClean="0"/>
-          </a:p>
-          <a:p>
-            <a:r>
-              <a:rPr lang="en-US" baseline="0" dirty="0" smtClean="0"/>
+            <a:endParaRPr lang="en-US" baseline="0" dirty="0"/>
+          </a:p>
+          <a:p>
+            <a:r>
+              <a:rPr lang="en-US" baseline="0" dirty="0"/>
               <a:t>READ FIRST ASSUMPTION. The fact that it’s only possible to reserve a car for the current time is not specified in the specification document. Consider the case where a user reserves a car for this evening at 8pm. One possible solution may be to mark the car as not available from now to this evening, but that would imply a big waste in terms of car availability. Since a company of electrical car-sharing has probably an intrinsic hate for waste of resources, we opted for another solution where the user can only reserve a car for the current time.</a:t>
             </a:r>
           </a:p>
           <a:p>
-            <a:endParaRPr lang="en-US" baseline="0" dirty="0" smtClean="0"/>
-          </a:p>
-          <a:p>
-            <a:r>
-              <a:rPr lang="en-US" baseline="0" dirty="0" smtClean="0"/>
+            <a:endParaRPr lang="en-US" baseline="0" dirty="0"/>
+          </a:p>
+          <a:p>
+            <a:r>
+              <a:rPr lang="en-US" baseline="0" dirty="0"/>
               <a:t>Next assumption. READ SECOND ASSUMPTION WITHOUT SUB_LIST. Since now we know what “the user exits the car” means in a not ambiguous way, we can say that READ SUB_LIST. In the second point, the car would have only unlocked itself without closing the reservation because the user haven’t ignited its engine.</a:t>
             </a:r>
           </a:p>
           <a:p>
-            <a:endParaRPr lang="en-US" baseline="0" dirty="0" smtClean="0"/>
-          </a:p>
-          <a:p>
-            <a:r>
-              <a:rPr lang="en-US" baseline="0" dirty="0" smtClean="0"/>
+            <a:endParaRPr lang="en-US" baseline="0" dirty="0"/>
+          </a:p>
+          <a:p>
+            <a:r>
+              <a:rPr lang="en-US" baseline="0" dirty="0"/>
               <a:t>Next assumption. READ THIRD ASSUMPTION, which doesn’t further explanation.</a:t>
             </a:r>
             <a:endParaRPr lang="en-US" dirty="0"/>
@@ -1526,7 +1524,7 @@
           <a:lstStyle/>
           <a:p>
             <a:r>
-              <a:rPr lang="en-US" baseline="0" dirty="0" smtClean="0"/>
+              <a:rPr lang="en-US" baseline="0" dirty="0"/>
               <a:t>Now we analyze the domain of the application in order to extract some requirements that, together with the domain properties, fulfill the goals of our customers. In order to do a good job, we also need to make sure that the goals capture all the stakeholders needs and that domain properties are valid assumptions.</a:t>
             </a:r>
           </a:p>
@@ -1613,37 +1611,37 @@
           <a:lstStyle/>
           <a:p>
             <a:r>
-              <a:rPr lang="en-US" dirty="0" smtClean="0"/>
+              <a:rPr lang="en-US" dirty="0"/>
               <a:t>Here</a:t>
             </a:r>
             <a:r>
-              <a:rPr lang="en-US" baseline="0" dirty="0" smtClean="0"/>
+              <a:rPr lang="en-US" baseline="0" dirty="0"/>
               <a:t> are the goals.</a:t>
             </a:r>
           </a:p>
           <a:p>
-            <a:endParaRPr lang="en-US" baseline="0" dirty="0" smtClean="0"/>
-          </a:p>
-          <a:p>
-            <a:r>
-              <a:rPr lang="en-US" baseline="0" dirty="0" smtClean="0"/>
+            <a:endParaRPr lang="en-US" baseline="0" dirty="0"/>
+          </a:p>
+          <a:p>
+            <a:r>
+              <a:rPr lang="en-US" baseline="0" dirty="0"/>
               <a:t>READ ALL GOALS.</a:t>
             </a:r>
           </a:p>
           <a:p>
-            <a:endParaRPr lang="en-US" baseline="0" dirty="0" smtClean="0"/>
-          </a:p>
-          <a:p>
-            <a:r>
-              <a:rPr lang="en-US" baseline="0" dirty="0" smtClean="0"/>
+            <a:endParaRPr lang="en-US" baseline="0" dirty="0"/>
+          </a:p>
+          <a:p>
+            <a:r>
+              <a:rPr lang="en-US" baseline="0" dirty="0"/>
               <a:t>This last goal comprehends all the discounts or extra charges applied to users that had particular </a:t>
             </a:r>
             <a:r>
-              <a:rPr lang="en-US" baseline="0" dirty="0" err="1" smtClean="0"/>
+              <a:rPr lang="en-US" baseline="0" dirty="0" err="1"/>
               <a:t>behaviours</a:t>
             </a:r>
             <a:r>
-              <a:rPr lang="en-US" baseline="0" dirty="0" smtClean="0"/>
+              <a:rPr lang="en-US" baseline="0" dirty="0"/>
               <a:t>.</a:t>
             </a:r>
             <a:endParaRPr lang="en-US" dirty="0"/>
@@ -1731,38 +1729,38 @@
           <a:lstStyle/>
           <a:p>
             <a:r>
-              <a:rPr lang="en-US" dirty="0" smtClean="0"/>
+              <a:rPr lang="en-US" dirty="0"/>
               <a:t>Those are some of the domain assumptions we made.</a:t>
             </a:r>
           </a:p>
           <a:p>
-            <a:endParaRPr lang="en-US" dirty="0" smtClean="0"/>
-          </a:p>
-          <a:p>
-            <a:r>
-              <a:rPr lang="en-US" dirty="0" smtClean="0"/>
+            <a:endParaRPr lang="en-US" dirty="0"/>
+          </a:p>
+          <a:p>
+            <a:r>
+              <a:rPr lang="en-US" dirty="0"/>
               <a:t>READ FIRST.</a:t>
             </a:r>
             <a:r>
-              <a:rPr lang="en-US" baseline="0" dirty="0" smtClean="0"/>
+              <a:rPr lang="en-US" baseline="0" dirty="0"/>
               <a:t> GPS on the user device in our proposed system is optional. Therefore there will be a text input in which specify the location.</a:t>
             </a:r>
           </a:p>
           <a:p>
-            <a:endParaRPr lang="en-US" baseline="0" dirty="0" smtClean="0"/>
-          </a:p>
-          <a:p>
-            <a:r>
-              <a:rPr lang="en-US" baseline="0" dirty="0" smtClean="0"/>
+            <a:endParaRPr lang="en-US" baseline="0" dirty="0"/>
+          </a:p>
+          <a:p>
+            <a:r>
+              <a:rPr lang="en-US" baseline="0" dirty="0"/>
               <a:t>READ SECOND. Electric cars run software because they should tell the servers all the information that their sensors gathered, for example if the car is plugged in a power grid or the number of passengers.</a:t>
             </a:r>
           </a:p>
           <a:p>
-            <a:endParaRPr lang="en-US" baseline="0" dirty="0" smtClean="0"/>
-          </a:p>
-          <a:p>
-            <a:r>
-              <a:rPr lang="en-US" baseline="0" dirty="0" smtClean="0"/>
+            <a:endParaRPr lang="en-US" baseline="0" dirty="0"/>
+          </a:p>
+          <a:p>
+            <a:r>
+              <a:rPr lang="en-US" baseline="0" dirty="0"/>
               <a:t>READ THIRD.</a:t>
             </a:r>
             <a:endParaRPr lang="en-US" dirty="0"/>
@@ -1850,30 +1848,25 @@
           <a:lstStyle/>
           <a:p>
             <a:r>
-              <a:rPr lang="en-US" dirty="0" smtClean="0"/>
-              <a:t>READ FIRST</a:t>
-            </a:r>
-            <a:r>
-              <a:rPr lang="en-US" dirty="0" smtClean="0"/>
-              <a:t>.</a:t>
-            </a:r>
-            <a:endParaRPr lang="en-US" dirty="0" smtClean="0"/>
-          </a:p>
-          <a:p>
-            <a:endParaRPr lang="en-US" dirty="0" smtClean="0"/>
-          </a:p>
-          <a:p>
-            <a:r>
-              <a:rPr lang="en-US" dirty="0" smtClean="0"/>
+              <a:rPr lang="en-US" dirty="0"/>
+              <a:t>READ FIRST.</a:t>
+            </a:r>
+          </a:p>
+          <a:p>
+            <a:endParaRPr lang="en-US" dirty="0"/>
+          </a:p>
+          <a:p>
+            <a:r>
+              <a:rPr lang="en-US" dirty="0"/>
               <a:t>READ SECOND.</a:t>
             </a:r>
           </a:p>
           <a:p>
-            <a:endParaRPr lang="en-US" dirty="0" smtClean="0"/>
-          </a:p>
-          <a:p>
-            <a:r>
-              <a:rPr lang="en-US" dirty="0" smtClean="0"/>
+            <a:endParaRPr lang="en-US" dirty="0"/>
+          </a:p>
+          <a:p>
+            <a:r>
+              <a:rPr lang="en-US" dirty="0"/>
               <a:t>READ THIRD.</a:t>
             </a:r>
           </a:p>
@@ -1960,57 +1953,57 @@
           <a:lstStyle/>
           <a:p>
             <a:r>
-              <a:rPr lang="en-US" dirty="0" smtClean="0"/>
+              <a:rPr lang="en-US" dirty="0"/>
               <a:t>Let’s see now,</a:t>
             </a:r>
             <a:r>
-              <a:rPr lang="en-US" baseline="0" dirty="0" smtClean="0"/>
+              <a:rPr lang="en-US" baseline="0" dirty="0"/>
               <a:t> for some goals, the requirements that we need.</a:t>
             </a:r>
           </a:p>
           <a:p>
-            <a:endParaRPr lang="en-US" baseline="0" dirty="0" smtClean="0"/>
-          </a:p>
-          <a:p>
-            <a:r>
-              <a:rPr lang="en-US" baseline="0" dirty="0" smtClean="0"/>
+            <a:endParaRPr lang="en-US" baseline="0" dirty="0"/>
+          </a:p>
+          <a:p>
+            <a:r>
+              <a:rPr lang="en-US" baseline="0" dirty="0"/>
               <a:t>READ GOAL</a:t>
             </a:r>
           </a:p>
           <a:p>
-            <a:endParaRPr lang="en-US" baseline="0" dirty="0" smtClean="0"/>
-          </a:p>
-          <a:p>
-            <a:r>
-              <a:rPr lang="en-US" baseline="0" dirty="0" smtClean="0"/>
+            <a:endParaRPr lang="en-US" baseline="0" dirty="0"/>
+          </a:p>
+          <a:p>
+            <a:r>
+              <a:rPr lang="en-US" baseline="0" dirty="0"/>
               <a:t>Requirements.</a:t>
             </a:r>
           </a:p>
           <a:p>
-            <a:endParaRPr lang="en-US" baseline="0" dirty="0" smtClean="0"/>
-          </a:p>
-          <a:p>
-            <a:r>
-              <a:rPr lang="en-US" baseline="0" dirty="0" smtClean="0"/>
-              <a:t>READ REQ 1. This is because the system must know if the user has parked the car in an appropriate place and its battery level to know if some discounts or extra charges must be applied.</a:t>
-            </a:r>
-          </a:p>
-          <a:p>
-            <a:endParaRPr lang="en-US" baseline="0" dirty="0" smtClean="0"/>
-          </a:p>
-          <a:p>
-            <a:r>
-              <a:rPr lang="en-US" baseline="0" dirty="0" smtClean="0"/>
-              <a:t>READ REQ 2. Because the user must be able to see where the car is in order to decide to reserve it or not.</a:t>
-            </a:r>
-          </a:p>
-          <a:p>
-            <a:endParaRPr lang="en-US" baseline="0" dirty="0" smtClean="0"/>
-          </a:p>
-          <a:p>
-            <a:r>
-              <a:rPr lang="en-US" baseline="0" dirty="0" smtClean="0"/>
-              <a:t>READ REQ 3, 4, 5, 6, 7.</a:t>
+            <a:endParaRPr lang="en-US" baseline="0" dirty="0"/>
+          </a:p>
+          <a:p>
+            <a:r>
+              <a:rPr lang="en-US" baseline="0" dirty="0"/>
+              <a:t>READ REQ 1, 2. This is because the system must know if the user has parked the car in an appropriate place and its battery level to know if some discounts or extra charges must be applied.</a:t>
+            </a:r>
+          </a:p>
+          <a:p>
+            <a:endParaRPr lang="en-US" baseline="0" dirty="0"/>
+          </a:p>
+          <a:p>
+            <a:r>
+              <a:rPr lang="en-US" baseline="0" dirty="0"/>
+              <a:t>READ REQ 3. Because the user must be able to see where the car is in order to decide to reserve it or not.</a:t>
+            </a:r>
+          </a:p>
+          <a:p>
+            <a:endParaRPr lang="en-US" baseline="0" dirty="0"/>
+          </a:p>
+          <a:p>
+            <a:r>
+              <a:rPr lang="en-US" baseline="0" dirty="0"/>
+              <a:t>READ REQ  4, 5, 6, 7, 8.</a:t>
             </a:r>
           </a:p>
         </p:txBody>
@@ -2096,29 +2089,29 @@
           <a:lstStyle/>
           <a:p>
             <a:r>
-              <a:rPr lang="en-US" dirty="0" smtClean="0"/>
+              <a:rPr lang="en-US" dirty="0"/>
               <a:t>Let’s see another goal with its requirements.</a:t>
             </a:r>
           </a:p>
           <a:p>
-            <a:endParaRPr lang="en-US" dirty="0" smtClean="0"/>
-          </a:p>
-          <a:p>
-            <a:r>
-              <a:rPr lang="en-US" dirty="0" smtClean="0"/>
+            <a:endParaRPr lang="en-US" dirty="0"/>
+          </a:p>
+          <a:p>
+            <a:r>
+              <a:rPr lang="en-US" dirty="0"/>
               <a:t>READ GOAL.</a:t>
             </a:r>
           </a:p>
           <a:p>
-            <a:endParaRPr lang="en-US" dirty="0" smtClean="0"/>
-          </a:p>
-          <a:p>
-            <a:r>
-              <a:rPr lang="en-US" dirty="0" smtClean="0"/>
+            <a:endParaRPr lang="en-US" dirty="0"/>
+          </a:p>
+          <a:p>
+            <a:r>
+              <a:rPr lang="en-US" dirty="0"/>
               <a:t>READ REQ</a:t>
             </a:r>
             <a:r>
-              <a:rPr lang="en-US" baseline="0" dirty="0" smtClean="0"/>
+              <a:rPr lang="en-US" baseline="0" dirty="0"/>
               <a:t> 1, 2. </a:t>
             </a:r>
             <a:endParaRPr lang="en-US" dirty="0"/>
@@ -2342,7 +2335,7 @@
           <a:p>
             <a:fld id="{04C022AF-FDA7-5F49-8ED6-EF7E40D2900D}" type="datetimeFigureOut">
               <a:rPr lang="en-US" smtClean="0"/>
-              <a:t>13/11/16</a:t>
+              <a:t>11/13/2016</a:t>
             </a:fld>
             <a:endParaRPr lang="en-US"/>
           </a:p>
@@ -2384,7 +2377,7 @@
           <a:p>
             <a:fld id="{731D8DCA-ED65-174D-8524-A15D60332472}" type="slidenum">
               <a:rPr lang="en-US" smtClean="0"/>
-              <a:t>‹#›</a:t>
+              <a:t>‹N›</a:t>
             </a:fld>
             <a:endParaRPr lang="en-US"/>
           </a:p>
@@ -2512,7 +2505,7 @@
           <a:p>
             <a:fld id="{04C022AF-FDA7-5F49-8ED6-EF7E40D2900D}" type="datetimeFigureOut">
               <a:rPr lang="en-US" smtClean="0"/>
-              <a:t>13/11/16</a:t>
+              <a:t>11/13/2016</a:t>
             </a:fld>
             <a:endParaRPr lang="en-US"/>
           </a:p>
@@ -2554,7 +2547,7 @@
           <a:p>
             <a:fld id="{731D8DCA-ED65-174D-8524-A15D60332472}" type="slidenum">
               <a:rPr lang="en-US" smtClean="0"/>
-              <a:t>‹#›</a:t>
+              <a:t>‹N›</a:t>
             </a:fld>
             <a:endParaRPr lang="en-US"/>
           </a:p>
@@ -2692,7 +2685,7 @@
           <a:p>
             <a:fld id="{04C022AF-FDA7-5F49-8ED6-EF7E40D2900D}" type="datetimeFigureOut">
               <a:rPr lang="en-US" smtClean="0"/>
-              <a:t>13/11/16</a:t>
+              <a:t>11/13/2016</a:t>
             </a:fld>
             <a:endParaRPr lang="en-US"/>
           </a:p>
@@ -2734,7 +2727,7 @@
           <a:p>
             <a:fld id="{731D8DCA-ED65-174D-8524-A15D60332472}" type="slidenum">
               <a:rPr lang="en-US" smtClean="0"/>
-              <a:t>‹#›</a:t>
+              <a:t>‹N›</a:t>
             </a:fld>
             <a:endParaRPr lang="en-US"/>
           </a:p>
@@ -2862,7 +2855,7 @@
           <a:p>
             <a:fld id="{04C022AF-FDA7-5F49-8ED6-EF7E40D2900D}" type="datetimeFigureOut">
               <a:rPr lang="en-US" smtClean="0"/>
-              <a:t>13/11/16</a:t>
+              <a:t>11/13/2016</a:t>
             </a:fld>
             <a:endParaRPr lang="en-US"/>
           </a:p>
@@ -2904,7 +2897,7 @@
           <a:p>
             <a:fld id="{731D8DCA-ED65-174D-8524-A15D60332472}" type="slidenum">
               <a:rPr lang="en-US" smtClean="0"/>
-              <a:t>‹#›</a:t>
+              <a:t>‹N›</a:t>
             </a:fld>
             <a:endParaRPr lang="en-US"/>
           </a:p>
@@ -3108,7 +3101,7 @@
           <a:p>
             <a:fld id="{04C022AF-FDA7-5F49-8ED6-EF7E40D2900D}" type="datetimeFigureOut">
               <a:rPr lang="en-US" smtClean="0"/>
-              <a:t>13/11/16</a:t>
+              <a:t>11/13/2016</a:t>
             </a:fld>
             <a:endParaRPr lang="en-US"/>
           </a:p>
@@ -3150,7 +3143,7 @@
           <a:p>
             <a:fld id="{731D8DCA-ED65-174D-8524-A15D60332472}" type="slidenum">
               <a:rPr lang="en-US" smtClean="0"/>
-              <a:t>‹#›</a:t>
+              <a:t>‹N›</a:t>
             </a:fld>
             <a:endParaRPr lang="en-US"/>
           </a:p>
@@ -3396,7 +3389,7 @@
           <a:p>
             <a:fld id="{04C022AF-FDA7-5F49-8ED6-EF7E40D2900D}" type="datetimeFigureOut">
               <a:rPr lang="en-US" smtClean="0"/>
-              <a:t>13/11/16</a:t>
+              <a:t>11/13/2016</a:t>
             </a:fld>
             <a:endParaRPr lang="en-US"/>
           </a:p>
@@ -3438,7 +3431,7 @@
           <a:p>
             <a:fld id="{731D8DCA-ED65-174D-8524-A15D60332472}" type="slidenum">
               <a:rPr lang="en-US" smtClean="0"/>
-              <a:t>‹#›</a:t>
+              <a:t>‹N›</a:t>
             </a:fld>
             <a:endParaRPr lang="en-US"/>
           </a:p>
@@ -3818,7 +3811,7 @@
           <a:p>
             <a:fld id="{04C022AF-FDA7-5F49-8ED6-EF7E40D2900D}" type="datetimeFigureOut">
               <a:rPr lang="en-US" smtClean="0"/>
-              <a:t>13/11/16</a:t>
+              <a:t>11/13/2016</a:t>
             </a:fld>
             <a:endParaRPr lang="en-US"/>
           </a:p>
@@ -3860,7 +3853,7 @@
           <a:p>
             <a:fld id="{731D8DCA-ED65-174D-8524-A15D60332472}" type="slidenum">
               <a:rPr lang="en-US" smtClean="0"/>
-              <a:t>‹#›</a:t>
+              <a:t>‹N›</a:t>
             </a:fld>
             <a:endParaRPr lang="en-US"/>
           </a:p>
@@ -3936,7 +3929,7 @@
           <a:p>
             <a:fld id="{04C022AF-FDA7-5F49-8ED6-EF7E40D2900D}" type="datetimeFigureOut">
               <a:rPr lang="en-US" smtClean="0"/>
-              <a:t>13/11/16</a:t>
+              <a:t>11/13/2016</a:t>
             </a:fld>
             <a:endParaRPr lang="en-US"/>
           </a:p>
@@ -3978,7 +3971,7 @@
           <a:p>
             <a:fld id="{731D8DCA-ED65-174D-8524-A15D60332472}" type="slidenum">
               <a:rPr lang="en-US" smtClean="0"/>
-              <a:t>‹#›</a:t>
+              <a:t>‹N›</a:t>
             </a:fld>
             <a:endParaRPr lang="en-US"/>
           </a:p>
@@ -4031,7 +4024,7 @@
           <a:p>
             <a:fld id="{04C022AF-FDA7-5F49-8ED6-EF7E40D2900D}" type="datetimeFigureOut">
               <a:rPr lang="en-US" smtClean="0"/>
-              <a:t>13/11/16</a:t>
+              <a:t>11/13/2016</a:t>
             </a:fld>
             <a:endParaRPr lang="en-US"/>
           </a:p>
@@ -4073,7 +4066,7 @@
           <a:p>
             <a:fld id="{731D8DCA-ED65-174D-8524-A15D60332472}" type="slidenum">
               <a:rPr lang="en-US" smtClean="0"/>
-              <a:t>‹#›</a:t>
+              <a:t>‹N›</a:t>
             </a:fld>
             <a:endParaRPr lang="en-US"/>
           </a:p>
@@ -4308,7 +4301,7 @@
           <a:p>
             <a:fld id="{04C022AF-FDA7-5F49-8ED6-EF7E40D2900D}" type="datetimeFigureOut">
               <a:rPr lang="en-US" smtClean="0"/>
-              <a:t>13/11/16</a:t>
+              <a:t>11/13/2016</a:t>
             </a:fld>
             <a:endParaRPr lang="en-US"/>
           </a:p>
@@ -4350,7 +4343,7 @@
           <a:p>
             <a:fld id="{731D8DCA-ED65-174D-8524-A15D60332472}" type="slidenum">
               <a:rPr lang="en-US" smtClean="0"/>
-              <a:t>‹#›</a:t>
+              <a:t>‹N›</a:t>
             </a:fld>
             <a:endParaRPr lang="en-US"/>
           </a:p>
@@ -4561,7 +4554,7 @@
           <a:p>
             <a:fld id="{04C022AF-FDA7-5F49-8ED6-EF7E40D2900D}" type="datetimeFigureOut">
               <a:rPr lang="en-US" smtClean="0"/>
-              <a:t>13/11/16</a:t>
+              <a:t>11/13/2016</a:t>
             </a:fld>
             <a:endParaRPr lang="en-US"/>
           </a:p>
@@ -4603,7 +4596,7 @@
           <a:p>
             <a:fld id="{731D8DCA-ED65-174D-8524-A15D60332472}" type="slidenum">
               <a:rPr lang="en-US" smtClean="0"/>
-              <a:t>‹#›</a:t>
+              <a:t>‹N›</a:t>
             </a:fld>
             <a:endParaRPr lang="en-US"/>
           </a:p>
@@ -4774,7 +4767,7 @@
           <a:p>
             <a:fld id="{04C022AF-FDA7-5F49-8ED6-EF7E40D2900D}" type="datetimeFigureOut">
               <a:rPr lang="en-US" smtClean="0"/>
-              <a:t>13/11/16</a:t>
+              <a:t>11/13/2016</a:t>
             </a:fld>
             <a:endParaRPr lang="en-US"/>
           </a:p>
@@ -4852,7 +4845,7 @@
           <a:p>
             <a:fld id="{731D8DCA-ED65-174D-8524-A15D60332472}" type="slidenum">
               <a:rPr lang="en-US" smtClean="0"/>
-              <a:t>‹#›</a:t>
+              <a:t>‹N›</a:t>
             </a:fld>
             <a:endParaRPr lang="en-US"/>
           </a:p>
@@ -5168,10 +5161,6 @@
               <a:rPr lang="en-US" dirty="0" err="1"/>
               <a:t>PowerEnJoy</a:t>
             </a:r>
-            <a:r>
-              <a:rPr lang="en-US" dirty="0"/>
-              <a:t/>
-            </a:r>
             <a:br>
               <a:rPr lang="en-US" dirty="0"/>
             </a:br>
@@ -5288,7 +5277,7 @@
         </p:spPr>
         <p:txBody>
           <a:bodyPr>
-            <a:normAutofit/>
+            <a:normAutofit lnSpcReduction="10000"/>
           </a:bodyPr>
           <a:lstStyle/>
           <a:p>
@@ -5335,19 +5324,7 @@
             <a:pPr lvl="0"/>
             <a:r>
               <a:rPr lang="en-GB" dirty="0"/>
-              <a:t>The system has to unlock the car if the </a:t>
-            </a:r>
-            <a:r>
-              <a:rPr lang="en-GB" dirty="0" smtClean="0"/>
-              <a:t>distance between the position </a:t>
-            </a:r>
-            <a:r>
-              <a:rPr lang="en-GB" dirty="0"/>
-              <a:t>of the </a:t>
-            </a:r>
-            <a:r>
-              <a:rPr lang="en-GB" dirty="0" smtClean="0"/>
-              <a:t>user and the position of the car is smaller than a certain amount;</a:t>
+              <a:t>The system has to unlock the car if the distance between the position of the user and the position of the car is smaller than a certain amount;</a:t>
             </a:r>
             <a:endParaRPr lang="en-US" dirty="0"/>
           </a:p>
@@ -5661,25 +5638,8 @@
           <a:p>
             <a:r>
               <a:rPr lang="en-US" dirty="0"/>
-              <a:t>Actors and </a:t>
-            </a:r>
-            <a:r>
-              <a:rPr lang="en-US" dirty="0"/>
-              <a:t>s</a:t>
-            </a:r>
-            <a:r>
-              <a:rPr lang="en-US" dirty="0" smtClean="0"/>
-              <a:t>equence </a:t>
-            </a:r>
-            <a:r>
-              <a:rPr lang="en-US" dirty="0"/>
-              <a:t>d</a:t>
-            </a:r>
-            <a:r>
-              <a:rPr lang="en-US" dirty="0" smtClean="0"/>
-              <a:t>iagram</a:t>
-            </a:r>
-            <a:endParaRPr lang="en-US" dirty="0"/>
+              <a:t>Actors and sequence diagram</a:t>
+            </a:r>
           </a:p>
           <a:p>
             <a:r>
@@ -5752,27 +5712,7 @@
           <a:p>
             <a:r>
               <a:rPr lang="en-US" dirty="0"/>
-              <a:t>Actors and </a:t>
-            </a:r>
-            <a:r>
-              <a:rPr lang="en-US" dirty="0"/>
-              <a:t>s</a:t>
-            </a:r>
-            <a:r>
-              <a:rPr lang="en-US" dirty="0" smtClean="0"/>
-              <a:t>equence </a:t>
-            </a:r>
-            <a:r>
-              <a:rPr lang="en-US" dirty="0"/>
-              <a:t>d</a:t>
-            </a:r>
-            <a:r>
-              <a:rPr lang="en-US" dirty="0" smtClean="0"/>
-              <a:t>iagram</a:t>
-            </a:r>
-            <a:r>
-              <a:rPr lang="en-US" dirty="0"/>
-              <a:t>:</a:t>
+              <a:t>Actors and sequence diagram:</a:t>
             </a:r>
             <a:br>
               <a:rPr lang="en-US" dirty="0"/>
@@ -5797,7 +5737,7 @@
         <p:spPr/>
         <p:txBody>
           <a:bodyPr>
-            <a:normAutofit fontScale="85000" lnSpcReduction="10000"/>
+            <a:normAutofit fontScale="92500" lnSpcReduction="20000"/>
           </a:bodyPr>
           <a:lstStyle/>
           <a:p>
@@ -5904,38 +5844,14 @@
           <a:p>
             <a:r>
               <a:rPr lang="en-US" dirty="0"/>
-              <a:t>Actors and </a:t>
-            </a:r>
-            <a:r>
-              <a:rPr lang="en-US" dirty="0" smtClean="0"/>
-              <a:t>sequence </a:t>
-            </a:r>
-            <a:r>
-              <a:rPr lang="en-US" dirty="0"/>
-              <a:t>d</a:t>
-            </a:r>
-            <a:r>
-              <a:rPr lang="en-US" dirty="0" smtClean="0"/>
-              <a:t>iagram</a:t>
-            </a:r>
-            <a:r>
-              <a:rPr lang="en-US" dirty="0"/>
-              <a:t>:</a:t>
+              <a:t>Actors and sequence diagram:</a:t>
             </a:r>
             <a:br>
               <a:rPr lang="en-US" dirty="0"/>
             </a:br>
             <a:r>
               <a:rPr lang="en-US" dirty="0"/>
-              <a:t>Show Special Safe </a:t>
-            </a:r>
-            <a:r>
-              <a:rPr lang="en-US" dirty="0" smtClean="0"/>
-              <a:t>Areas (</a:t>
-            </a:r>
-            <a:r>
-              <a:rPr lang="en-US" dirty="0"/>
-              <a:t>1)</a:t>
+              <a:t>Show Special Safe Areas (1)</a:t>
             </a:r>
           </a:p>
         </p:txBody>
@@ -6017,38 +5933,14 @@
           <a:p>
             <a:r>
               <a:rPr lang="en-US" dirty="0"/>
-              <a:t>Actors and </a:t>
-            </a:r>
-            <a:r>
-              <a:rPr lang="en-US" dirty="0" smtClean="0"/>
-              <a:t>sequence </a:t>
-            </a:r>
-            <a:r>
-              <a:rPr lang="en-US" dirty="0"/>
-              <a:t>d</a:t>
-            </a:r>
-            <a:r>
-              <a:rPr lang="en-US" dirty="0" smtClean="0"/>
-              <a:t>iagram</a:t>
-            </a:r>
-            <a:r>
-              <a:rPr lang="en-US" dirty="0"/>
-              <a:t>:</a:t>
+              <a:t>Actors and sequence diagram:</a:t>
             </a:r>
             <a:br>
               <a:rPr lang="en-US" dirty="0"/>
             </a:br>
             <a:r>
               <a:rPr lang="en-US" dirty="0"/>
-              <a:t>Show Special Safe </a:t>
-            </a:r>
-            <a:r>
-              <a:rPr lang="en-US" dirty="0" smtClean="0"/>
-              <a:t>Areas (</a:t>
-            </a:r>
-            <a:r>
-              <a:rPr lang="en-US" dirty="0"/>
-              <a:t>2)</a:t>
+              <a:t>Show Special Safe Areas (2)</a:t>
             </a:r>
           </a:p>
         </p:txBody>
@@ -10234,12 +10126,8 @@
           </a:p>
           <a:p>
             <a:r>
-              <a:rPr lang="en-GB" dirty="0" smtClean="0"/>
-              <a:t>Add </a:t>
-            </a:r>
-            <a:r>
               <a:rPr lang="en-GB" dirty="0"/>
-              <a:t>a web site (create desktop front-end with the help of the mobile front-end);</a:t>
+              <a:t>Add a web site (create desktop front-end with the help of the mobile front-end);</a:t>
             </a:r>
           </a:p>
           <a:p>
@@ -10270,15 +10158,7 @@
             <a:pPr lvl="0"/>
             <a:r>
               <a:rPr lang="en-GB" dirty="0"/>
-              <a:t>Share car reservation info with friends </a:t>
-            </a:r>
-            <a:r>
-              <a:rPr lang="en-GB" dirty="0" smtClean="0"/>
-              <a:t>by email</a:t>
-            </a:r>
-            <a:r>
-              <a:rPr lang="en-GB" dirty="0"/>
-              <a:t>, SMS or </a:t>
+              <a:t>Share car reservation info with friends by email, SMS or </a:t>
             </a:r>
             <a:r>
               <a:rPr lang="en-GB" dirty="0" err="1"/>
@@ -10445,35 +10325,14 @@
           <a:p>
             <a:r>
               <a:rPr lang="en-GB" dirty="0"/>
-              <a:t>It is only possible to reserve a car </a:t>
-            </a:r>
-            <a:r>
-              <a:rPr lang="en-GB" dirty="0" smtClean="0"/>
-              <a:t>for the </a:t>
-            </a:r>
-            <a:r>
-              <a:rPr lang="en-GB" dirty="0"/>
-              <a:t>current time and the reservation expires after one hour if the user doesn’t pickup the car in time;</a:t>
+              <a:t>It is only possible to reserve a car for the current time and the reservation expires after one hour if the user doesn’t pickup the car in time;</a:t>
             </a:r>
           </a:p>
           <a:p>
             <a:r>
               <a:rPr lang="en-US" dirty="0"/>
-              <a:t>It is said that “The system stops charging the user as soon as the car is parked in a safe area and the user exits the car”. Since “the user exits the car” is ambiguous, we assumed that this is true when the user is not near the car </a:t>
-            </a:r>
-            <a:r>
-              <a:rPr lang="en-US" dirty="0" smtClean="0"/>
-              <a:t>anymore, </a:t>
-            </a:r>
-            <a:r>
-              <a:rPr lang="en-US" dirty="0"/>
-              <a:t>namely when the distance between user and car is bigger than a certain </a:t>
-            </a:r>
-            <a:r>
-              <a:rPr lang="en-US" dirty="0" smtClean="0"/>
-              <a:t>amount:</a:t>
-            </a:r>
-            <a:endParaRPr lang="en-US" dirty="0"/>
+              <a:t>It is said that “The system stops charging the user as soon as the car is parked in a safe area and the user exits the car”. Since “the user exits the car” is ambiguous, we assumed that this is true when the user is not near the car anymore, namely when the distance between user and car is bigger than a certain amount:</a:t>
+            </a:r>
           </a:p>
           <a:p>
             <a:pPr lvl="1">
@@ -10500,15 +10359,7 @@
             <a:pPr lvl="0"/>
             <a:r>
               <a:rPr lang="en-GB" dirty="0"/>
-              <a:t>The discount for having at least two other passengers </a:t>
-            </a:r>
-            <a:r>
-              <a:rPr lang="en-GB" dirty="0" smtClean="0"/>
-              <a:t>into </a:t>
-            </a:r>
-            <a:r>
-              <a:rPr lang="en-GB" dirty="0"/>
-              <a:t>the car is applied only if those passengers are in the car before the engine ignites.</a:t>
+              <a:t>The discount for having at least two other passengers into the car is applied only if those passengers are in the car before the engine ignites.</a:t>
             </a:r>
             <a:endParaRPr lang="en-US" dirty="0"/>
           </a:p>
@@ -10745,15 +10596,7 @@
             <a:pPr lvl="0"/>
             <a:r>
               <a:rPr lang="en-GB" dirty="0"/>
-              <a:t>Users </a:t>
-            </a:r>
-            <a:r>
-              <a:rPr lang="en-GB" dirty="0" smtClean="0"/>
-              <a:t>can register </a:t>
-            </a:r>
-            <a:r>
-              <a:rPr lang="en-GB" dirty="0"/>
-              <a:t>to the system and have their personal area;</a:t>
+              <a:t>Users can register to the system and have their personal area;</a:t>
             </a:r>
             <a:endParaRPr lang="en-US" dirty="0"/>
           </a:p>
@@ -10842,15 +10685,7 @@
             <a:pPr lvl="0"/>
             <a:r>
               <a:rPr lang="en-GB" dirty="0"/>
-              <a:t>All the users have a device connected to the Internet, possibly </a:t>
-            </a:r>
-            <a:r>
-              <a:rPr lang="en-GB" dirty="0" smtClean="0"/>
-              <a:t>with </a:t>
-            </a:r>
-            <a:r>
-              <a:rPr lang="en-GB" dirty="0"/>
-              <a:t>GPS built in;</a:t>
+              <a:t>All the users have a device connected to the Internet, possibly with GPS built in;</a:t>
             </a:r>
             <a:endParaRPr lang="en-US" dirty="0"/>
           </a:p>
@@ -10866,23 +10701,7 @@
             <a:pPr lvl="0"/>
             <a:r>
               <a:rPr lang="en-GB" dirty="0"/>
-              <a:t>All the electric cars </a:t>
-            </a:r>
-            <a:r>
-              <a:rPr lang="en-GB" dirty="0" smtClean="0"/>
-              <a:t>have </a:t>
-            </a:r>
-            <a:r>
-              <a:rPr lang="en-GB" dirty="0"/>
-              <a:t>GPS, a sensor for every seat which detect the presence of a passenger, </a:t>
-            </a:r>
-            <a:r>
-              <a:rPr lang="en-GB" dirty="0" smtClean="0"/>
-              <a:t>and Internet </a:t>
-            </a:r>
-            <a:r>
-              <a:rPr lang="en-GB" dirty="0"/>
-              <a:t>connection:</a:t>
+              <a:t>All the electric cars have GPS, a sensor for every seat which detect the presence of a passenger, and Internet connection:</a:t>
             </a:r>
           </a:p>
           <a:p>
@@ -10985,24 +10804,16 @@
           <a:p>
             <a:pPr lvl="0"/>
             <a:r>
-              <a:rPr lang="en-GB" dirty="0" smtClean="0"/>
-              <a:t>Power </a:t>
-            </a:r>
-            <a:r>
               <a:rPr lang="en-GB" dirty="0"/>
-              <a:t>grid maintenance is always ok.</a:t>
+              <a:t>Power grid maintenance is always ok.</a:t>
             </a:r>
             <a:endParaRPr lang="it-IT" dirty="0"/>
           </a:p>
           <a:p>
             <a:pPr lvl="0"/>
             <a:r>
-              <a:rPr lang="en-GB" dirty="0" smtClean="0"/>
-              <a:t>Users </a:t>
-            </a:r>
-            <a:r>
               <a:rPr lang="en-GB" dirty="0"/>
-              <a:t>behave politely and have no intention of cheating;</a:t>
+              <a:t>Users behave politely and have no intention of cheating;</a:t>
             </a:r>
           </a:p>
           <a:p>
@@ -11109,15 +10920,7 @@
             </a:pPr>
             <a:r>
               <a:rPr lang="en-GB" sz="4000" i="1" u="sng" dirty="0"/>
-              <a:t>Users </a:t>
-            </a:r>
-            <a:r>
-              <a:rPr lang="en-GB" sz="4000" i="1" u="sng" dirty="0" smtClean="0"/>
-              <a:t>can </a:t>
-            </a:r>
-            <a:r>
-              <a:rPr lang="en-GB" sz="4000" i="1" u="sng" dirty="0"/>
-              <a:t>see and select an available car close to him, or close to a specified address, and reserve it for up to one hour before they pick it up</a:t>
+              <a:t>Users can see and select an available car close to him, or close to a specified address, and reserve it for up to one hour before they pick it up</a:t>
             </a:r>
             <a:r>
               <a:rPr lang="en-US" sz="4000" dirty="0"/>
@@ -11137,7 +10940,14 @@
             <a:pPr lvl="0"/>
             <a:r>
               <a:rPr lang="en-GB" sz="4000" dirty="0"/>
-              <a:t>The system has to detect if a car is parked in a Safe Area and its battery level;</a:t>
+              <a:t>The system has to detect if a car is parked in a Safe Area;</a:t>
+            </a:r>
+          </a:p>
+          <a:p>
+            <a:pPr lvl="0"/>
+            <a:r>
+              <a:rPr lang="en-GB" sz="4000" dirty="0"/>
+              <a:t>The system has to detect the battery level of each car;</a:t>
             </a:r>
             <a:endParaRPr lang="en-US" sz="4000" dirty="0"/>
           </a:p>
@@ -11153,19 +10963,7 @@
             <a:pPr lvl="0"/>
             <a:r>
               <a:rPr lang="en-GB" sz="4000" dirty="0"/>
-              <a:t>The system has to be able to identify the location of a </a:t>
-            </a:r>
-            <a:r>
-              <a:rPr lang="en-GB" sz="4000" dirty="0" smtClean="0"/>
-              <a:t>user or </a:t>
-            </a:r>
-            <a:r>
-              <a:rPr lang="en-GB" sz="4000" dirty="0"/>
-              <a:t>through his/her GPS, if he/she gives the </a:t>
-            </a:r>
-            <a:r>
-              <a:rPr lang="en-GB" sz="4000" dirty="0" smtClean="0"/>
-              <a:t>consent, or through some input;</a:t>
+              <a:t>The system has to be able to identify the location of a user or through his/her GPS, if he/she gives the consent, or through some input;</a:t>
             </a:r>
             <a:endParaRPr lang="en-US" sz="4000" dirty="0"/>
           </a:p>

</xml_diff>

<commit_message>
added car unlocking sequence diagram
</commit_message>
<xml_diff>
--- a/RASD/presentation/RASD_presentation.pptx
+++ b/RASD/presentation/RASD_presentation.pptx
@@ -136,7 +136,7 @@
   </p:defaultTextStyle>
   <p:extLst>
     <p:ext uri="{EFAFB233-063F-42B5-8137-9DF3F51BA10A}">
-      <p15:sldGuideLst xmlns:p15="http://schemas.microsoft.com/office/powerpoint/2012/main" xmlns="">
+      <p15:sldGuideLst xmlns:p15="http://schemas.microsoft.com/office/powerpoint/2012/main">
         <p15:guide id="1" orient="horz" pos="2160">
           <p15:clr>
             <a:srgbClr val="A4A3A4"/>
@@ -235,7 +235,7 @@
           <a:p>
             <a:fld id="{66886BA6-36FE-CA4B-80D9-68E45FED626A}" type="datetimeFigureOut">
               <a:rPr lang="en-US" smtClean="0"/>
-              <a:t>15/11/16</a:t>
+              <a:t>11/15/2016</a:t>
             </a:fld>
             <a:endParaRPr lang="en-US"/>
           </a:p>
@@ -299,35 +299,35 @@
           <a:p>
             <a:pPr lvl="0"/>
             <a:r>
-              <a:rPr lang="it-IT" smtClean="0"/>
+              <a:rPr lang="it-IT"/>
               <a:t>Click to edit Master text styles</a:t>
             </a:r>
           </a:p>
           <a:p>
             <a:pPr lvl="1"/>
             <a:r>
-              <a:rPr lang="it-IT" smtClean="0"/>
+              <a:rPr lang="it-IT"/>
               <a:t>Second level</a:t>
             </a:r>
           </a:p>
           <a:p>
             <a:pPr lvl="2"/>
             <a:r>
-              <a:rPr lang="it-IT" smtClean="0"/>
+              <a:rPr lang="it-IT"/>
               <a:t>Third level</a:t>
             </a:r>
           </a:p>
           <a:p>
             <a:pPr lvl="3"/>
             <a:r>
-              <a:rPr lang="it-IT" smtClean="0"/>
+              <a:rPr lang="it-IT"/>
               <a:t>Fourth level</a:t>
             </a:r>
           </a:p>
           <a:p>
             <a:pPr lvl="4"/>
             <a:r>
-              <a:rPr lang="it-IT" smtClean="0"/>
+              <a:rPr lang="it-IT"/>
               <a:t>Fifth level</a:t>
             </a:r>
             <a:endParaRPr lang="en-US"/>
@@ -394,7 +394,7 @@
           <a:p>
             <a:fld id="{A054EB85-D703-354E-85A0-B0DA9D143C24}" type="slidenum">
               <a:rPr lang="en-US" smtClean="0"/>
-              <a:t>‹#›</a:t>
+              <a:t>‹N›</a:t>
             </a:fld>
             <a:endParaRPr lang="en-US"/>
           </a:p>
@@ -548,11 +548,11 @@
           <a:lstStyle/>
           <a:p>
             <a:r>
-              <a:rPr lang="en-US" dirty="0" smtClean="0"/>
+              <a:rPr lang="en-US" dirty="0"/>
               <a:t>This is</a:t>
             </a:r>
             <a:r>
-              <a:rPr lang="en-US" baseline="0" dirty="0" smtClean="0"/>
+              <a:rPr lang="en-US" baseline="0" dirty="0"/>
               <a:t> our roadmap, so we will discuss briefly about these points. We will show you just an overview of our RASD document because of the little time we have</a:t>
             </a:r>
           </a:p>
@@ -656,7 +656,7 @@
               <a:defRPr/>
             </a:pPr>
             <a:r>
-              <a:rPr lang="en-GB" sz="1200" kern="1200" dirty="0" smtClean="0">
+              <a:rPr lang="en-GB" sz="1200" kern="1200" dirty="0">
                 <a:solidFill>
                   <a:schemeClr val="tx1"/>
                 </a:solidFill>
@@ -665,22 +665,10 @@
                 <a:ea typeface="+mn-ea"/>
                 <a:cs typeface="+mn-cs"/>
               </a:rPr>
-              <a:t>We have </a:t>
-            </a:r>
-            <a:r>
-              <a:rPr lang="en-GB" sz="1200" kern="1200" dirty="0" smtClean="0">
-                <a:solidFill>
-                  <a:schemeClr val="tx1"/>
-                </a:solidFill>
-                <a:effectLst/>
-                <a:latin typeface="+mn-lt"/>
-                <a:ea typeface="+mn-ea"/>
-                <a:cs typeface="+mn-cs"/>
-              </a:rPr>
-              <a:t>decided that our system will be initially implemented only as a web-app. Since the user has to pick up the reserved car in only one hour since the moment of the reservation, we considered the </a:t>
-            </a:r>
-            <a:r>
-              <a:rPr lang="en-GB" sz="1200" kern="1200" dirty="0" err="1" smtClean="0">
+              <a:t>We have decided that our system will be initially implemented only as a web-app. Since the user has to pick up the reserved car in only one hour since the moment of the reservation, we considered the </a:t>
+            </a:r>
+            <a:r>
+              <a:rPr lang="en-GB" sz="1200" kern="1200" dirty="0" err="1">
                 <a:solidFill>
                   <a:schemeClr val="tx1"/>
                 </a:solidFill>
@@ -692,7 +680,7 @@
               <a:t>PowerEnjoy</a:t>
             </a:r>
             <a:r>
-              <a:rPr lang="en-GB" sz="1200" kern="1200" dirty="0" smtClean="0">
+              <a:rPr lang="en-GB" sz="1200" kern="1200" dirty="0">
                 <a:solidFill>
                   <a:schemeClr val="tx1"/>
                 </a:solidFill>
@@ -703,7 +691,7 @@
               </a:rPr>
               <a:t> service as an “on the fly” service and therefore we preferred the web app instead of the web site. However, we will take the necessary precautions to make it easy to build the web site in the future.</a:t>
             </a:r>
-            <a:endParaRPr lang="it-IT" sz="1200" kern="1200" dirty="0" smtClean="0">
+            <a:endParaRPr lang="it-IT" sz="1200" kern="1200" dirty="0">
               <a:solidFill>
                 <a:schemeClr val="tx1"/>
               </a:solidFill>
@@ -714,7 +702,7 @@
             </a:endParaRPr>
           </a:p>
           <a:p>
-            <a:endParaRPr lang="en-US" dirty="0" smtClean="0"/>
+            <a:endParaRPr lang="en-US" dirty="0"/>
           </a:p>
           <a:p>
             <a:pPr marL="0" marR="0" indent="0" algn="l" defTabSz="457200" rtl="0" eaLnBrk="1" fontAlgn="auto" latinLnBrk="0" hangingPunct="1">
@@ -735,7 +723,7 @@
               <a:defRPr/>
             </a:pPr>
             <a:r>
-              <a:rPr lang="en-GB" sz="1200" kern="1200" dirty="0" smtClean="0">
+              <a:rPr lang="en-GB" sz="1200" kern="1200" dirty="0">
                 <a:solidFill>
                   <a:schemeClr val="tx1"/>
                 </a:solidFill>
@@ -765,7 +753,7 @@
               <a:tabLst/>
               <a:defRPr/>
             </a:pPr>
-            <a:endParaRPr lang="en-US" dirty="0" smtClean="0"/>
+            <a:endParaRPr lang="en-US" dirty="0"/>
           </a:p>
           <a:p>
             <a:pPr marL="0" marR="0" indent="0" algn="l" defTabSz="457200" rtl="0" eaLnBrk="1" fontAlgn="auto" latinLnBrk="0" hangingPunct="1">
@@ -786,7 +774,7 @@
               <a:defRPr/>
             </a:pPr>
             <a:r>
-              <a:rPr lang="en-GB" sz="1200" kern="1200" dirty="0" smtClean="0">
+              <a:rPr lang="en-GB" sz="1200" kern="1200" dirty="0">
                 <a:solidFill>
                   <a:schemeClr val="tx1"/>
                 </a:solidFill>
@@ -798,7 +786,7 @@
               <a:t>Of course, the electric cars must be able to communicate with the server, so they must be provided with an Internet connection and an on-board computer. However, all the business logic will lie on the server,</a:t>
             </a:r>
             <a:r>
-              <a:rPr lang="en-GB" sz="1200" kern="1200" baseline="0" dirty="0" smtClean="0">
+              <a:rPr lang="en-GB" sz="1200" kern="1200" baseline="0" dirty="0">
                 <a:solidFill>
                   <a:schemeClr val="tx1"/>
                 </a:solidFill>
@@ -807,21 +795,9 @@
                 <a:ea typeface="+mn-ea"/>
                 <a:cs typeface="+mn-cs"/>
               </a:rPr>
-              <a:t> so there will be only some API calls</a:t>
-            </a:r>
-            <a:r>
-              <a:rPr lang="en-GB" sz="1200" kern="1200" baseline="0" dirty="0" smtClean="0">
-                <a:solidFill>
-                  <a:schemeClr val="tx1"/>
-                </a:solidFill>
-                <a:effectLst/>
-                <a:latin typeface="+mn-lt"/>
-                <a:ea typeface="+mn-ea"/>
-                <a:cs typeface="+mn-cs"/>
-              </a:rPr>
-              <a:t>.</a:t>
-            </a:r>
-            <a:endParaRPr lang="it-IT" sz="1200" kern="1200" dirty="0" smtClean="0">
+              <a:t> so there will be only some API calls.</a:t>
+            </a:r>
+            <a:endParaRPr lang="it-IT" sz="1200" kern="1200" dirty="0">
               <a:solidFill>
                 <a:schemeClr val="tx1"/>
               </a:solidFill>
@@ -914,10 +890,9 @@
           <a:lstStyle/>
           <a:p>
             <a:r>
-              <a:rPr lang="en-US" dirty="0" smtClean="0"/>
+              <a:rPr lang="en-US" dirty="0"/>
               <a:t>READ</a:t>
             </a:r>
-            <a:endParaRPr lang="en-US" dirty="0"/>
           </a:p>
         </p:txBody>
       </p:sp>
@@ -1002,10 +977,9 @@
           <a:lstStyle/>
           <a:p>
             <a:r>
-              <a:rPr lang="en-US" dirty="0" smtClean="0"/>
+              <a:rPr lang="en-US" dirty="0"/>
               <a:t>READ</a:t>
             </a:r>
-            <a:endParaRPr lang="en-US" dirty="0"/>
           </a:p>
         </p:txBody>
       </p:sp>
@@ -1090,29 +1064,29 @@
           <a:lstStyle/>
           <a:p>
             <a:r>
-              <a:rPr lang="en-US" dirty="0" smtClean="0"/>
+              <a:rPr lang="en-US" dirty="0"/>
               <a:t>This is a sequence diagram that shows the steps with which the user can</a:t>
             </a:r>
             <a:r>
-              <a:rPr lang="en-US" baseline="0" dirty="0" smtClean="0"/>
+              <a:rPr lang="en-US" baseline="0" dirty="0"/>
               <a:t> see the special safe areas.</a:t>
             </a:r>
           </a:p>
           <a:p>
-            <a:endParaRPr lang="en-US" baseline="0" dirty="0" smtClean="0"/>
-          </a:p>
-          <a:p>
-            <a:r>
-              <a:rPr lang="en-US" baseline="0" dirty="0" smtClean="0"/>
+            <a:endParaRPr lang="en-US" baseline="0" dirty="0"/>
+          </a:p>
+          <a:p>
+            <a:r>
+              <a:rPr lang="en-US" baseline="0" dirty="0"/>
               <a:t>The user send a request for the map to our server, which in turn asks an external actor, for example Google Maps, information about the map with a standard position (or its position if GPS is enabled).</a:t>
             </a:r>
           </a:p>
           <a:p>
-            <a:endParaRPr lang="en-US" baseline="0" dirty="0" smtClean="0"/>
-          </a:p>
-          <a:p>
-            <a:r>
-              <a:rPr lang="en-US" baseline="0" dirty="0" smtClean="0"/>
+            <a:endParaRPr lang="en-US" baseline="0" dirty="0"/>
+          </a:p>
+          <a:p>
+            <a:r>
+              <a:rPr lang="en-US" baseline="0" dirty="0"/>
               <a:t>Then the user asks the server for a specific map with a certain position, which replies again with the help of the external actor, and finally specify that he/she wants to know where the Special Safe Areas are.</a:t>
             </a:r>
             <a:endParaRPr lang="en-US" dirty="0"/>
@@ -1200,11 +1174,11 @@
           <a:lstStyle/>
           <a:p>
             <a:r>
-              <a:rPr lang="en-US" dirty="0" smtClean="0"/>
+              <a:rPr lang="en-US" dirty="0"/>
               <a:t>This last step is done without the</a:t>
             </a:r>
             <a:r>
-              <a:rPr lang="en-US" baseline="0" dirty="0" smtClean="0"/>
+              <a:rPr lang="en-US" baseline="0" dirty="0"/>
               <a:t> need of the external actor because information relative to the parking positions is known by our server only. Our app will manage this data and show the parking positions to the user accordingly.</a:t>
             </a:r>
             <a:endParaRPr lang="en-US" dirty="0"/>
@@ -1292,26 +1266,26 @@
           <a:lstStyle/>
           <a:p>
             <a:r>
-              <a:rPr lang="en-US" dirty="0" smtClean="0"/>
+              <a:rPr lang="en-US" dirty="0"/>
               <a:t>We</a:t>
             </a:r>
             <a:r>
-              <a:rPr lang="en-US" baseline="0" dirty="0" smtClean="0"/>
+              <a:rPr lang="en-US" baseline="0" dirty="0"/>
               <a:t> begin with signatures!</a:t>
             </a:r>
           </a:p>
           <a:p>
-            <a:endParaRPr lang="en-US" baseline="0" dirty="0" smtClean="0"/>
-          </a:p>
-          <a:p>
-            <a:r>
-              <a:rPr lang="en-US" baseline="0" dirty="0" smtClean="0"/>
+            <a:endParaRPr lang="en-US" baseline="0" dirty="0"/>
+          </a:p>
+          <a:p>
+            <a:r>
+              <a:rPr lang="en-US" baseline="0" dirty="0"/>
               <a:t>We have the User, which have credentials (by credentials we mean everything that someone needs in order to authenticate to the system).</a:t>
             </a:r>
           </a:p>
           <a:p>
             <a:r>
-              <a:rPr lang="en-US" baseline="0" dirty="0" smtClean="0"/>
+              <a:rPr lang="en-US" baseline="0" dirty="0"/>
               <a:t>There is the payment info and then its current Location, that we’ll see later. If GPS is enabled, than this location would be used to specify to the system if the user is near a car. If it’s not enabled, the user can send its position through some input.</a:t>
             </a:r>
           </a:p>
@@ -1499,24 +1473,8 @@
               <a:defRPr/>
             </a:pPr>
             <a:r>
-              <a:rPr lang="en-US" baseline="0" dirty="0" smtClean="0"/>
-              <a:t>Let’s start with text </a:t>
-            </a:r>
-            <a:r>
-              <a:rPr lang="en-US" baseline="0" dirty="0" smtClean="0"/>
-              <a:t>assumptions. In </a:t>
-            </a:r>
-            <a:r>
-              <a:rPr lang="en-US" baseline="0" dirty="0" smtClean="0"/>
-              <a:t>the reality, we would have created </a:t>
-            </a:r>
-            <a:r>
-              <a:rPr lang="en-US" baseline="0" dirty="0" smtClean="0"/>
-              <a:t>the RASD with </a:t>
-            </a:r>
-            <a:r>
-              <a:rPr lang="en-US" baseline="0" dirty="0" smtClean="0"/>
-              <a:t>an iterative process, involving customers in order to achieve a document approved by everyone, without text assumptions of course.</a:t>
+              <a:rPr lang="en-US" baseline="0" dirty="0"/>
+              <a:t>Let’s start with text assumptions. In the reality, we would have created the RASD with an iterative process, involving customers in order to achieve a document approved by everyone, without text assumptions of course.</a:t>
             </a:r>
           </a:p>
           <a:p>
@@ -1605,24 +1563,24 @@
           <a:lstStyle/>
           <a:p>
             <a:r>
-              <a:rPr lang="en-US" baseline="0" dirty="0" smtClean="0"/>
+              <a:rPr lang="en-US" baseline="0" dirty="0"/>
               <a:t>The first assumption we took is about when the reservation of a car starts. Consider the case where a user reserves a car for this evening at 8pm. The problem is that we don’t know when a user will leave the car. One possible solution may be to mark the car as not available from now to this evening, but that would imply a big waste in terms of car availability. Therefore we opted for another solution where the user can only reserve a car whose “pickup timer” starts immediately.</a:t>
             </a:r>
           </a:p>
           <a:p>
-            <a:endParaRPr lang="en-US" baseline="0" dirty="0" smtClean="0"/>
-          </a:p>
-          <a:p>
-            <a:r>
-              <a:rPr lang="en-US" baseline="0" dirty="0" smtClean="0"/>
+            <a:endParaRPr lang="en-US" baseline="0" dirty="0"/>
+          </a:p>
+          <a:p>
+            <a:r>
+              <a:rPr lang="en-US" baseline="0" dirty="0"/>
               <a:t>Another assumption we took is about when the system stops charging the user for a ride. It is said in the spec doc that </a:t>
             </a:r>
             <a:r>
-              <a:rPr lang="en-US" dirty="0" smtClean="0"/>
+              <a:rPr lang="en-US" dirty="0"/>
               <a:t>that “The system stops charging the user as soon as the car is parked in a safe area and the user exits the car”.</a:t>
             </a:r>
             <a:r>
-              <a:rPr lang="en-US" baseline="0" dirty="0" smtClean="0"/>
+              <a:rPr lang="en-US" baseline="0" dirty="0"/>
               <a:t> However, since “the user exits the car” is ambiguous, we assumed that it’s true when the user isn’t near the car anymore, that is when the distance between the user and the car is bigger than a certain amount. Since now we know what “the user exits the car” means in a not ambiguous way, we can also assume that, for example,  READ SUB_LIST[0]. </a:t>
             </a:r>
           </a:p>
@@ -1709,10 +1667,9 @@
           <a:lstStyle/>
           <a:p>
             <a:r>
-              <a:rPr lang="en-US" baseline="0" dirty="0" smtClean="0"/>
+              <a:rPr lang="en-US" baseline="0" dirty="0"/>
               <a:t>We did our best in order to extract some requirements that, together with the domain properties, fulfill the goals of our customers. In order to do a good job, we also need to make sure that the goals capture all the stakeholders needs and that domain properties are valid assumptions.</a:t>
             </a:r>
-            <a:endParaRPr lang="en-US" baseline="0" dirty="0" smtClean="0"/>
           </a:p>
         </p:txBody>
       </p:sp>
@@ -1797,29 +1754,29 @@
           <a:lstStyle/>
           <a:p>
             <a:r>
-              <a:rPr lang="en-US" dirty="0" smtClean="0"/>
+              <a:rPr lang="en-US" dirty="0"/>
               <a:t>These</a:t>
             </a:r>
             <a:r>
-              <a:rPr lang="en-US" baseline="0" dirty="0" smtClean="0"/>
+              <a:rPr lang="en-US" baseline="0" dirty="0"/>
               <a:t> are all our goals. We didn’t go into details and we wrote them remaining at a high level of abstraction.</a:t>
             </a:r>
           </a:p>
           <a:p>
-            <a:endParaRPr lang="en-US" baseline="0" dirty="0" smtClean="0"/>
-          </a:p>
-          <a:p>
-            <a:r>
-              <a:rPr lang="en-US" baseline="0" dirty="0" smtClean="0"/>
+            <a:endParaRPr lang="en-US" baseline="0" dirty="0"/>
+          </a:p>
+          <a:p>
+            <a:r>
+              <a:rPr lang="en-US" baseline="0" dirty="0"/>
               <a:t>Fro example,  READ GOALS 1, 2.</a:t>
             </a:r>
           </a:p>
           <a:p>
-            <a:endParaRPr lang="en-US" baseline="0" dirty="0" smtClean="0"/>
-          </a:p>
-          <a:p>
-            <a:r>
-              <a:rPr lang="en-US" baseline="0" dirty="0" smtClean="0"/>
+            <a:endParaRPr lang="en-US" baseline="0" dirty="0"/>
+          </a:p>
+          <a:p>
+            <a:r>
+              <a:rPr lang="en-US" baseline="0" dirty="0"/>
               <a:t>The last one, READ LAST GOAL, comprehends all the discounts or extra charges applied to users that behave in particular ways.</a:t>
             </a:r>
             <a:endParaRPr lang="en-US" dirty="0"/>
@@ -1907,11 +1864,11 @@
           <a:lstStyle/>
           <a:p>
             <a:r>
-              <a:rPr lang="en-US" dirty="0" smtClean="0"/>
+              <a:rPr lang="en-US" dirty="0"/>
               <a:t>As examples of domain properties,</a:t>
             </a:r>
             <a:r>
-              <a:rPr lang="en-US" baseline="0" dirty="0" smtClean="0"/>
+              <a:rPr lang="en-US" baseline="0" dirty="0"/>
               <a:t> we have some about devices. We assumed that all the users have a device connected to the internet, possibly – but not necessarily- with GPS built in. We also supposed that all the cars have a system able to run Java software, and have GPS, internet connection and other sensors (for example to detect the presence of passengers).</a:t>
             </a:r>
             <a:endParaRPr lang="en-US" dirty="0"/>
@@ -1999,34 +1956,34 @@
           <a:lstStyle/>
           <a:p>
             <a:r>
-              <a:rPr lang="en-US" dirty="0" smtClean="0"/>
+              <a:rPr lang="en-US" dirty="0"/>
               <a:t>Starting from high level goals, we have deduced detailed requirements. For</a:t>
             </a:r>
             <a:r>
-              <a:rPr lang="en-US" baseline="0" dirty="0" smtClean="0"/>
+              <a:rPr lang="en-US" baseline="0" dirty="0"/>
               <a:t> example, starting from the first goal we mentioned before, that is </a:t>
             </a:r>
             <a:r>
-              <a:rPr lang="is-IS" baseline="0" dirty="0" smtClean="0"/>
+              <a:rPr lang="is-IS" baseline="0" dirty="0"/>
               <a:t>…, the requirements are...</a:t>
             </a:r>
-            <a:endParaRPr lang="en-US" baseline="0" dirty="0" smtClean="0"/>
-          </a:p>
-          <a:p>
-            <a:endParaRPr lang="en-US" baseline="0" dirty="0" smtClean="0"/>
-          </a:p>
-          <a:p>
-            <a:r>
-              <a:rPr lang="en-US" baseline="0" dirty="0" smtClean="0"/>
+            <a:endParaRPr lang="en-US" baseline="0" dirty="0"/>
+          </a:p>
+          <a:p>
+            <a:endParaRPr lang="en-US" baseline="0" dirty="0"/>
+          </a:p>
+          <a:p>
+            <a:r>
+              <a:rPr lang="en-US" baseline="0" dirty="0"/>
               <a:t>READ REQ 1, 2. We need those two because the user must be able to see where the car is in order to decide to reserve it or not.</a:t>
             </a:r>
           </a:p>
           <a:p>
-            <a:endParaRPr lang="en-US" baseline="0" dirty="0" smtClean="0"/>
-          </a:p>
-          <a:p>
-            <a:r>
-              <a:rPr lang="en-US" baseline="0" dirty="0" smtClean="0"/>
+            <a:endParaRPr lang="en-US" baseline="0" dirty="0"/>
+          </a:p>
+          <a:p>
+            <a:r>
+              <a:rPr lang="en-US" baseline="0" dirty="0"/>
               <a:t>READ REQ 3, 4, 5, 6, 7.</a:t>
             </a:r>
           </a:p>
@@ -2113,29 +2070,29 @@
           <a:lstStyle/>
           <a:p>
             <a:r>
-              <a:rPr lang="en-US" dirty="0" smtClean="0"/>
+              <a:rPr lang="en-US" dirty="0"/>
               <a:t>Let’s see another goal with its requirements.</a:t>
             </a:r>
           </a:p>
           <a:p>
-            <a:endParaRPr lang="en-US" dirty="0" smtClean="0"/>
-          </a:p>
-          <a:p>
-            <a:r>
-              <a:rPr lang="en-US" dirty="0" smtClean="0"/>
+            <a:endParaRPr lang="en-US" dirty="0"/>
+          </a:p>
+          <a:p>
+            <a:r>
+              <a:rPr lang="en-US" dirty="0"/>
               <a:t>READ GOAL.</a:t>
             </a:r>
           </a:p>
           <a:p>
-            <a:endParaRPr lang="en-US" dirty="0" smtClean="0"/>
-          </a:p>
-          <a:p>
-            <a:r>
-              <a:rPr lang="en-US" dirty="0" smtClean="0"/>
+            <a:endParaRPr lang="en-US" dirty="0"/>
+          </a:p>
+          <a:p>
+            <a:r>
+              <a:rPr lang="en-US" dirty="0"/>
               <a:t>READ REQ</a:t>
             </a:r>
             <a:r>
-              <a:rPr lang="en-US" baseline="0" dirty="0" smtClean="0"/>
+              <a:rPr lang="en-US" baseline="0" dirty="0"/>
               <a:t> 1, 2. </a:t>
             </a:r>
             <a:endParaRPr lang="en-US" dirty="0"/>
@@ -2240,12 +2197,8 @@
               <a:defRPr/>
             </a:pPr>
             <a:r>
-              <a:rPr lang="en-US" baseline="0" dirty="0" smtClean="0"/>
-              <a:t>Now we are going to see a not formal, high level view of a possible system that could satisfy those requirements we have seen before. </a:t>
-            </a:r>
-            <a:r>
-              <a:rPr lang="en-US" baseline="0" dirty="0" smtClean="0"/>
-              <a:t>A formal view of such system will be in the Software Design Document.</a:t>
+              <a:rPr lang="en-US" baseline="0" dirty="0"/>
+              <a:t>Now we are going to see a not formal, high level view of a possible system that could satisfy those requirements we have seen before. A formal view of such system will be in the Software Design Document.</a:t>
             </a:r>
           </a:p>
           <a:p>
@@ -2470,7 +2423,7 @@
           <a:p>
             <a:fld id="{04C022AF-FDA7-5F49-8ED6-EF7E40D2900D}" type="datetimeFigureOut">
               <a:rPr lang="en-US" smtClean="0"/>
-              <a:t>15/11/16</a:t>
+              <a:t>11/15/2016</a:t>
             </a:fld>
             <a:endParaRPr lang="en-US"/>
           </a:p>
@@ -2512,7 +2465,7 @@
           <a:p>
             <a:fld id="{731D8DCA-ED65-174D-8524-A15D60332472}" type="slidenum">
               <a:rPr lang="en-US" smtClean="0"/>
-              <a:t>‹#›</a:t>
+              <a:t>‹N›</a:t>
             </a:fld>
             <a:endParaRPr lang="en-US"/>
           </a:p>
@@ -2640,7 +2593,7 @@
           <a:p>
             <a:fld id="{04C022AF-FDA7-5F49-8ED6-EF7E40D2900D}" type="datetimeFigureOut">
               <a:rPr lang="en-US" smtClean="0"/>
-              <a:t>15/11/16</a:t>
+              <a:t>11/15/2016</a:t>
             </a:fld>
             <a:endParaRPr lang="en-US"/>
           </a:p>
@@ -2682,7 +2635,7 @@
           <a:p>
             <a:fld id="{731D8DCA-ED65-174D-8524-A15D60332472}" type="slidenum">
               <a:rPr lang="en-US" smtClean="0"/>
-              <a:t>‹#›</a:t>
+              <a:t>‹N›</a:t>
             </a:fld>
             <a:endParaRPr lang="en-US"/>
           </a:p>
@@ -2820,7 +2773,7 @@
           <a:p>
             <a:fld id="{04C022AF-FDA7-5F49-8ED6-EF7E40D2900D}" type="datetimeFigureOut">
               <a:rPr lang="en-US" smtClean="0"/>
-              <a:t>15/11/16</a:t>
+              <a:t>11/15/2016</a:t>
             </a:fld>
             <a:endParaRPr lang="en-US"/>
           </a:p>
@@ -2862,7 +2815,7 @@
           <a:p>
             <a:fld id="{731D8DCA-ED65-174D-8524-A15D60332472}" type="slidenum">
               <a:rPr lang="en-US" smtClean="0"/>
-              <a:t>‹#›</a:t>
+              <a:t>‹N›</a:t>
             </a:fld>
             <a:endParaRPr lang="en-US"/>
           </a:p>
@@ -2990,7 +2943,7 @@
           <a:p>
             <a:fld id="{04C022AF-FDA7-5F49-8ED6-EF7E40D2900D}" type="datetimeFigureOut">
               <a:rPr lang="en-US" smtClean="0"/>
-              <a:t>15/11/16</a:t>
+              <a:t>11/15/2016</a:t>
             </a:fld>
             <a:endParaRPr lang="en-US"/>
           </a:p>
@@ -3032,7 +2985,7 @@
           <a:p>
             <a:fld id="{731D8DCA-ED65-174D-8524-A15D60332472}" type="slidenum">
               <a:rPr lang="en-US" smtClean="0"/>
-              <a:t>‹#›</a:t>
+              <a:t>‹N›</a:t>
             </a:fld>
             <a:endParaRPr lang="en-US"/>
           </a:p>
@@ -3236,7 +3189,7 @@
           <a:p>
             <a:fld id="{04C022AF-FDA7-5F49-8ED6-EF7E40D2900D}" type="datetimeFigureOut">
               <a:rPr lang="en-US" smtClean="0"/>
-              <a:t>15/11/16</a:t>
+              <a:t>11/15/2016</a:t>
             </a:fld>
             <a:endParaRPr lang="en-US"/>
           </a:p>
@@ -3278,7 +3231,7 @@
           <a:p>
             <a:fld id="{731D8DCA-ED65-174D-8524-A15D60332472}" type="slidenum">
               <a:rPr lang="en-US" smtClean="0"/>
-              <a:t>‹#›</a:t>
+              <a:t>‹N›</a:t>
             </a:fld>
             <a:endParaRPr lang="en-US"/>
           </a:p>
@@ -3524,7 +3477,7 @@
           <a:p>
             <a:fld id="{04C022AF-FDA7-5F49-8ED6-EF7E40D2900D}" type="datetimeFigureOut">
               <a:rPr lang="en-US" smtClean="0"/>
-              <a:t>15/11/16</a:t>
+              <a:t>11/15/2016</a:t>
             </a:fld>
             <a:endParaRPr lang="en-US"/>
           </a:p>
@@ -3566,7 +3519,7 @@
           <a:p>
             <a:fld id="{731D8DCA-ED65-174D-8524-A15D60332472}" type="slidenum">
               <a:rPr lang="en-US" smtClean="0"/>
-              <a:t>‹#›</a:t>
+              <a:t>‹N›</a:t>
             </a:fld>
             <a:endParaRPr lang="en-US"/>
           </a:p>
@@ -3946,7 +3899,7 @@
           <a:p>
             <a:fld id="{04C022AF-FDA7-5F49-8ED6-EF7E40D2900D}" type="datetimeFigureOut">
               <a:rPr lang="en-US" smtClean="0"/>
-              <a:t>15/11/16</a:t>
+              <a:t>11/15/2016</a:t>
             </a:fld>
             <a:endParaRPr lang="en-US"/>
           </a:p>
@@ -3988,7 +3941,7 @@
           <a:p>
             <a:fld id="{731D8DCA-ED65-174D-8524-A15D60332472}" type="slidenum">
               <a:rPr lang="en-US" smtClean="0"/>
-              <a:t>‹#›</a:t>
+              <a:t>‹N›</a:t>
             </a:fld>
             <a:endParaRPr lang="en-US"/>
           </a:p>
@@ -4064,7 +4017,7 @@
           <a:p>
             <a:fld id="{04C022AF-FDA7-5F49-8ED6-EF7E40D2900D}" type="datetimeFigureOut">
               <a:rPr lang="en-US" smtClean="0"/>
-              <a:t>15/11/16</a:t>
+              <a:t>11/15/2016</a:t>
             </a:fld>
             <a:endParaRPr lang="en-US"/>
           </a:p>
@@ -4106,7 +4059,7 @@
           <a:p>
             <a:fld id="{731D8DCA-ED65-174D-8524-A15D60332472}" type="slidenum">
               <a:rPr lang="en-US" smtClean="0"/>
-              <a:t>‹#›</a:t>
+              <a:t>‹N›</a:t>
             </a:fld>
             <a:endParaRPr lang="en-US"/>
           </a:p>
@@ -4159,7 +4112,7 @@
           <a:p>
             <a:fld id="{04C022AF-FDA7-5F49-8ED6-EF7E40D2900D}" type="datetimeFigureOut">
               <a:rPr lang="en-US" smtClean="0"/>
-              <a:t>15/11/16</a:t>
+              <a:t>11/15/2016</a:t>
             </a:fld>
             <a:endParaRPr lang="en-US"/>
           </a:p>
@@ -4201,7 +4154,7 @@
           <a:p>
             <a:fld id="{731D8DCA-ED65-174D-8524-A15D60332472}" type="slidenum">
               <a:rPr lang="en-US" smtClean="0"/>
-              <a:t>‹#›</a:t>
+              <a:t>‹N›</a:t>
             </a:fld>
             <a:endParaRPr lang="en-US"/>
           </a:p>
@@ -4436,7 +4389,7 @@
           <a:p>
             <a:fld id="{04C022AF-FDA7-5F49-8ED6-EF7E40D2900D}" type="datetimeFigureOut">
               <a:rPr lang="en-US" smtClean="0"/>
-              <a:t>15/11/16</a:t>
+              <a:t>11/15/2016</a:t>
             </a:fld>
             <a:endParaRPr lang="en-US"/>
           </a:p>
@@ -4478,7 +4431,7 @@
           <a:p>
             <a:fld id="{731D8DCA-ED65-174D-8524-A15D60332472}" type="slidenum">
               <a:rPr lang="en-US" smtClean="0"/>
-              <a:t>‹#›</a:t>
+              <a:t>‹N›</a:t>
             </a:fld>
             <a:endParaRPr lang="en-US"/>
           </a:p>
@@ -4689,7 +4642,7 @@
           <a:p>
             <a:fld id="{04C022AF-FDA7-5F49-8ED6-EF7E40D2900D}" type="datetimeFigureOut">
               <a:rPr lang="en-US" smtClean="0"/>
-              <a:t>15/11/16</a:t>
+              <a:t>11/15/2016</a:t>
             </a:fld>
             <a:endParaRPr lang="en-US"/>
           </a:p>
@@ -4731,7 +4684,7 @@
           <a:p>
             <a:fld id="{731D8DCA-ED65-174D-8524-A15D60332472}" type="slidenum">
               <a:rPr lang="en-US" smtClean="0"/>
-              <a:t>‹#›</a:t>
+              <a:t>‹N›</a:t>
             </a:fld>
             <a:endParaRPr lang="en-US"/>
           </a:p>
@@ -4902,7 +4855,7 @@
           <a:p>
             <a:fld id="{04C022AF-FDA7-5F49-8ED6-EF7E40D2900D}" type="datetimeFigureOut">
               <a:rPr lang="en-US" smtClean="0"/>
-              <a:t>15/11/16</a:t>
+              <a:t>11/15/2016</a:t>
             </a:fld>
             <a:endParaRPr lang="en-US"/>
           </a:p>
@@ -4980,7 +4933,7 @@
           <a:p>
             <a:fld id="{731D8DCA-ED65-174D-8524-A15D60332472}" type="slidenum">
               <a:rPr lang="en-US" smtClean="0"/>
-              <a:t>‹#›</a:t>
+              <a:t>‹N›</a:t>
             </a:fld>
             <a:endParaRPr lang="en-US"/>
           </a:p>
@@ -5296,10 +5249,6 @@
               <a:rPr lang="en-US" dirty="0" err="1"/>
               <a:t>PowerEnJoy</a:t>
             </a:r>
-            <a:r>
-              <a:rPr lang="en-US" dirty="0"/>
-              <a:t/>
-            </a:r>
             <a:br>
               <a:rPr lang="en-US" dirty="0"/>
             </a:br>
@@ -5450,18 +5399,13 @@
           </a:p>
           <a:p>
             <a:r>
-              <a:rPr lang="en-US" dirty="0" smtClean="0">
+              <a:rPr lang="en-US" dirty="0">
                 <a:solidFill>
                   <a:srgbClr val="A6A6A6"/>
                 </a:solidFill>
               </a:rPr>
               <a:t>Alloy</a:t>
             </a:r>
-            <a:endParaRPr lang="en-US" dirty="0">
-              <a:solidFill>
-                <a:srgbClr val="A6A6A6"/>
-              </a:solidFill>
-            </a:endParaRPr>
           </a:p>
         </p:txBody>
       </p:sp>
@@ -5646,36 +5590,18 @@
           <a:p>
             <a:r>
               <a:rPr lang="en-US" dirty="0"/>
-              <a:t>Actors and s</a:t>
-            </a:r>
-            <a:r>
-              <a:rPr lang="en-US" dirty="0" smtClean="0"/>
-              <a:t>equence </a:t>
-            </a:r>
-            <a:r>
-              <a:rPr lang="en-US" dirty="0"/>
-              <a:t>d</a:t>
-            </a:r>
-            <a:r>
-              <a:rPr lang="en-US" dirty="0" smtClean="0"/>
-              <a:t>iagram</a:t>
-            </a:r>
-            <a:endParaRPr lang="en-US" dirty="0"/>
-          </a:p>
-          <a:p>
-            <a:r>
-              <a:rPr lang="en-US" dirty="0" smtClean="0">
+              <a:t>Actors and sequence diagram</a:t>
+            </a:r>
+          </a:p>
+          <a:p>
+            <a:r>
+              <a:rPr lang="en-US" dirty="0">
                 <a:solidFill>
                   <a:srgbClr val="A6A6A6"/>
                 </a:solidFill>
               </a:rPr>
               <a:t>Alloy</a:t>
             </a:r>
-            <a:endParaRPr lang="en-US" dirty="0">
-              <a:solidFill>
-                <a:srgbClr val="A6A6A6"/>
-              </a:solidFill>
-            </a:endParaRPr>
           </a:p>
         </p:txBody>
       </p:sp>
@@ -5728,23 +5654,7 @@
           <a:p>
             <a:r>
               <a:rPr lang="en-US" dirty="0"/>
-              <a:t>Actors and s</a:t>
-            </a:r>
-            <a:r>
-              <a:rPr lang="en-US" dirty="0" smtClean="0"/>
-              <a:t>equence </a:t>
-            </a:r>
-            <a:r>
-              <a:rPr lang="en-US" dirty="0"/>
-              <a:t>d</a:t>
-            </a:r>
-            <a:r>
-              <a:rPr lang="en-US" dirty="0" smtClean="0"/>
-              <a:t>iagram</a:t>
-            </a:r>
-            <a:r>
-              <a:rPr lang="en-US" dirty="0"/>
-              <a:t>:</a:t>
+              <a:t>Actors and sequence diagram:</a:t>
             </a:r>
             <a:br>
               <a:rPr lang="en-US" dirty="0"/>
@@ -5876,38 +5786,14 @@
           <a:p>
             <a:r>
               <a:rPr lang="en-US" dirty="0"/>
-              <a:t>Actors and </a:t>
-            </a:r>
-            <a:r>
-              <a:rPr lang="en-US" dirty="0" smtClean="0"/>
-              <a:t>sequence </a:t>
-            </a:r>
-            <a:r>
-              <a:rPr lang="en-US" dirty="0"/>
-              <a:t>d</a:t>
-            </a:r>
-            <a:r>
-              <a:rPr lang="en-US" dirty="0" smtClean="0"/>
-              <a:t>iagram</a:t>
-            </a:r>
-            <a:r>
-              <a:rPr lang="en-US" dirty="0"/>
-              <a:t>:</a:t>
+              <a:t>Actors and sequence diagram:</a:t>
             </a:r>
             <a:br>
               <a:rPr lang="en-US" dirty="0"/>
             </a:br>
             <a:r>
               <a:rPr lang="en-US" dirty="0"/>
-              <a:t>Show Special Safe </a:t>
-            </a:r>
-            <a:r>
-              <a:rPr lang="en-US" dirty="0" smtClean="0"/>
-              <a:t>Areas (</a:t>
-            </a:r>
-            <a:r>
-              <a:rPr lang="en-US" dirty="0"/>
-              <a:t>1)</a:t>
+              <a:t>Show Special Safe Areas (1)</a:t>
             </a:r>
           </a:p>
         </p:txBody>
@@ -5989,38 +5875,14 @@
           <a:p>
             <a:r>
               <a:rPr lang="en-US" dirty="0"/>
-              <a:t>Actors and </a:t>
-            </a:r>
-            <a:r>
-              <a:rPr lang="en-US" dirty="0" smtClean="0"/>
-              <a:t>sequence </a:t>
-            </a:r>
-            <a:r>
-              <a:rPr lang="en-US" dirty="0"/>
-              <a:t>d</a:t>
-            </a:r>
-            <a:r>
-              <a:rPr lang="en-US" dirty="0" smtClean="0"/>
-              <a:t>iagram</a:t>
-            </a:r>
-            <a:r>
-              <a:rPr lang="en-US" dirty="0"/>
-              <a:t>:</a:t>
+              <a:t>Actors and sequence diagram:</a:t>
             </a:r>
             <a:br>
               <a:rPr lang="en-US" dirty="0"/>
             </a:br>
             <a:r>
               <a:rPr lang="en-US" dirty="0"/>
-              <a:t>Show Special Safe </a:t>
-            </a:r>
-            <a:r>
-              <a:rPr lang="en-US" dirty="0" smtClean="0"/>
-              <a:t>Areas (</a:t>
-            </a:r>
-            <a:r>
-              <a:rPr lang="en-US" dirty="0"/>
-              <a:t>2)</a:t>
+              <a:t>Show Special Safe Areas (2)</a:t>
             </a:r>
           </a:p>
         </p:txBody>
@@ -6161,10 +6023,9 @@
           </a:p>
           <a:p>
             <a:r>
-              <a:rPr lang="en-US" dirty="0" smtClean="0"/>
+              <a:rPr lang="en-US" dirty="0"/>
               <a:t>Alloy</a:t>
             </a:r>
-            <a:endParaRPr lang="en-US" dirty="0"/>
           </a:p>
         </p:txBody>
       </p:sp>
@@ -6428,11 +6289,7 @@
             </a:r>
             <a:r>
               <a:rPr lang="it-IT" dirty="0"/>
-              <a:t> Time {</a:t>
-            </a:r>
-            <a:r>
-              <a:rPr lang="it-IT" dirty="0" smtClean="0"/>
-              <a:t>}</a:t>
+              <a:t> Time {}</a:t>
             </a:r>
             <a:endParaRPr lang="en-US" dirty="0"/>
           </a:p>
@@ -6743,10 +6600,9 @@
           </a:p>
           <a:p>
             <a:r>
-              <a:rPr lang="en-US" dirty="0" smtClean="0"/>
+              <a:rPr lang="en-US" dirty="0"/>
               <a:t>Alloy</a:t>
             </a:r>
-            <a:endParaRPr lang="en-US" dirty="0"/>
           </a:p>
         </p:txBody>
       </p:sp>
@@ -6797,13 +6653,8 @@
           <a:p>
             <a:r>
               <a:rPr lang="en-US" dirty="0"/>
-              <a:t>Alloy: signatures </a:t>
-            </a:r>
-            <a:r>
-              <a:rPr lang="en-US" dirty="0" smtClean="0"/>
-              <a:t>(3)</a:t>
-            </a:r>
-            <a:endParaRPr lang="en-US" dirty="0"/>
+              <a:t>Alloy: signatures (3)</a:t>
+            </a:r>
           </a:p>
         </p:txBody>
       </p:sp>
@@ -7060,13 +6911,8 @@
           <a:p>
             <a:r>
               <a:rPr lang="en-US" dirty="0"/>
-              <a:t>Alloy: signatures </a:t>
-            </a:r>
-            <a:r>
-              <a:rPr lang="en-US" dirty="0" smtClean="0"/>
-              <a:t>(4)</a:t>
-            </a:r>
-            <a:endParaRPr lang="en-US" dirty="0"/>
+              <a:t>Alloy: signatures (4)</a:t>
+            </a:r>
           </a:p>
         </p:txBody>
       </p:sp>
@@ -7397,13 +7243,8 @@
           <a:p>
             <a:r>
               <a:rPr lang="en-US" dirty="0"/>
-              <a:t>Alloy: signatures </a:t>
-            </a:r>
-            <a:r>
-              <a:rPr lang="en-US" dirty="0" smtClean="0"/>
-              <a:t>(5)</a:t>
-            </a:r>
-            <a:endParaRPr lang="en-US" dirty="0"/>
+              <a:t>Alloy: signatures (5)</a:t>
+            </a:r>
           </a:p>
         </p:txBody>
       </p:sp>
@@ -8159,24 +8000,16 @@
               <a:t>r</a:t>
             </a:r>
             <a:r>
-              <a:rPr lang="it-IT" dirty="0" smtClean="0"/>
-              <a:t> </a:t>
-            </a:r>
-            <a:r>
-              <a:rPr lang="it-IT" dirty="0"/>
-              <a:t>and </a:t>
-            </a:r>
-            <a:r>
-              <a:rPr lang="it-IT" dirty="0" err="1" smtClean="0"/>
+              <a:rPr lang="it-IT" dirty="0"/>
+              <a:t> and </a:t>
+            </a:r>
+            <a:r>
+              <a:rPr lang="it-IT" dirty="0" err="1"/>
               <a:t>r</a:t>
             </a:r>
             <a:r>
-              <a:rPr lang="it-IT" dirty="0" smtClean="0"/>
-              <a:t>’ </a:t>
-            </a:r>
-            <a:r>
-              <a:rPr lang="it-IT" dirty="0"/>
-              <a:t>for the </a:t>
+              <a:rPr lang="it-IT" dirty="0"/>
+              <a:t>’ for the </a:t>
             </a:r>
             <a:r>
               <a:rPr lang="it-IT" dirty="0" err="1"/>
@@ -8675,14 +8508,13 @@
               <a:t> </a:t>
             </a:r>
             <a:r>
-              <a:rPr lang="it-IT" dirty="0" err="1" smtClean="0"/>
+              <a:rPr lang="it-IT" dirty="0" err="1"/>
               <a:t>reservation</a:t>
             </a:r>
             <a:r>
-              <a:rPr lang="it-IT" dirty="0" smtClean="0"/>
+              <a:rPr lang="it-IT" dirty="0"/>
               <a:t> </a:t>
             </a:r>
-            <a:endParaRPr lang="it-IT" dirty="0"/>
           </a:p>
           <a:p>
             <a:endParaRPr lang="en-US" dirty="0"/>
@@ -8998,13 +8830,8 @@
           <a:p>
             <a:r>
               <a:rPr lang="en-US" dirty="0"/>
-              <a:t>Alloy: facts </a:t>
-            </a:r>
-            <a:r>
-              <a:rPr lang="en-US" dirty="0" smtClean="0"/>
-              <a:t>(3)</a:t>
-            </a:r>
-            <a:endParaRPr lang="en-US" dirty="0"/>
+              <a:t>Alloy: facts (3)</a:t>
+            </a:r>
           </a:p>
         </p:txBody>
       </p:sp>
@@ -9037,7 +8864,7 @@
           </a:p>
           <a:p>
             <a:r>
-              <a:rPr lang="it-IT" dirty="0" smtClean="0"/>
+              <a:rPr lang="it-IT" dirty="0"/>
               <a:t>A </a:t>
             </a:r>
             <a:r>
@@ -9165,24 +8992,20 @@
               <a:t>start_time</a:t>
             </a:r>
             <a:r>
-              <a:rPr lang="it-IT" dirty="0" smtClean="0"/>
+              <a:rPr lang="it-IT" dirty="0"/>
               <a:t>;</a:t>
             </a:r>
-            <a:endParaRPr lang="en-US" dirty="0" smtClean="0"/>
-          </a:p>
-          <a:p>
-            <a:r>
-              <a:rPr lang="en-US" dirty="0" smtClean="0"/>
-              <a:t>A </a:t>
-            </a:r>
+            <a:endParaRPr lang="en-US" dirty="0"/>
+          </a:p>
+          <a:p>
             <a:r>
               <a:rPr lang="en-US" dirty="0"/>
-              <a:t>car is unlocked if exists an active reservation for it whose user is near the car;</a:t>
-            </a:r>
-          </a:p>
-          <a:p>
-            <a:r>
-              <a:rPr lang="it-IT" dirty="0" smtClean="0"/>
+              <a:t>A car is unlocked if exists an active reservation for it whose user is near the car;</a:t>
+            </a:r>
+          </a:p>
+          <a:p>
+            <a:r>
+              <a:rPr lang="it-IT" dirty="0"/>
               <a:t>The </a:t>
             </a:r>
             <a:r>
@@ -9488,15 +9311,7 @@
             </a:br>
             <a:r>
               <a:rPr lang="en-US" dirty="0"/>
-              <a:t>Thanks for your </a:t>
-            </a:r>
-            <a:r>
-              <a:rPr lang="en-US" dirty="0" smtClean="0"/>
-              <a:t>attention</a:t>
-            </a:r>
-            <a:r>
-              <a:rPr lang="en-US" dirty="0"/>
-              <a:t>.</a:t>
+              <a:t>Thanks for your attention.</a:t>
             </a:r>
           </a:p>
         </p:txBody>
@@ -9609,7 +9424,7 @@
           </a:p>
           <a:p>
             <a:r>
-              <a:rPr lang="en-US" dirty="0" smtClean="0">
+              <a:rPr lang="en-US" dirty="0">
                 <a:solidFill>
                   <a:schemeClr val="bg1">
                     <a:lumMod val="65000"/>
@@ -9618,13 +9433,6 @@
               </a:rPr>
               <a:t>Alloy</a:t>
             </a:r>
-            <a:endParaRPr lang="en-US" dirty="0">
-              <a:solidFill>
-                <a:schemeClr val="bg1">
-                  <a:lumMod val="65000"/>
-                </a:schemeClr>
-              </a:solidFill>
-            </a:endParaRPr>
           </a:p>
         </p:txBody>
       </p:sp>
@@ -9704,35 +9512,14 @@
           <a:p>
             <a:r>
               <a:rPr lang="en-GB" dirty="0"/>
-              <a:t>It is only possible to reserve a car </a:t>
-            </a:r>
-            <a:r>
-              <a:rPr lang="en-GB" dirty="0" smtClean="0"/>
-              <a:t>for the </a:t>
-            </a:r>
-            <a:r>
-              <a:rPr lang="en-GB" dirty="0"/>
-              <a:t>current time and the reservation expires after one hour if the user doesn’t pickup the car in time;</a:t>
+              <a:t>It is only possible to reserve a car for the current time and the reservation expires after one hour if the user doesn’t pickup the car in time;</a:t>
             </a:r>
           </a:p>
           <a:p>
             <a:r>
               <a:rPr lang="en-US" dirty="0"/>
-              <a:t>It is said that “The system stops charging the user as soon as the car is parked in a safe area and the user exits the car”. Since “the user exits the car” is ambiguous, we assumed that this is true when the user is not near the car </a:t>
-            </a:r>
-            <a:r>
-              <a:rPr lang="en-US" dirty="0" smtClean="0"/>
-              <a:t>anymore, </a:t>
-            </a:r>
-            <a:r>
-              <a:rPr lang="en-US" dirty="0"/>
-              <a:t>namely when the distance between user and car is bigger than a certain </a:t>
-            </a:r>
-            <a:r>
-              <a:rPr lang="en-US" dirty="0" smtClean="0"/>
-              <a:t>amount:</a:t>
-            </a:r>
-            <a:endParaRPr lang="en-US" dirty="0"/>
+              <a:t>It is said that “The system stops charging the user as soon as the car is parked in a safe area and the user exits the car”. Since “the user exits the car” is ambiguous, we assumed that this is true when the user is not near the car anymore, namely when the distance between user and car is bigger than a certain amount:</a:t>
+            </a:r>
           </a:p>
           <a:p>
             <a:pPr lvl="1">
@@ -9741,11 +9528,7 @@
             </a:pPr>
             <a:r>
               <a:rPr lang="en-GB" dirty="0"/>
-              <a:t>The payment for a ride is carried out when the user exits the car</a:t>
-            </a:r>
-            <a:r>
-              <a:rPr lang="en-GB" dirty="0" smtClean="0"/>
-              <a:t>;</a:t>
+              <a:t>The payment for a ride is carried out when the user exits the car;</a:t>
             </a:r>
             <a:endParaRPr lang="en-US" dirty="0"/>
           </a:p>
@@ -9855,18 +9638,13 @@
           </a:p>
           <a:p>
             <a:r>
-              <a:rPr lang="en-US" dirty="0" smtClean="0">
+              <a:rPr lang="en-US" dirty="0">
                 <a:solidFill>
                   <a:srgbClr val="A6A6A6"/>
                 </a:solidFill>
               </a:rPr>
               <a:t>Alloy</a:t>
             </a:r>
-            <a:endParaRPr lang="en-US" dirty="0">
-              <a:solidFill>
-                <a:srgbClr val="A6A6A6"/>
-              </a:solidFill>
-            </a:endParaRPr>
           </a:p>
         </p:txBody>
       </p:sp>
@@ -9974,15 +9752,7 @@
             <a:pPr lvl="0"/>
             <a:r>
               <a:rPr lang="en-GB" dirty="0"/>
-              <a:t>Users </a:t>
-            </a:r>
-            <a:r>
-              <a:rPr lang="en-GB" dirty="0" smtClean="0"/>
-              <a:t>can register </a:t>
-            </a:r>
-            <a:r>
-              <a:rPr lang="en-GB" dirty="0"/>
-              <a:t>to the system and have their personal area;</a:t>
+              <a:t>Users can register to the system and have their personal area;</a:t>
             </a:r>
             <a:endParaRPr lang="en-US" dirty="0"/>
           </a:p>
@@ -10046,13 +9816,8 @@
           <a:p>
             <a:r>
               <a:rPr lang="en-US" dirty="0"/>
-              <a:t>Domain </a:t>
-            </a:r>
-            <a:r>
-              <a:rPr lang="en-US" dirty="0" smtClean="0"/>
-              <a:t>properties</a:t>
-            </a:r>
-            <a:endParaRPr lang="en-US" dirty="0"/>
+              <a:t>Domain properties</a:t>
+            </a:r>
           </a:p>
         </p:txBody>
       </p:sp>
@@ -10076,27 +9841,15 @@
             <a:pPr lvl="0"/>
             <a:r>
               <a:rPr lang="en-GB" dirty="0"/>
-              <a:t>All the users have a device connected to the Internet, possibly </a:t>
-            </a:r>
-            <a:r>
-              <a:rPr lang="en-GB" dirty="0" smtClean="0"/>
-              <a:t>with </a:t>
-            </a:r>
+              <a:t>All the users have a device connected to the Internet, possibly with GPS built in;</a:t>
+            </a:r>
+            <a:endParaRPr lang="en-US" dirty="0"/>
+          </a:p>
+          <a:p>
+            <a:pPr lvl="0"/>
             <a:r>
               <a:rPr lang="en-GB" dirty="0"/>
-              <a:t>GPS built in;</a:t>
-            </a:r>
-            <a:endParaRPr lang="en-US" dirty="0"/>
-          </a:p>
-          <a:p>
-            <a:pPr lvl="0"/>
-            <a:r>
-              <a:rPr lang="en-GB" dirty="0"/>
-              <a:t>All the electric cars have an on-board computer that allows execution of Java software</a:t>
-            </a:r>
-            <a:r>
-              <a:rPr lang="en-GB" dirty="0" smtClean="0"/>
-              <a:t>;</a:t>
+              <a:t>All the electric cars have an on-board computer that allows execution of Java software;</a:t>
             </a:r>
           </a:p>
           <a:p>
@@ -10113,24 +9866,15 @@
             </a:pPr>
             <a:r>
               <a:rPr lang="en-US" dirty="0"/>
-              <a:t>We assume that these devices always work</a:t>
-            </a:r>
-            <a:r>
-              <a:rPr lang="en-US" dirty="0" smtClean="0"/>
-              <a:t>;</a:t>
-            </a:r>
-            <a:endParaRPr lang="en-GB" dirty="0" smtClean="0"/>
+              <a:t>We assume that these devices always work;</a:t>
+            </a:r>
+            <a:endParaRPr lang="en-GB" dirty="0"/>
           </a:p>
           <a:p>
             <a:r>
               <a:rPr lang="en-GB" dirty="0"/>
-              <a:t>The company never reaches the limit of requests per day for the external services</a:t>
-            </a:r>
-            <a:r>
-              <a:rPr lang="en-GB" dirty="0" smtClean="0"/>
-              <a:t>.</a:t>
-            </a:r>
-            <a:endParaRPr lang="en-GB" dirty="0"/>
+              <a:t>The company never reaches the limit of requests per day for the external services.</a:t>
+            </a:r>
           </a:p>
           <a:p>
             <a:pPr marL="0" lvl="0" indent="0">
@@ -10231,23 +9975,7 @@
             </a:pPr>
             <a:r>
               <a:rPr lang="en-GB" sz="4000" i="1" u="sng" dirty="0"/>
-              <a:t>Users </a:t>
-            </a:r>
-            <a:r>
-              <a:rPr lang="en-GB" sz="4000" i="1" u="sng" dirty="0" smtClean="0"/>
-              <a:t>can </a:t>
-            </a:r>
-            <a:r>
-              <a:rPr lang="en-GB" sz="4000" i="1" u="sng" dirty="0"/>
-              <a:t>see and select an available car close to </a:t>
-            </a:r>
-            <a:r>
-              <a:rPr lang="en-GB" sz="4000" i="1" u="sng" dirty="0" smtClean="0"/>
-              <a:t>them, </a:t>
-            </a:r>
-            <a:r>
-              <a:rPr lang="en-GB" sz="4000" i="1" u="sng" dirty="0"/>
-              <a:t>or close to a specified address, and reserve it for up to one hour before they pick it up</a:t>
+              <a:t>Users can see and select an available car close to them, or close to a specified address, and reserve it for up to one hour before they pick it up</a:t>
             </a:r>
             <a:r>
               <a:rPr lang="en-US" sz="4000" dirty="0"/>
@@ -10283,19 +10011,7 @@
             <a:pPr lvl="0"/>
             <a:r>
               <a:rPr lang="en-GB" sz="4000" dirty="0"/>
-              <a:t>The system has to be able to identify the location of a </a:t>
-            </a:r>
-            <a:r>
-              <a:rPr lang="en-GB" sz="4000" dirty="0" smtClean="0"/>
-              <a:t>user or </a:t>
-            </a:r>
-            <a:r>
-              <a:rPr lang="en-GB" sz="4000" dirty="0"/>
-              <a:t>through his/her GPS, if he/she gives the </a:t>
-            </a:r>
-            <a:r>
-              <a:rPr lang="en-GB" sz="4000" dirty="0" smtClean="0"/>
-              <a:t>consent, or through some input;</a:t>
+              <a:t>The system has to be able to identify the location of a user or through his/her GPS, if he/she gives the consent, or through some input;</a:t>
             </a:r>
             <a:endParaRPr lang="en-US" sz="4000" dirty="0"/>
           </a:p>
@@ -10421,15 +10137,7 @@
             </a:pPr>
             <a:r>
               <a:rPr lang="en-GB" i="1" u="sng" dirty="0"/>
-              <a:t>Users c</a:t>
-            </a:r>
-            <a:r>
-              <a:rPr lang="en-GB" i="1" u="sng" dirty="0" smtClean="0"/>
-              <a:t>an get </a:t>
-            </a:r>
-            <a:r>
-              <a:rPr lang="en-GB" i="1" u="sng" dirty="0"/>
-              <a:t>in a car only if they are near it and they reserved it</a:t>
+              <a:t>Users can get in a car only if they are near it and they reserved it</a:t>
             </a:r>
             <a:r>
               <a:rPr lang="en-GB" i="1" dirty="0"/>
@@ -10458,19 +10166,7 @@
             <a:pPr lvl="0"/>
             <a:r>
               <a:rPr lang="en-GB" dirty="0"/>
-              <a:t>The system has to unlock the car if the </a:t>
-            </a:r>
-            <a:r>
-              <a:rPr lang="en-GB" dirty="0" smtClean="0"/>
-              <a:t>distance between the position </a:t>
-            </a:r>
-            <a:r>
-              <a:rPr lang="en-GB" dirty="0"/>
-              <a:t>of the </a:t>
-            </a:r>
-            <a:r>
-              <a:rPr lang="en-GB" dirty="0" smtClean="0"/>
-              <a:t>user and the position of the car is smaller than a certain amount;</a:t>
+              <a:t>The system has to unlock the car if the distance between the position of the user and the position of the car is smaller than a certain amount;</a:t>
             </a:r>
             <a:endParaRPr lang="en-US" dirty="0"/>
           </a:p>

</xml_diff>